<commit_message>
added tinyrul to this repo
</commit_message>
<xml_diff>
--- a/LINQPad.pptx
+++ b/LINQPad.pptx
@@ -5,17 +5,18 @@
     <p:sldMasterId id="2147486799" r:id="rId69"/>
   </p:sldMasterIdLst>
   <p:notesMasterIdLst>
-    <p:notesMasterId r:id="rId75"/>
+    <p:notesMasterId r:id="rId76"/>
   </p:notesMasterIdLst>
   <p:handoutMasterIdLst>
-    <p:handoutMasterId r:id="rId76"/>
+    <p:handoutMasterId r:id="rId77"/>
   </p:handoutMasterIdLst>
   <p:sldIdLst>
     <p:sldId id="587" r:id="rId70"/>
     <p:sldId id="588" r:id="rId71"/>
     <p:sldId id="599" r:id="rId72"/>
     <p:sldId id="598" r:id="rId73"/>
-    <p:sldId id="595" r:id="rId74"/>
+    <p:sldId id="600" r:id="rId74"/>
+    <p:sldId id="595" r:id="rId75"/>
   </p:sldIdLst>
   <p:sldSz cx="12192000" cy="6858000"/>
   <p:notesSz cx="6858000" cy="9144000"/>
@@ -127,6 +128,7 @@
           <p14:sldIdLst>
             <p14:sldId id="599"/>
             <p14:sldId id="598"/>
+            <p14:sldId id="600"/>
             <p14:sldId id="595"/>
           </p14:sldIdLst>
         </p14:section>
@@ -7072,14 +7074,14 @@
           <a:lstStyle/>
           <a:p>
             <a:r>
-              <a:rPr lang="en-US" dirty="0" smtClean="0"/>
+              <a:rPr lang="en-US" sz="2800" dirty="0" smtClean="0"/>
               <a:t>Elias </a:t>
             </a:r>
             <a:r>
-              <a:rPr lang="en-US" dirty="0" err="1" smtClean="0"/>
+              <a:rPr lang="en-US" sz="2800" dirty="0" err="1" smtClean="0"/>
               <a:t>Hassen</a:t>
             </a:r>
-            <a:endParaRPr lang="en-US" dirty="0"/>
+            <a:endParaRPr lang="en-US" sz="2800" dirty="0"/>
           </a:p>
         </p:txBody>
       </p:sp>
@@ -7176,15 +7178,7 @@
             </a:r>
             <a:r>
               <a:rPr lang="en-US" sz="3200" dirty="0" smtClean="0"/>
-              <a:t>entric </a:t>
-            </a:r>
-            <a:r>
-              <a:rPr lang="en-US" sz="3200" dirty="0" smtClean="0"/>
-              <a:t>Code </a:t>
-            </a:r>
-            <a:r>
-              <a:rPr lang="en-US" sz="3200" dirty="0" smtClean="0"/>
-              <a:t>editor</a:t>
+              <a:t>entric Code editor</a:t>
             </a:r>
           </a:p>
           <a:p>
@@ -7211,16 +7205,11 @@
               <a:rPr lang="en-US" sz="3200" dirty="0" smtClean="0"/>
               <a:t>A SQL runner</a:t>
             </a:r>
-            <a:endParaRPr lang="en-US" sz="3200" dirty="0" smtClean="0"/>
           </a:p>
           <a:p>
             <a:r>
               <a:rPr lang="en-US" sz="3200" dirty="0" smtClean="0"/>
-              <a:t>Interactive </a:t>
-            </a:r>
-            <a:r>
-              <a:rPr lang="en-US" sz="3200" dirty="0" smtClean="0"/>
-              <a:t>debugger</a:t>
+              <a:t>Interactive debugger</a:t>
             </a:r>
           </a:p>
           <a:p>
@@ -7427,10 +7416,6 @@
               </a:rPr>
               <a:t>Demo – Explore Models</a:t>
             </a:r>
-            <a:endParaRPr lang="en-US" sz="1400" b="1" dirty="0" smtClean="0">
-              <a:ea typeface="+mn-ea"/>
-              <a:cs typeface="+mn-cs"/>
-            </a:endParaRPr>
           </a:p>
         </p:txBody>
       </p:sp>
@@ -7586,6 +7571,109 @@
 </file>
 
 <file path=ppt/slides/slide5.xml><?xml version="1.0" encoding="utf-8"?>
+<p:sld xmlns:a="http://schemas.openxmlformats.org/drawingml/2006/main" xmlns:r="http://schemas.openxmlformats.org/officeDocument/2006/relationships" xmlns:p="http://schemas.openxmlformats.org/presentationml/2006/main">
+  <p:cSld>
+    <p:spTree>
+      <p:nvGrpSpPr>
+        <p:cNvPr id="1" name=""/>
+        <p:cNvGrpSpPr/>
+        <p:nvPr/>
+      </p:nvGrpSpPr>
+      <p:grpSpPr>
+        <a:xfrm>
+          <a:off x="0" y="0"/>
+          <a:ext cx="0" cy="0"/>
+          <a:chOff x="0" y="0"/>
+          <a:chExt cx="0" cy="0"/>
+        </a:xfrm>
+      </p:grpSpPr>
+      <p:sp>
+        <p:nvSpPr>
+          <p:cNvPr id="2" name="Title 1"/>
+          <p:cNvSpPr>
+            <a:spLocks noGrp="1"/>
+          </p:cNvSpPr>
+          <p:nvPr>
+            <p:ph type="title"/>
+          </p:nvPr>
+        </p:nvSpPr>
+        <p:spPr/>
+        <p:txBody>
+          <a:bodyPr/>
+          <a:lstStyle/>
+          <a:p>
+            <a:r>
+              <a:rPr lang="en-US" dirty="0" smtClean="0"/>
+              <a:t>Slides and samples</a:t>
+            </a:r>
+            <a:endParaRPr lang="en-US" dirty="0"/>
+          </a:p>
+        </p:txBody>
+      </p:sp>
+      <p:sp>
+        <p:nvSpPr>
+          <p:cNvPr id="3" name="Content Placeholder 2"/>
+          <p:cNvSpPr>
+            <a:spLocks noGrp="1"/>
+          </p:cNvSpPr>
+          <p:nvPr>
+            <p:ph sz="half" idx="2"/>
+          </p:nvPr>
+        </p:nvSpPr>
+        <p:spPr/>
+        <p:txBody>
+          <a:bodyPr/>
+          <a:lstStyle/>
+          <a:p>
+            <a:r>
+              <a:rPr lang="en-US" sz="3600" dirty="0"/>
+              <a:t>http://tinyurl.com/LINQPad</a:t>
+            </a:r>
+          </a:p>
+          <a:p>
+            <a:pPr marL="0" indent="0">
+              <a:buNone/>
+            </a:pPr>
+            <a:endParaRPr lang="en-US" dirty="0"/>
+          </a:p>
+        </p:txBody>
+      </p:sp>
+      <p:sp>
+        <p:nvSpPr>
+          <p:cNvPr id="4" name="Text Placeholder 3"/>
+          <p:cNvSpPr>
+            <a:spLocks noGrp="1"/>
+          </p:cNvSpPr>
+          <p:nvPr>
+            <p:ph type="body" sz="quarter" idx="14"/>
+          </p:nvPr>
+        </p:nvSpPr>
+        <p:spPr/>
+        <p:txBody>
+          <a:bodyPr/>
+          <a:lstStyle/>
+          <a:p>
+            <a:endParaRPr lang="en-US"/>
+          </a:p>
+        </p:txBody>
+      </p:sp>
+    </p:spTree>
+    <p:extLst>
+      <p:ext uri="{BB962C8B-B14F-4D97-AF65-F5344CB8AC3E}">
+        <p14:creationId xmlns:p14="http://schemas.microsoft.com/office/powerpoint/2010/main" val="2132122848"/>
+      </p:ext>
+    </p:extLst>
+  </p:cSld>
+  <p:clrMapOvr>
+    <a:masterClrMapping/>
+  </p:clrMapOvr>
+  <p:transition spd="med">
+    <p:fade/>
+  </p:transition>
+</p:sld>
+</file>
+
+<file path=ppt/slides/slide6.xml><?xml version="1.0" encoding="utf-8"?>
 <p:sld xmlns:a="http://schemas.openxmlformats.org/drawingml/2006/main" xmlns:r="http://schemas.openxmlformats.org/officeDocument/2006/relationships" xmlns:p="http://schemas.openxmlformats.org/presentationml/2006/main">
   <p:cSld>
     <p:spTree>
@@ -8636,146 +8724,6 @@
 </file>
 
 <file path=customXml/item19.xml><?xml version="1.0" encoding="utf-8"?>
-<EsriMapsInfo xmlns="ESRI.ArcGIS.Mapping.OfficeIntegration.PowerPointInfo">
-  <Version>Version1</Version>
-  <RequiresSignIn>False</RequiresSignIn>
-</EsriMapsInfo>
-</file>
-
-<file path=customXml/item2.xml><?xml version="1.0" encoding="utf-8"?>
-<EsriMapsInfo xmlns="ESRI.ArcGIS.Mapping.OfficeIntegration.PowerPointInfo">
-  <Version>Version1</Version>
-  <RequiresSignIn>False</RequiresSignIn>
-</EsriMapsInfo>
-</file>
-
-<file path=customXml/item20.xml><?xml version="1.0" encoding="utf-8"?>
-<EsriMapsInfo xmlns="ESRI.ArcGIS.Mapping.OfficeIntegration.PowerPointInfo">
-  <Version>Version1</Version>
-  <RequiresSignIn>False</RequiresSignIn>
-</EsriMapsInfo>
-</file>
-
-<file path=customXml/item21.xml><?xml version="1.0" encoding="utf-8"?>
-<EsriMapsInfo xmlns="ESRI.ArcGIS.Mapping.OfficeIntegration.PowerPointInfo">
-  <Version>Version1</Version>
-  <RequiresSignIn>False</RequiresSignIn>
-</EsriMapsInfo>
-</file>
-
-<file path=customXml/item22.xml><?xml version="1.0" encoding="utf-8"?>
-<EsriMapsInfo xmlns="ESRI.ArcGIS.Mapping.OfficeIntegration.PowerPointInfo">
-  <Version>Version1</Version>
-  <RequiresSignIn>False</RequiresSignIn>
-</EsriMapsInfo>
-</file>
-
-<file path=customXml/item23.xml><?xml version="1.0" encoding="utf-8"?>
-<EsriMapsInfo xmlns="ESRI.ArcGIS.Mapping.OfficeIntegration.PowerPointInfo">
-  <Version>Version1</Version>
-  <RequiresSignIn>False</RequiresSignIn>
-</EsriMapsInfo>
-</file>
-
-<file path=customXml/item24.xml><?xml version="1.0" encoding="utf-8"?>
-<EsriMapsInfo xmlns="ESRI.ArcGIS.Mapping.OfficeIntegration.PowerPointInfo">
-  <Version>Version1</Version>
-  <RequiresSignIn>False</RequiresSignIn>
-</EsriMapsInfo>
-</file>
-
-<file path=customXml/item25.xml><?xml version="1.0" encoding="utf-8"?>
-<EsriMapsInfo xmlns="ESRI.ArcGIS.Mapping.OfficeIntegration.PowerPointInfo">
-  <Version>Version1</Version>
-  <RequiresSignIn>False</RequiresSignIn>
-</EsriMapsInfo>
-</file>
-
-<file path=customXml/item26.xml><?xml version="1.0" encoding="utf-8"?>
-<EsriMapsInfo xmlns="ESRI.ArcGIS.Mapping.OfficeIntegration.PowerPointInfo">
-  <Version>Version1</Version>
-  <RequiresSignIn>False</RequiresSignIn>
-</EsriMapsInfo>
-</file>
-
-<file path=customXml/item27.xml><?xml version="1.0" encoding="utf-8"?>
-<EsriMapsInfo xmlns="ESRI.ArcGIS.Mapping.OfficeIntegration.PowerPointInfo">
-  <Version>Version1</Version>
-  <RequiresSignIn>False</RequiresSignIn>
-</EsriMapsInfo>
-</file>
-
-<file path=customXml/item28.xml><?xml version="1.0" encoding="utf-8"?>
-<EsriMapsInfo xmlns="ESRI.ArcGIS.Mapping.OfficeIntegration.PowerPointInfo">
-  <Version>Version1</Version>
-  <RequiresSignIn>False</RequiresSignIn>
-</EsriMapsInfo>
-</file>
-
-<file path=customXml/item29.xml><?xml version="1.0" encoding="utf-8"?>
-<EsriMapsInfo xmlns="ESRI.ArcGIS.Mapping.OfficeIntegration.PowerPointInfo">
-  <Version>Version1</Version>
-  <RequiresSignIn>False</RequiresSignIn>
-</EsriMapsInfo>
-</file>
-
-<file path=customXml/item3.xml><?xml version="1.0" encoding="utf-8"?>
-<EsriMapsInfo xmlns="ESRI.ArcGIS.Mapping.OfficeIntegration.PowerPointInfo">
-  <Version>Version1</Version>
-  <RequiresSignIn>False</RequiresSignIn>
-</EsriMapsInfo>
-</file>
-
-<file path=customXml/item30.xml><?xml version="1.0" encoding="utf-8"?>
-<EsriMapsInfo xmlns="ESRI.ArcGIS.Mapping.OfficeIntegration.PowerPointInfo">
-  <Version>Version1</Version>
-  <RequiresSignIn>False</RequiresSignIn>
-</EsriMapsInfo>
-</file>
-
-<file path=customXml/item31.xml><?xml version="1.0" encoding="utf-8"?>
-<EsriMapsInfo xmlns="ESRI.ArcGIS.Mapping.OfficeIntegration.PowerPointInfo">
-  <Version>Version1</Version>
-  <RequiresSignIn>False</RequiresSignIn>
-</EsriMapsInfo>
-</file>
-
-<file path=customXml/item32.xml><?xml version="1.0" encoding="utf-8"?>
-<EsriMapsInfo xmlns="ESRI.ArcGIS.Mapping.OfficeIntegration.PowerPointInfo">
-  <Version>Version1</Version>
-  <RequiresSignIn>False</RequiresSignIn>
-</EsriMapsInfo>
-</file>
-
-<file path=customXml/item33.xml><?xml version="1.0" encoding="utf-8"?>
-<EsriMapsInfo xmlns="ESRI.ArcGIS.Mapping.OfficeIntegration.PowerPointInfo">
-  <Version>Version1</Version>
-  <RequiresSignIn>False</RequiresSignIn>
-</EsriMapsInfo>
-</file>
-
-<file path=customXml/item34.xml><?xml version="1.0" encoding="utf-8"?>
-<EsriMapsInfo xmlns="ESRI.ArcGIS.Mapping.OfficeIntegration.PowerPointInfo">
-  <Version>Version1</Version>
-  <RequiresSignIn>False</RequiresSignIn>
-</EsriMapsInfo>
-</file>
-
-<file path=customXml/item35.xml><?xml version="1.0" encoding="utf-8"?>
-<EsriMapsInfo xmlns="ESRI.ArcGIS.Mapping.OfficeIntegration.PowerPointInfo">
-  <Version>Version1</Version>
-  <RequiresSignIn>False</RequiresSignIn>
-</EsriMapsInfo>
-</file>
-
-<file path=customXml/item36.xml><?xml version="1.0" encoding="utf-8"?>
-<EsriMapsInfo xmlns="ESRI.ArcGIS.Mapping.OfficeIntegration.PowerPointInfo">
-  <Version>Version1</Version>
-  <RequiresSignIn>False</RequiresSignIn>
-</EsriMapsInfo>
-</file>
-
-<file path=customXml/item37.xml><?xml version="1.0" encoding="utf-8"?>
 <p:properties xmlns:p="http://schemas.microsoft.com/office/2006/metadata/properties" xmlns:xsi="http://www.w3.org/2001/XMLSchema-instance" xmlns:pc="http://schemas.microsoft.com/office/infopath/2007/PartnerControls">
   <documentManagement>
     <PublishingExpirationDate xmlns="http://schemas.microsoft.com/sharepoint/v3" xsi:nil="true"/>
@@ -8784,6 +8732,148 @@
 </p:properties>
 </file>
 
+<file path=customXml/item2.xml><?xml version="1.0" encoding="utf-8"?>
+<EsriMapsInfo xmlns="ESRI.ArcGIS.Mapping.OfficeIntegration.PowerPointInfo">
+  <Version>Version1</Version>
+  <RequiresSignIn>False</RequiresSignIn>
+</EsriMapsInfo>
+</file>
+
+<file path=customXml/item20.xml><?xml version="1.0" encoding="utf-8"?>
+<EsriMapsInfo xmlns="ESRI.ArcGIS.Mapping.OfficeIntegration.PowerPointInfo">
+  <Version>Version1</Version>
+  <RequiresSignIn>False</RequiresSignIn>
+</EsriMapsInfo>
+</file>
+
+<file path=customXml/item21.xml><?xml version="1.0" encoding="utf-8"?>
+<?mso-contentType ?>
+<FormTemplates xmlns="http://schemas.microsoft.com/sharepoint/v3/contenttype/forms">
+  <Display>DocumentLibraryForm</Display>
+  <Edit>DocumentLibraryForm</Edit>
+  <New>DocumentLibraryForm</New>
+</FormTemplates>
+</file>
+
+<file path=customXml/item22.xml><?xml version="1.0" encoding="utf-8"?>
+<EsriMapsInfo xmlns="ESRI.ArcGIS.Mapping.OfficeIntegration.PowerPointInfo">
+  <Version>Version1</Version>
+  <RequiresSignIn>False</RequiresSignIn>
+</EsriMapsInfo>
+</file>
+
+<file path=customXml/item23.xml><?xml version="1.0" encoding="utf-8"?>
+<EsriMapsInfo xmlns="ESRI.ArcGIS.Mapping.OfficeIntegration.PowerPointInfo">
+  <Version>Version1</Version>
+  <RequiresSignIn>False</RequiresSignIn>
+</EsriMapsInfo>
+</file>
+
+<file path=customXml/item24.xml><?xml version="1.0" encoding="utf-8"?>
+<EsriMapsInfo xmlns="ESRI.ArcGIS.Mapping.OfficeIntegration.PowerPointInfo">
+  <Version>Version1</Version>
+  <RequiresSignIn>False</RequiresSignIn>
+</EsriMapsInfo>
+</file>
+
+<file path=customXml/item25.xml><?xml version="1.0" encoding="utf-8"?>
+<EsriMapsInfo xmlns="ESRI.ArcGIS.Mapping.OfficeIntegration.PowerPointInfo">
+  <Version>Version1</Version>
+  <RequiresSignIn>False</RequiresSignIn>
+</EsriMapsInfo>
+</file>
+
+<file path=customXml/item26.xml><?xml version="1.0" encoding="utf-8"?>
+<EsriMapsInfo xmlns="ESRI.ArcGIS.Mapping.OfficeIntegration.PowerPointInfo">
+  <Version>Version1</Version>
+  <RequiresSignIn>False</RequiresSignIn>
+</EsriMapsInfo>
+</file>
+
+<file path=customXml/item27.xml><?xml version="1.0" encoding="utf-8"?>
+<EsriMapsInfo xmlns="ESRI.ArcGIS.Mapping.OfficeIntegration.PowerPointInfo">
+  <Version>Version1</Version>
+  <RequiresSignIn>False</RequiresSignIn>
+</EsriMapsInfo>
+</file>
+
+<file path=customXml/item28.xml><?xml version="1.0" encoding="utf-8"?>
+<EsriMapsInfo xmlns="ESRI.ArcGIS.Mapping.OfficeIntegration.PowerPointInfo">
+  <Version>Version1</Version>
+  <RequiresSignIn>False</RequiresSignIn>
+</EsriMapsInfo>
+</file>
+
+<file path=customXml/item29.xml><?xml version="1.0" encoding="utf-8"?>
+<EsriMapsInfo xmlns="ESRI.ArcGIS.Mapping.OfficeIntegration.PowerPointInfo">
+  <Version>Version1</Version>
+  <RequiresSignIn>False</RequiresSignIn>
+</EsriMapsInfo>
+</file>
+
+<file path=customXml/item3.xml><?xml version="1.0" encoding="utf-8"?>
+<EsriMapsInfo xmlns="ESRI.ArcGIS.Mapping.OfficeIntegration.PowerPointInfo">
+  <Version>Version1</Version>
+  <RequiresSignIn>False</RequiresSignIn>
+</EsriMapsInfo>
+</file>
+
+<file path=customXml/item30.xml><?xml version="1.0" encoding="utf-8"?>
+<EsriMapsInfo xmlns="ESRI.ArcGIS.Mapping.OfficeIntegration.PowerPointInfo">
+  <Version>Version1</Version>
+  <RequiresSignIn>False</RequiresSignIn>
+</EsriMapsInfo>
+</file>
+
+<file path=customXml/item31.xml><?xml version="1.0" encoding="utf-8"?>
+<EsriMapsInfo xmlns="ESRI.ArcGIS.Mapping.OfficeIntegration.PowerPointInfo">
+  <Version>Version1</Version>
+  <RequiresSignIn>False</RequiresSignIn>
+</EsriMapsInfo>
+</file>
+
+<file path=customXml/item32.xml><?xml version="1.0" encoding="utf-8"?>
+<EsriMapsInfo xmlns="ESRI.ArcGIS.Mapping.OfficeIntegration.PowerPointInfo">
+  <Version>Version1</Version>
+  <RequiresSignIn>False</RequiresSignIn>
+</EsriMapsInfo>
+</file>
+
+<file path=customXml/item33.xml><?xml version="1.0" encoding="utf-8"?>
+<EsriMapsInfo xmlns="ESRI.ArcGIS.Mapping.OfficeIntegration.PowerPointInfo">
+  <Version>Version1</Version>
+  <RequiresSignIn>False</RequiresSignIn>
+</EsriMapsInfo>
+</file>
+
+<file path=customXml/item34.xml><?xml version="1.0" encoding="utf-8"?>
+<EsriMapsInfo xmlns="ESRI.ArcGIS.Mapping.OfficeIntegration.PowerPointInfo">
+  <Version>Version1</Version>
+  <RequiresSignIn>False</RequiresSignIn>
+</EsriMapsInfo>
+</file>
+
+<file path=customXml/item35.xml><?xml version="1.0" encoding="utf-8"?>
+<EsriMapsInfo xmlns="ESRI.ArcGIS.Mapping.OfficeIntegration.PowerPointInfo">
+  <Version>Version1</Version>
+  <RequiresSignIn>False</RequiresSignIn>
+</EsriMapsInfo>
+</file>
+
+<file path=customXml/item36.xml><?xml version="1.0" encoding="utf-8"?>
+<EsriMapsInfo xmlns="ESRI.ArcGIS.Mapping.OfficeIntegration.PowerPointInfo">
+  <Version>Version1</Version>
+  <RequiresSignIn>False</RequiresSignIn>
+</EsriMapsInfo>
+</file>
+
+<file path=customXml/item37.xml><?xml version="1.0" encoding="utf-8"?>
+<EsriMapsInfo xmlns="ESRI.ArcGIS.Mapping.OfficeIntegration.PowerPointInfo">
+  <Version>Version1</Version>
+  <RequiresSignIn>False</RequiresSignIn>
+</EsriMapsInfo>
+</file>
+
 <file path=customXml/item38.xml><?xml version="1.0" encoding="utf-8"?>
 <EsriMapsInfo xmlns="ESRI.ArcGIS.Mapping.OfficeIntegration.PowerPointInfo">
   <Version>Version1</Version>
@@ -8813,20 +8903,6 @@
 </file>
 
 <file path=customXml/item41.xml><?xml version="1.0" encoding="utf-8"?>
-<EsriMapsInfo xmlns="ESRI.ArcGIS.Mapping.OfficeIntegration.PowerPointInfo">
-  <Version>Version1</Version>
-  <RequiresSignIn>False</RequiresSignIn>
-</EsriMapsInfo>
-</file>
-
-<file path=customXml/item42.xml><?xml version="1.0" encoding="utf-8"?>
-<EsriMapsInfo xmlns="ESRI.ArcGIS.Mapping.OfficeIntegration.PowerPointInfo">
-  <Version>Version1</Version>
-  <RequiresSignIn>False</RequiresSignIn>
-</EsriMapsInfo>
-</file>
-
-<file path=customXml/item43.xml><?xml version="1.0" encoding="utf-8"?>
 <ct:contentTypeSchema xmlns:ct="http://schemas.microsoft.com/office/2006/metadata/contentType" xmlns:ma="http://schemas.microsoft.com/office/2006/metadata/properties/metaAttributes" ct:_="" ma:_="" ma:contentTypeName="Document" ma:contentTypeID="0x0101007CCB09B909685840A5AA5DC537182835" ma:contentTypeVersion="1" ma:contentTypeDescription="Create a new document." ma:contentTypeScope="" ma:versionID="647b6714bcbd012a02104274568241a2">
   <xsd:schema xmlns:xsd="http://www.w3.org/2001/XMLSchema" xmlns:xs="http://www.w3.org/2001/XMLSchema" xmlns:p="http://schemas.microsoft.com/office/2006/metadata/properties" xmlns:ns1="http://schemas.microsoft.com/sharepoint/v3" targetNamespace="http://schemas.microsoft.com/office/2006/metadata/properties" ma:root="true" ma:fieldsID="4dcce58c87e9fcebab8021569449a8d0" ns1:_="">
     <xsd:import namespace="http://schemas.microsoft.com/sharepoint/v3"/>
@@ -8958,6 +9034,20 @@
 </ct:contentTypeSchema>
 </file>
 
+<file path=customXml/item42.xml><?xml version="1.0" encoding="utf-8"?>
+<EsriMapsInfo xmlns="ESRI.ArcGIS.Mapping.OfficeIntegration.PowerPointInfo">
+  <Version>Version1</Version>
+  <RequiresSignIn>False</RequiresSignIn>
+</EsriMapsInfo>
+</file>
+
+<file path=customXml/item43.xml><?xml version="1.0" encoding="utf-8"?>
+<EsriMapsInfo xmlns="ESRI.ArcGIS.Mapping.OfficeIntegration.PowerPointInfo">
+  <Version>Version1</Version>
+  <RequiresSignIn>False</RequiresSignIn>
+</EsriMapsInfo>
+</file>
+
 <file path=customXml/item44.xml><?xml version="1.0" encoding="utf-8"?>
 <EsriMapsInfo xmlns="ESRI.ArcGIS.Mapping.OfficeIntegration.PowerPointInfo">
   <Version>Version1</Version>
@@ -8966,12 +9056,10 @@
 </file>
 
 <file path=customXml/item45.xml><?xml version="1.0" encoding="utf-8"?>
-<?mso-contentType ?>
-<FormTemplates xmlns="http://schemas.microsoft.com/sharepoint/v3/contenttype/forms">
-  <Display>DocumentLibraryForm</Display>
-  <Edit>DocumentLibraryForm</Edit>
-  <New>DocumentLibraryForm</New>
-</FormTemplates>
+<EsriMapsInfo xmlns="ESRI.ArcGIS.Mapping.OfficeIntegration.PowerPointInfo">
+  <Version>Version1</Version>
+  <RequiresSignIn>False</RequiresSignIn>
+</EsriMapsInfo>
 </file>
 
 <file path=customXml/item46.xml><?xml version="1.0" encoding="utf-8"?>
@@ -9171,7 +9259,7 @@
 </file>
 
 <file path=customXml/itemProps1.xml><?xml version="1.0" encoding="utf-8"?>
-<ds:datastoreItem xmlns:ds="http://schemas.openxmlformats.org/officeDocument/2006/customXml" ds:itemID="{AE5A340C-916E-449C-AA30-CD41B151A0D4}">
+<ds:datastoreItem xmlns:ds="http://schemas.openxmlformats.org/officeDocument/2006/customXml" ds:itemID="{A77C5B54-CA1C-4010-8D5D-ED406825EBB7}">
   <ds:schemaRefs>
     <ds:schemaRef ds:uri="ESRI.ArcGIS.Mapping.OfficeIntegration.PowerPointInfo"/>
   </ds:schemaRefs>
@@ -9179,7 +9267,7 @@
 </file>
 
 <file path=customXml/itemProps10.xml><?xml version="1.0" encoding="utf-8"?>
-<ds:datastoreItem xmlns:ds="http://schemas.openxmlformats.org/officeDocument/2006/customXml" ds:itemID="{328DCA66-548E-4424-83E1-09FFD45EE4B0}">
+<ds:datastoreItem xmlns:ds="http://schemas.openxmlformats.org/officeDocument/2006/customXml" ds:itemID="{18DF8D07-6137-4D85-8010-4650942E033A}">
   <ds:schemaRefs>
     <ds:schemaRef ds:uri="ESRI.ArcGIS.Mapping.OfficeIntegration.PowerPointInfo"/>
   </ds:schemaRefs>
@@ -9187,6 +9275,46 @@
 </file>
 
 <file path=customXml/itemProps11.xml><?xml version="1.0" encoding="utf-8"?>
+<ds:datastoreItem xmlns:ds="http://schemas.openxmlformats.org/officeDocument/2006/customXml" ds:itemID="{C9037CA3-5499-457D-8238-F29CBEBDF143}">
+  <ds:schemaRefs>
+    <ds:schemaRef ds:uri="ESRI.ArcGIS.Mapping.OfficeIntegration.PowerPointInfo"/>
+  </ds:schemaRefs>
+</ds:datastoreItem>
+</file>
+
+<file path=customXml/itemProps12.xml><?xml version="1.0" encoding="utf-8"?>
+<ds:datastoreItem xmlns:ds="http://schemas.openxmlformats.org/officeDocument/2006/customXml" ds:itemID="{D4E2A01F-BEC1-4558-9AD1-A87ED70D910B}">
+  <ds:schemaRefs>
+    <ds:schemaRef ds:uri="ESRI.ArcGIS.Mapping.OfficeIntegration.PowerPointInfo"/>
+  </ds:schemaRefs>
+</ds:datastoreItem>
+</file>
+
+<file path=customXml/itemProps13.xml><?xml version="1.0" encoding="utf-8"?>
+<ds:datastoreItem xmlns:ds="http://schemas.openxmlformats.org/officeDocument/2006/customXml" ds:itemID="{10846DB9-88C0-41D7-ACE4-BEC3A7488A03}">
+  <ds:schemaRefs>
+    <ds:schemaRef ds:uri="ESRI.ArcGIS.Mapping.OfficeIntegration.PowerPointInfo"/>
+  </ds:schemaRefs>
+</ds:datastoreItem>
+</file>
+
+<file path=customXml/itemProps14.xml><?xml version="1.0" encoding="utf-8"?>
+<ds:datastoreItem xmlns:ds="http://schemas.openxmlformats.org/officeDocument/2006/customXml" ds:itemID="{D32008F3-64AC-45EB-A05B-F6120AE62290}">
+  <ds:schemaRefs>
+    <ds:schemaRef ds:uri="ESRI.ArcGIS.Mapping.OfficeIntegration.PowerPointInfo"/>
+  </ds:schemaRefs>
+</ds:datastoreItem>
+</file>
+
+<file path=customXml/itemProps15.xml><?xml version="1.0" encoding="utf-8"?>
+<ds:datastoreItem xmlns:ds="http://schemas.openxmlformats.org/officeDocument/2006/customXml" ds:itemID="{E940B40D-12DB-4BFA-BBB6-2269FD71FF92}">
+  <ds:schemaRefs>
+    <ds:schemaRef ds:uri="ESRI.ArcGIS.Mapping.OfficeIntegration.PowerPointInfo"/>
+  </ds:schemaRefs>
+</ds:datastoreItem>
+</file>
+
+<file path=customXml/itemProps16.xml><?xml version="1.0" encoding="utf-8"?>
 <ds:datastoreItem xmlns:ds="http://schemas.openxmlformats.org/officeDocument/2006/customXml" ds:itemID="{998905D7-FE59-48DE-A74A-5B0009B7827F}">
   <ds:schemaRefs>
     <ds:schemaRef ds:uri="ESRI.ArcGIS.Mapping.OfficeIntegration.PowerPointInfo"/>
@@ -9194,111 +9322,7 @@
 </ds:datastoreItem>
 </file>
 
-<file path=customXml/itemProps12.xml><?xml version="1.0" encoding="utf-8"?>
-<ds:datastoreItem xmlns:ds="http://schemas.openxmlformats.org/officeDocument/2006/customXml" ds:itemID="{FDE85643-3216-4103-A1BD-63F5E1D42D73}">
-  <ds:schemaRefs>
-    <ds:schemaRef ds:uri="ESRI.ArcGIS.Mapping.OfficeIntegration.PowerPointInfo"/>
-  </ds:schemaRefs>
-</ds:datastoreItem>
-</file>
-
-<file path=customXml/itemProps13.xml><?xml version="1.0" encoding="utf-8"?>
-<ds:datastoreItem xmlns:ds="http://schemas.openxmlformats.org/officeDocument/2006/customXml" ds:itemID="{8EED6C1C-A455-42E4-8CBE-649F5A755068}">
-  <ds:schemaRefs>
-    <ds:schemaRef ds:uri="ESRI.ArcGIS.Mapping.OfficeIntegration.PowerPointInfo"/>
-  </ds:schemaRefs>
-</ds:datastoreItem>
-</file>
-
-<file path=customXml/itemProps14.xml><?xml version="1.0" encoding="utf-8"?>
-<ds:datastoreItem xmlns:ds="http://schemas.openxmlformats.org/officeDocument/2006/customXml" ds:itemID="{4617AF64-94DB-48BB-8BE2-3BCF6B12593F}">
-  <ds:schemaRefs>
-    <ds:schemaRef ds:uri="ESRI.ArcGIS.Mapping.OfficeIntegration.PowerPointInfo"/>
-  </ds:schemaRefs>
-</ds:datastoreItem>
-</file>
-
-<file path=customXml/itemProps15.xml><?xml version="1.0" encoding="utf-8"?>
-<ds:datastoreItem xmlns:ds="http://schemas.openxmlformats.org/officeDocument/2006/customXml" ds:itemID="{352E5095-9B98-4AF0-9861-BDC020ABBCFC}">
-  <ds:schemaRefs>
-    <ds:schemaRef ds:uri="ESRI.ArcGIS.Mapping.OfficeIntegration.PowerPointInfo"/>
-  </ds:schemaRefs>
-</ds:datastoreItem>
-</file>
-
-<file path=customXml/itemProps16.xml><?xml version="1.0" encoding="utf-8"?>
-<ds:datastoreItem xmlns:ds="http://schemas.openxmlformats.org/officeDocument/2006/customXml" ds:itemID="{D32008F3-64AC-45EB-A05B-F6120AE62290}">
-  <ds:schemaRefs>
-    <ds:schemaRef ds:uri="ESRI.ArcGIS.Mapping.OfficeIntegration.PowerPointInfo"/>
-  </ds:schemaRefs>
-</ds:datastoreItem>
-</file>
-
 <file path=customXml/itemProps17.xml><?xml version="1.0" encoding="utf-8"?>
-<ds:datastoreItem xmlns:ds="http://schemas.openxmlformats.org/officeDocument/2006/customXml" ds:itemID="{F6EFD530-1E3E-47B8-A55C-19EC63E3C655}">
-  <ds:schemaRefs>
-    <ds:schemaRef ds:uri="ESRI.ArcGIS.Mapping.OfficeIntegration.PowerPointInfo"/>
-  </ds:schemaRefs>
-</ds:datastoreItem>
-</file>
-
-<file path=customXml/itemProps18.xml><?xml version="1.0" encoding="utf-8"?>
-<ds:datastoreItem xmlns:ds="http://schemas.openxmlformats.org/officeDocument/2006/customXml" ds:itemID="{A77C5B54-CA1C-4010-8D5D-ED406825EBB7}">
-  <ds:schemaRefs>
-    <ds:schemaRef ds:uri="ESRI.ArcGIS.Mapping.OfficeIntegration.PowerPointInfo"/>
-  </ds:schemaRefs>
-</ds:datastoreItem>
-</file>
-
-<file path=customXml/itemProps19.xml><?xml version="1.0" encoding="utf-8"?>
-<ds:datastoreItem xmlns:ds="http://schemas.openxmlformats.org/officeDocument/2006/customXml" ds:itemID="{2672FF5B-1ADC-45B0-9698-61421F5761E7}">
-  <ds:schemaRefs>
-    <ds:schemaRef ds:uri="ESRI.ArcGIS.Mapping.OfficeIntegration.PowerPointInfo"/>
-  </ds:schemaRefs>
-</ds:datastoreItem>
-</file>
-
-<file path=customXml/itemProps2.xml><?xml version="1.0" encoding="utf-8"?>
-<ds:datastoreItem xmlns:ds="http://schemas.openxmlformats.org/officeDocument/2006/customXml" ds:itemID="{10846DB9-88C0-41D7-ACE4-BEC3A7488A03}">
-  <ds:schemaRefs>
-    <ds:schemaRef ds:uri="ESRI.ArcGIS.Mapping.OfficeIntegration.PowerPointInfo"/>
-  </ds:schemaRefs>
-</ds:datastoreItem>
-</file>
-
-<file path=customXml/itemProps20.xml><?xml version="1.0" encoding="utf-8"?>
-<ds:datastoreItem xmlns:ds="http://schemas.openxmlformats.org/officeDocument/2006/customXml" ds:itemID="{76859AF2-E75C-459B-8657-EEEA80BC8153}">
-  <ds:schemaRefs>
-    <ds:schemaRef ds:uri="ESRI.ArcGIS.Mapping.OfficeIntegration.PowerPointInfo"/>
-  </ds:schemaRefs>
-</ds:datastoreItem>
-</file>
-
-<file path=customXml/itemProps21.xml><?xml version="1.0" encoding="utf-8"?>
-<ds:datastoreItem xmlns:ds="http://schemas.openxmlformats.org/officeDocument/2006/customXml" ds:itemID="{B0302D17-5923-4CC0-9EB4-0E57930F5A8E}">
-  <ds:schemaRefs>
-    <ds:schemaRef ds:uri="ESRI.ArcGIS.Mapping.OfficeIntegration.PowerPointInfo"/>
-  </ds:schemaRefs>
-</ds:datastoreItem>
-</file>
-
-<file path=customXml/itemProps22.xml><?xml version="1.0" encoding="utf-8"?>
-<ds:datastoreItem xmlns:ds="http://schemas.openxmlformats.org/officeDocument/2006/customXml" ds:itemID="{9E56F111-9E55-4604-91C2-8352AE933430}">
-  <ds:schemaRefs>
-    <ds:schemaRef ds:uri="ESRI.ArcGIS.Mapping.OfficeIntegration.PowerPointInfo"/>
-  </ds:schemaRefs>
-</ds:datastoreItem>
-</file>
-
-<file path=customXml/itemProps23.xml><?xml version="1.0" encoding="utf-8"?>
-<ds:datastoreItem xmlns:ds="http://schemas.openxmlformats.org/officeDocument/2006/customXml" ds:itemID="{C4AF463C-FA8B-436D-9853-3318650FDAB8}">
-  <ds:schemaRefs>
-    <ds:schemaRef ds:uri="ESRI.ArcGIS.Mapping.OfficeIntegration.PowerPointInfo"/>
-  </ds:schemaRefs>
-</ds:datastoreItem>
-</file>
-
-<file path=customXml/itemProps24.xml><?xml version="1.0" encoding="utf-8"?>
 <ds:datastoreItem xmlns:ds="http://schemas.openxmlformats.org/officeDocument/2006/customXml" ds:itemID="{DA46DABE-45F1-4E65-A939-497CB70F357D}">
   <ds:schemaRefs>
     <ds:schemaRef ds:uri="ESRI.ArcGIS.Mapping.OfficeIntegration.PowerPointInfo"/>
@@ -9306,71 +9330,7 @@
 </ds:datastoreItem>
 </file>
 
-<file path=customXml/itemProps25.xml><?xml version="1.0" encoding="utf-8"?>
-<ds:datastoreItem xmlns:ds="http://schemas.openxmlformats.org/officeDocument/2006/customXml" ds:itemID="{096117C4-1661-4D3B-B9F6-BC19E0F3E90B}">
-  <ds:schemaRefs>
-    <ds:schemaRef ds:uri="ESRI.ArcGIS.Mapping.OfficeIntegration.PowerPointInfo"/>
-  </ds:schemaRefs>
-</ds:datastoreItem>
-</file>
-
-<file path=customXml/itemProps26.xml><?xml version="1.0" encoding="utf-8"?>
-<ds:datastoreItem xmlns:ds="http://schemas.openxmlformats.org/officeDocument/2006/customXml" ds:itemID="{53220D22-8257-492D-8F60-ECE474D7C478}">
-  <ds:schemaRefs>
-    <ds:schemaRef ds:uri="ESRI.ArcGIS.Mapping.OfficeIntegration.PowerPointInfo"/>
-  </ds:schemaRefs>
-</ds:datastoreItem>
-</file>
-
-<file path=customXml/itemProps27.xml><?xml version="1.0" encoding="utf-8"?>
-<ds:datastoreItem xmlns:ds="http://schemas.openxmlformats.org/officeDocument/2006/customXml" ds:itemID="{EF0D8C03-B10D-4D20-AC38-CA6799A7A314}">
-  <ds:schemaRefs>
-    <ds:schemaRef ds:uri="ESRI.ArcGIS.Mapping.OfficeIntegration.PowerPointInfo"/>
-  </ds:schemaRefs>
-</ds:datastoreItem>
-</file>
-
-<file path=customXml/itemProps28.xml><?xml version="1.0" encoding="utf-8"?>
-<ds:datastoreItem xmlns:ds="http://schemas.openxmlformats.org/officeDocument/2006/customXml" ds:itemID="{2FE51124-E413-4DA5-9E06-A6EB32D0C127}">
-  <ds:schemaRefs>
-    <ds:schemaRef ds:uri="ESRI.ArcGIS.Mapping.OfficeIntegration.PowerPointInfo"/>
-  </ds:schemaRefs>
-</ds:datastoreItem>
-</file>
-
-<file path=customXml/itemProps29.xml><?xml version="1.0" encoding="utf-8"?>
-<ds:datastoreItem xmlns:ds="http://schemas.openxmlformats.org/officeDocument/2006/customXml" ds:itemID="{E940B40D-12DB-4BFA-BBB6-2269FD71FF92}">
-  <ds:schemaRefs>
-    <ds:schemaRef ds:uri="ESRI.ArcGIS.Mapping.OfficeIntegration.PowerPointInfo"/>
-  </ds:schemaRefs>
-</ds:datastoreItem>
-</file>
-
-<file path=customXml/itemProps3.xml><?xml version="1.0" encoding="utf-8"?>
-<ds:datastoreItem xmlns:ds="http://schemas.openxmlformats.org/officeDocument/2006/customXml" ds:itemID="{5B58CDD1-2BF6-415B-A256-DBBCC6A48D56}">
-  <ds:schemaRefs>
-    <ds:schemaRef ds:uri="ESRI.ArcGIS.Mapping.OfficeIntegration.PowerPointInfo"/>
-  </ds:schemaRefs>
-</ds:datastoreItem>
-</file>
-
-<file path=customXml/itemProps30.xml><?xml version="1.0" encoding="utf-8"?>
-<ds:datastoreItem xmlns:ds="http://schemas.openxmlformats.org/officeDocument/2006/customXml" ds:itemID="{B7E6AAC2-10E8-4F0C-BCC5-34BD332F8972}">
-  <ds:schemaRefs>
-    <ds:schemaRef ds:uri="ESRI.ArcGIS.Mapping.OfficeIntegration.PowerPointInfo"/>
-  </ds:schemaRefs>
-</ds:datastoreItem>
-</file>
-
-<file path=customXml/itemProps31.xml><?xml version="1.0" encoding="utf-8"?>
-<ds:datastoreItem xmlns:ds="http://schemas.openxmlformats.org/officeDocument/2006/customXml" ds:itemID="{653D88A7-0F5E-41C5-A5C5-47DF37C594C5}">
-  <ds:schemaRefs>
-    <ds:schemaRef ds:uri="ESRI.ArcGIS.Mapping.OfficeIntegration.PowerPointInfo"/>
-  </ds:schemaRefs>
-</ds:datastoreItem>
-</file>
-
-<file path=customXml/itemProps32.xml><?xml version="1.0" encoding="utf-8"?>
+<file path=customXml/itemProps18.xml><?xml version="1.0" encoding="utf-8"?>
 <ds:datastoreItem xmlns:ds="http://schemas.openxmlformats.org/officeDocument/2006/customXml" ds:itemID="{5A1E471A-DB16-4174-9D85-6F159A344CDB}">
   <ds:schemaRefs>
     <ds:schemaRef ds:uri="ESRI.ArcGIS.Mapping.OfficeIntegration.PowerPointInfo"/>
@@ -9378,39 +9338,7 @@
 </ds:datastoreItem>
 </file>
 
-<file path=customXml/itemProps33.xml><?xml version="1.0" encoding="utf-8"?>
-<ds:datastoreItem xmlns:ds="http://schemas.openxmlformats.org/officeDocument/2006/customXml" ds:itemID="{4ADFB73A-380D-41FC-8C37-7155886326FA}">
-  <ds:schemaRefs>
-    <ds:schemaRef ds:uri="ESRI.ArcGIS.Mapping.OfficeIntegration.PowerPointInfo"/>
-  </ds:schemaRefs>
-</ds:datastoreItem>
-</file>
-
-<file path=customXml/itemProps34.xml><?xml version="1.0" encoding="utf-8"?>
-<ds:datastoreItem xmlns:ds="http://schemas.openxmlformats.org/officeDocument/2006/customXml" ds:itemID="{E5F80E3B-5636-41B2-898D-5D17189605B7}">
-  <ds:schemaRefs>
-    <ds:schemaRef ds:uri="ESRI.ArcGIS.Mapping.OfficeIntegration.PowerPointInfo"/>
-  </ds:schemaRefs>
-</ds:datastoreItem>
-</file>
-
-<file path=customXml/itemProps35.xml><?xml version="1.0" encoding="utf-8"?>
-<ds:datastoreItem xmlns:ds="http://schemas.openxmlformats.org/officeDocument/2006/customXml" ds:itemID="{AC4EB402-C456-4A26-8A92-B48606FF9264}">
-  <ds:schemaRefs>
-    <ds:schemaRef ds:uri="ESRI.ArcGIS.Mapping.OfficeIntegration.PowerPointInfo"/>
-  </ds:schemaRefs>
-</ds:datastoreItem>
-</file>
-
-<file path=customXml/itemProps36.xml><?xml version="1.0" encoding="utf-8"?>
-<ds:datastoreItem xmlns:ds="http://schemas.openxmlformats.org/officeDocument/2006/customXml" ds:itemID="{71658D62-F010-45F1-9326-EDC465FED48E}">
-  <ds:schemaRefs>
-    <ds:schemaRef ds:uri="ESRI.ArcGIS.Mapping.OfficeIntegration.PowerPointInfo"/>
-  </ds:schemaRefs>
-</ds:datastoreItem>
-</file>
-
-<file path=customXml/itemProps37.xml><?xml version="1.0" encoding="utf-8"?>
+<file path=customXml/itemProps19.xml><?xml version="1.0" encoding="utf-8"?>
 <ds:datastoreItem xmlns:ds="http://schemas.openxmlformats.org/officeDocument/2006/customXml" ds:itemID="{81E133DB-697E-4C10-B192-8899027B1EC6}">
   <ds:schemaRefs>
     <ds:schemaRef ds:uri="http://schemas.openxmlformats.org/package/2006/metadata/core-properties"/>
@@ -9426,15 +9354,95 @@
 </ds:datastoreItem>
 </file>
 
-<file path=customXml/itemProps38.xml><?xml version="1.0" encoding="utf-8"?>
-<ds:datastoreItem xmlns:ds="http://schemas.openxmlformats.org/officeDocument/2006/customXml" ds:itemID="{039A5E78-EC42-40DE-A05E-1C7FCA140310}">
+<file path=customXml/itemProps2.xml><?xml version="1.0" encoding="utf-8"?>
+<ds:datastoreItem xmlns:ds="http://schemas.openxmlformats.org/officeDocument/2006/customXml" ds:itemID="{53220D22-8257-492D-8F60-ECE474D7C478}">
   <ds:schemaRefs>
     <ds:schemaRef ds:uri="ESRI.ArcGIS.Mapping.OfficeIntegration.PowerPointInfo"/>
   </ds:schemaRefs>
 </ds:datastoreItem>
 </file>
 
-<file path=customXml/itemProps39.xml><?xml version="1.0" encoding="utf-8"?>
+<file path=customXml/itemProps20.xml><?xml version="1.0" encoding="utf-8"?>
+<ds:datastoreItem xmlns:ds="http://schemas.openxmlformats.org/officeDocument/2006/customXml" ds:itemID="{16EF6D11-DC4F-410C-A4BF-DF081B432591}">
+  <ds:schemaRefs>
+    <ds:schemaRef ds:uri="ESRI.ArcGIS.Mapping.OfficeIntegration.PowerPointInfo"/>
+  </ds:schemaRefs>
+</ds:datastoreItem>
+</file>
+
+<file path=customXml/itemProps21.xml><?xml version="1.0" encoding="utf-8"?>
+<ds:datastoreItem xmlns:ds="http://schemas.openxmlformats.org/officeDocument/2006/customXml" ds:itemID="{E1A338E5-2E37-4973-87E6-4C02B0B7F460}">
+  <ds:schemaRefs>
+    <ds:schemaRef ds:uri="http://schemas.microsoft.com/sharepoint/v3/contenttype/forms"/>
+  </ds:schemaRefs>
+</ds:datastoreItem>
+</file>
+
+<file path=customXml/itemProps22.xml><?xml version="1.0" encoding="utf-8"?>
+<ds:datastoreItem xmlns:ds="http://schemas.openxmlformats.org/officeDocument/2006/customXml" ds:itemID="{33F5FE6F-FF86-471A-919E-6C74E3669390}">
+  <ds:schemaRefs>
+    <ds:schemaRef ds:uri="ESRI.ArcGIS.Mapping.OfficeIntegration.PowerPointInfo"/>
+  </ds:schemaRefs>
+</ds:datastoreItem>
+</file>
+
+<file path=customXml/itemProps23.xml><?xml version="1.0" encoding="utf-8"?>
+<ds:datastoreItem xmlns:ds="http://schemas.openxmlformats.org/officeDocument/2006/customXml" ds:itemID="{7147CA22-2BC4-4917-83D2-7CA4C34A80D4}">
+  <ds:schemaRefs>
+    <ds:schemaRef ds:uri="ESRI.ArcGIS.Mapping.OfficeIntegration.PowerPointInfo"/>
+  </ds:schemaRefs>
+</ds:datastoreItem>
+</file>
+
+<file path=customXml/itemProps24.xml><?xml version="1.0" encoding="utf-8"?>
+<ds:datastoreItem xmlns:ds="http://schemas.openxmlformats.org/officeDocument/2006/customXml" ds:itemID="{FB58F897-2A4D-4309-8E20-83FD28E6FE27}">
+  <ds:schemaRefs>
+    <ds:schemaRef ds:uri="ESRI.ArcGIS.Mapping.OfficeIntegration.PowerPointInfo"/>
+  </ds:schemaRefs>
+</ds:datastoreItem>
+</file>
+
+<file path=customXml/itemProps25.xml><?xml version="1.0" encoding="utf-8"?>
+<ds:datastoreItem xmlns:ds="http://schemas.openxmlformats.org/officeDocument/2006/customXml" ds:itemID="{86B5FFB5-BF2F-45EA-BC75-C41726A8F251}">
+  <ds:schemaRefs>
+    <ds:schemaRef ds:uri="ESRI.ArcGIS.Mapping.OfficeIntegration.PowerPointInfo"/>
+  </ds:schemaRefs>
+</ds:datastoreItem>
+</file>
+
+<file path=customXml/itemProps26.xml><?xml version="1.0" encoding="utf-8"?>
+<ds:datastoreItem xmlns:ds="http://schemas.openxmlformats.org/officeDocument/2006/customXml" ds:itemID="{7684026F-E81F-4167-824A-3AA1BAEAE133}">
+  <ds:schemaRefs>
+    <ds:schemaRef ds:uri="ESRI.ArcGIS.Mapping.OfficeIntegration.PowerPointInfo"/>
+  </ds:schemaRefs>
+</ds:datastoreItem>
+</file>
+
+<file path=customXml/itemProps27.xml><?xml version="1.0" encoding="utf-8"?>
+<ds:datastoreItem xmlns:ds="http://schemas.openxmlformats.org/officeDocument/2006/customXml" ds:itemID="{328DCA66-548E-4424-83E1-09FFD45EE4B0}">
+  <ds:schemaRefs>
+    <ds:schemaRef ds:uri="ESRI.ArcGIS.Mapping.OfficeIntegration.PowerPointInfo"/>
+  </ds:schemaRefs>
+</ds:datastoreItem>
+</file>
+
+<file path=customXml/itemProps28.xml><?xml version="1.0" encoding="utf-8"?>
+<ds:datastoreItem xmlns:ds="http://schemas.openxmlformats.org/officeDocument/2006/customXml" ds:itemID="{2672FF5B-1ADC-45B0-9698-61421F5761E7}">
+  <ds:schemaRefs>
+    <ds:schemaRef ds:uri="ESRI.ArcGIS.Mapping.OfficeIntegration.PowerPointInfo"/>
+  </ds:schemaRefs>
+</ds:datastoreItem>
+</file>
+
+<file path=customXml/itemProps29.xml><?xml version="1.0" encoding="utf-8"?>
+<ds:datastoreItem xmlns:ds="http://schemas.openxmlformats.org/officeDocument/2006/customXml" ds:itemID="{653D88A7-0F5E-41C5-A5C5-47DF37C594C5}">
+  <ds:schemaRefs>
+    <ds:schemaRef ds:uri="ESRI.ArcGIS.Mapping.OfficeIntegration.PowerPointInfo"/>
+  </ds:schemaRefs>
+</ds:datastoreItem>
+</file>
+
+<file path=customXml/itemProps3.xml><?xml version="1.0" encoding="utf-8"?>
 <ds:datastoreItem xmlns:ds="http://schemas.openxmlformats.org/officeDocument/2006/customXml" ds:itemID="{7A70D44C-B768-49FE-A70F-C6199D3EE9A7}">
   <ds:schemaRefs>
     <ds:schemaRef ds:uri="ESRI.ArcGIS.Mapping.OfficeIntegration.PowerPointInfo"/>
@@ -9442,7 +9450,39 @@
 </ds:datastoreItem>
 </file>
 
-<file path=customXml/itemProps4.xml><?xml version="1.0" encoding="utf-8"?>
+<file path=customXml/itemProps30.xml><?xml version="1.0" encoding="utf-8"?>
+<ds:datastoreItem xmlns:ds="http://schemas.openxmlformats.org/officeDocument/2006/customXml" ds:itemID="{C3102E66-5C5A-4AAF-9C94-24819091B61E}">
+  <ds:schemaRefs>
+    <ds:schemaRef ds:uri="ESRI.ArcGIS.Mapping.OfficeIntegration.PowerPointInfo"/>
+  </ds:schemaRefs>
+</ds:datastoreItem>
+</file>
+
+<file path=customXml/itemProps31.xml><?xml version="1.0" encoding="utf-8"?>
+<ds:datastoreItem xmlns:ds="http://schemas.openxmlformats.org/officeDocument/2006/customXml" ds:itemID="{55235559-86B9-428B-8DAF-8EE6262226D5}">
+  <ds:schemaRefs>
+    <ds:schemaRef ds:uri="ESRI.ArcGIS.Mapping.OfficeIntegration.PowerPointInfo"/>
+  </ds:schemaRefs>
+</ds:datastoreItem>
+</file>
+
+<file path=customXml/itemProps32.xml><?xml version="1.0" encoding="utf-8"?>
+<ds:datastoreItem xmlns:ds="http://schemas.openxmlformats.org/officeDocument/2006/customXml" ds:itemID="{F29452FE-972E-43F8-B54C-969F4C69C00B}">
+  <ds:schemaRefs>
+    <ds:schemaRef ds:uri="ESRI.ArcGIS.Mapping.OfficeIntegration.PowerPointInfo"/>
+  </ds:schemaRefs>
+</ds:datastoreItem>
+</file>
+
+<file path=customXml/itemProps33.xml><?xml version="1.0" encoding="utf-8"?>
+<ds:datastoreItem xmlns:ds="http://schemas.openxmlformats.org/officeDocument/2006/customXml" ds:itemID="{3A5DA3C3-46A0-47F8-855A-99C7684A98A2}">
+  <ds:schemaRefs>
+    <ds:schemaRef ds:uri="ESRI.ArcGIS.Mapping.OfficeIntegration.PowerPointInfo"/>
+  </ds:schemaRefs>
+</ds:datastoreItem>
+</file>
+
+<file path=customXml/itemProps34.xml><?xml version="1.0" encoding="utf-8"?>
 <ds:datastoreItem xmlns:ds="http://schemas.openxmlformats.org/officeDocument/2006/customXml" ds:itemID="{612F64FD-E61D-43DE-A84B-8FC0DA8FC26C}">
   <ds:schemaRefs>
     <ds:schemaRef ds:uri="ESRI.ArcGIS.Mapping.OfficeIntegration.PowerPointInfo"/>
@@ -9450,31 +9490,63 @@
 </ds:datastoreItem>
 </file>
 
-<file path=customXml/itemProps40.xml><?xml version="1.0" encoding="utf-8"?>
-<ds:datastoreItem xmlns:ds="http://schemas.openxmlformats.org/officeDocument/2006/customXml" ds:itemID="{16EF6D11-DC4F-410C-A4BF-DF081B432591}">
+<file path=customXml/itemProps35.xml><?xml version="1.0" encoding="utf-8"?>
+<ds:datastoreItem xmlns:ds="http://schemas.openxmlformats.org/officeDocument/2006/customXml" ds:itemID="{4ADFB689-BC87-4869-ADD0-8C3555150450}">
   <ds:schemaRefs>
     <ds:schemaRef ds:uri="ESRI.ArcGIS.Mapping.OfficeIntegration.PowerPointInfo"/>
   </ds:schemaRefs>
 </ds:datastoreItem>
 </file>
 
-<file path=customXml/itemProps41.xml><?xml version="1.0" encoding="utf-8"?>
-<ds:datastoreItem xmlns:ds="http://schemas.openxmlformats.org/officeDocument/2006/customXml" ds:itemID="{9E8787D6-C7B8-48EC-8C13-4069AE6320BD}">
+<file path=customXml/itemProps36.xml><?xml version="1.0" encoding="utf-8"?>
+<ds:datastoreItem xmlns:ds="http://schemas.openxmlformats.org/officeDocument/2006/customXml" ds:itemID="{4617AF64-94DB-48BB-8BE2-3BCF6B12593F}">
   <ds:schemaRefs>
     <ds:schemaRef ds:uri="ESRI.ArcGIS.Mapping.OfficeIntegration.PowerPointInfo"/>
   </ds:schemaRefs>
 </ds:datastoreItem>
 </file>
 
-<file path=customXml/itemProps42.xml><?xml version="1.0" encoding="utf-8"?>
-<ds:datastoreItem xmlns:ds="http://schemas.openxmlformats.org/officeDocument/2006/customXml" ds:itemID="{E559A846-F914-4753-A2DC-D33AFE44114C}">
+<file path=customXml/itemProps37.xml><?xml version="1.0" encoding="utf-8"?>
+<ds:datastoreItem xmlns:ds="http://schemas.openxmlformats.org/officeDocument/2006/customXml" ds:itemID="{9E56F111-9E55-4604-91C2-8352AE933430}">
   <ds:schemaRefs>
     <ds:schemaRef ds:uri="ESRI.ArcGIS.Mapping.OfficeIntegration.PowerPointInfo"/>
   </ds:schemaRefs>
 </ds:datastoreItem>
 </file>
 
-<file path=customXml/itemProps43.xml><?xml version="1.0" encoding="utf-8"?>
+<file path=customXml/itemProps38.xml><?xml version="1.0" encoding="utf-8"?>
+<ds:datastoreItem xmlns:ds="http://schemas.openxmlformats.org/officeDocument/2006/customXml" ds:itemID="{EF0D8C03-B10D-4D20-AC38-CA6799A7A314}">
+  <ds:schemaRefs>
+    <ds:schemaRef ds:uri="ESRI.ArcGIS.Mapping.OfficeIntegration.PowerPointInfo"/>
+  </ds:schemaRefs>
+</ds:datastoreItem>
+</file>
+
+<file path=customXml/itemProps39.xml><?xml version="1.0" encoding="utf-8"?>
+<ds:datastoreItem xmlns:ds="http://schemas.openxmlformats.org/officeDocument/2006/customXml" ds:itemID="{B7E6AAC2-10E8-4F0C-BCC5-34BD332F8972}">
+  <ds:schemaRefs>
+    <ds:schemaRef ds:uri="ESRI.ArcGIS.Mapping.OfficeIntegration.PowerPointInfo"/>
+  </ds:schemaRefs>
+</ds:datastoreItem>
+</file>
+
+<file path=customXml/itemProps4.xml><?xml version="1.0" encoding="utf-8"?>
+<ds:datastoreItem xmlns:ds="http://schemas.openxmlformats.org/officeDocument/2006/customXml" ds:itemID="{B0302D17-5923-4CC0-9EB4-0E57930F5A8E}">
+  <ds:schemaRefs>
+    <ds:schemaRef ds:uri="ESRI.ArcGIS.Mapping.OfficeIntegration.PowerPointInfo"/>
+  </ds:schemaRefs>
+</ds:datastoreItem>
+</file>
+
+<file path=customXml/itemProps40.xml><?xml version="1.0" encoding="utf-8"?>
+<ds:datastoreItem xmlns:ds="http://schemas.openxmlformats.org/officeDocument/2006/customXml" ds:itemID="{AC4EB402-C456-4A26-8A92-B48606FF9264}">
+  <ds:schemaRefs>
+    <ds:schemaRef ds:uri="ESRI.ArcGIS.Mapping.OfficeIntegration.PowerPointInfo"/>
+  </ds:schemaRefs>
+</ds:datastoreItem>
+</file>
+
+<file path=customXml/itemProps41.xml><?xml version="1.0" encoding="utf-8"?>
 <ds:datastoreItem xmlns:ds="http://schemas.openxmlformats.org/officeDocument/2006/customXml" ds:itemID="{8B8D6152-B933-4294-8151-3CF2A1B01FF1}">
   <ds:schemaRefs>
     <ds:schemaRef ds:uri="http://schemas.microsoft.com/office/2006/metadata/contentType"/>
@@ -9492,23 +9564,103 @@
 </ds:datastoreItem>
 </file>
 
-<file path=customXml/itemProps44.xml><?xml version="1.0" encoding="utf-8"?>
-<ds:datastoreItem xmlns:ds="http://schemas.openxmlformats.org/officeDocument/2006/customXml" ds:itemID="{C3102E66-5C5A-4AAF-9C94-24819091B61E}">
+<file path=customXml/itemProps42.xml><?xml version="1.0" encoding="utf-8"?>
+<ds:datastoreItem xmlns:ds="http://schemas.openxmlformats.org/officeDocument/2006/customXml" ds:itemID="{A2D97EB6-C9B5-45C6-85A6-D4FE6E1D9856}">
   <ds:schemaRefs>
     <ds:schemaRef ds:uri="ESRI.ArcGIS.Mapping.OfficeIntegration.PowerPointInfo"/>
   </ds:schemaRefs>
 </ds:datastoreItem>
 </file>
 
-<file path=customXml/itemProps45.xml><?xml version="1.0" encoding="utf-8"?>
-<ds:datastoreItem xmlns:ds="http://schemas.openxmlformats.org/officeDocument/2006/customXml" ds:itemID="{E1A338E5-2E37-4973-87E6-4C02B0B7F460}">
+<file path=customXml/itemProps43.xml><?xml version="1.0" encoding="utf-8"?>
+<ds:datastoreItem xmlns:ds="http://schemas.openxmlformats.org/officeDocument/2006/customXml" ds:itemID="{EB8D7141-3508-4B4E-8051-37E3E4C09D17}">
   <ds:schemaRefs>
-    <ds:schemaRef ds:uri="http://schemas.microsoft.com/sharepoint/v3/contenttype/forms"/>
+    <ds:schemaRef ds:uri="ESRI.ArcGIS.Mapping.OfficeIntegration.PowerPointInfo"/>
   </ds:schemaRefs>
 </ds:datastoreItem>
 </file>
 
+<file path=customXml/itemProps44.xml><?xml version="1.0" encoding="utf-8"?>
+<ds:datastoreItem xmlns:ds="http://schemas.openxmlformats.org/officeDocument/2006/customXml" ds:itemID="{DB399249-DB96-4601-9BA5-97791613CF3A}">
+  <ds:schemaRefs>
+    <ds:schemaRef ds:uri="ESRI.ArcGIS.Mapping.OfficeIntegration.PowerPointInfo"/>
+  </ds:schemaRefs>
+</ds:datastoreItem>
+</file>
+
+<file path=customXml/itemProps45.xml><?xml version="1.0" encoding="utf-8"?>
+<ds:datastoreItem xmlns:ds="http://schemas.openxmlformats.org/officeDocument/2006/customXml" ds:itemID="{905F88FE-324F-4FBE-89BB-9CEE04D6CACF}">
+  <ds:schemaRefs>
+    <ds:schemaRef ds:uri="ESRI.ArcGIS.Mapping.OfficeIntegration.PowerPointInfo"/>
+  </ds:schemaRefs>
+</ds:datastoreItem>
+</file>
+
 <file path=customXml/itemProps46.xml><?xml version="1.0" encoding="utf-8"?>
+<ds:datastoreItem xmlns:ds="http://schemas.openxmlformats.org/officeDocument/2006/customXml" ds:itemID="{94844715-80D4-4BDB-8DF0-52D9314E2485}">
+  <ds:schemaRefs>
+    <ds:schemaRef ds:uri="ESRI.ArcGIS.Mapping.OfficeIntegration.PowerPointInfo"/>
+  </ds:schemaRefs>
+</ds:datastoreItem>
+</file>
+
+<file path=customXml/itemProps47.xml><?xml version="1.0" encoding="utf-8"?>
+<ds:datastoreItem xmlns:ds="http://schemas.openxmlformats.org/officeDocument/2006/customXml" ds:itemID="{5B58CDD1-2BF6-415B-A256-DBBCC6A48D56}">
+  <ds:schemaRefs>
+    <ds:schemaRef ds:uri="ESRI.ArcGIS.Mapping.OfficeIntegration.PowerPointInfo"/>
+  </ds:schemaRefs>
+</ds:datastoreItem>
+</file>
+
+<file path=customXml/itemProps48.xml><?xml version="1.0" encoding="utf-8"?>
+<ds:datastoreItem xmlns:ds="http://schemas.openxmlformats.org/officeDocument/2006/customXml" ds:itemID="{FDE85643-3216-4103-A1BD-63F5E1D42D73}">
+  <ds:schemaRefs>
+    <ds:schemaRef ds:uri="ESRI.ArcGIS.Mapping.OfficeIntegration.PowerPointInfo"/>
+  </ds:schemaRefs>
+</ds:datastoreItem>
+</file>
+
+<file path=customXml/itemProps49.xml><?xml version="1.0" encoding="utf-8"?>
+<ds:datastoreItem xmlns:ds="http://schemas.openxmlformats.org/officeDocument/2006/customXml" ds:itemID="{F6EFD530-1E3E-47B8-A55C-19EC63E3C655}">
+  <ds:schemaRefs>
+    <ds:schemaRef ds:uri="ESRI.ArcGIS.Mapping.OfficeIntegration.PowerPointInfo"/>
+  </ds:schemaRefs>
+</ds:datastoreItem>
+</file>
+
+<file path=customXml/itemProps5.xml><?xml version="1.0" encoding="utf-8"?>
+<ds:datastoreItem xmlns:ds="http://schemas.openxmlformats.org/officeDocument/2006/customXml" ds:itemID="{E5F80E3B-5636-41B2-898D-5D17189605B7}">
+  <ds:schemaRefs>
+    <ds:schemaRef ds:uri="ESRI.ArcGIS.Mapping.OfficeIntegration.PowerPointInfo"/>
+  </ds:schemaRefs>
+</ds:datastoreItem>
+</file>
+
+<file path=customXml/itemProps50.xml><?xml version="1.0" encoding="utf-8"?>
+<ds:datastoreItem xmlns:ds="http://schemas.openxmlformats.org/officeDocument/2006/customXml" ds:itemID="{096117C4-1661-4D3B-B9F6-BC19E0F3E90B}">
+  <ds:schemaRefs>
+    <ds:schemaRef ds:uri="ESRI.ArcGIS.Mapping.OfficeIntegration.PowerPointInfo"/>
+  </ds:schemaRefs>
+</ds:datastoreItem>
+</file>
+
+<file path=customXml/itemProps51.xml><?xml version="1.0" encoding="utf-8"?>
+<ds:datastoreItem xmlns:ds="http://schemas.openxmlformats.org/officeDocument/2006/customXml" ds:itemID="{4ADFB73A-380D-41FC-8C37-7155886326FA}">
+  <ds:schemaRefs>
+    <ds:schemaRef ds:uri="ESRI.ArcGIS.Mapping.OfficeIntegration.PowerPointInfo"/>
+  </ds:schemaRefs>
+</ds:datastoreItem>
+</file>
+
+<file path=customXml/itemProps52.xml><?xml version="1.0" encoding="utf-8"?>
+<ds:datastoreItem xmlns:ds="http://schemas.openxmlformats.org/officeDocument/2006/customXml" ds:itemID="{039A5E78-EC42-40DE-A05E-1C7FCA140310}">
+  <ds:schemaRefs>
+    <ds:schemaRef ds:uri="ESRI.ArcGIS.Mapping.OfficeIntegration.PowerPointInfo"/>
+  </ds:schemaRefs>
+</ds:datastoreItem>
+</file>
+
+<file path=customXml/itemProps53.xml><?xml version="1.0" encoding="utf-8"?>
 <ds:datastoreItem xmlns:ds="http://schemas.openxmlformats.org/officeDocument/2006/customXml" ds:itemID="{9DC677B7-6D9E-42B7-AD1F-75D1804EAF7D}">
   <ds:schemaRefs>
     <ds:schemaRef ds:uri="ESRI.ArcGIS.Mapping.OfficeIntegration.PowerPointInfo"/>
@@ -9516,7 +9668,135 @@
 </ds:datastoreItem>
 </file>
 
-<file path=customXml/itemProps47.xml><?xml version="1.0" encoding="utf-8"?>
+<file path=customXml/itemProps54.xml><?xml version="1.0" encoding="utf-8"?>
+<ds:datastoreItem xmlns:ds="http://schemas.openxmlformats.org/officeDocument/2006/customXml" ds:itemID="{3E253610-1BBE-4C16-A1DA-4D6F07A3A74E}">
+  <ds:schemaRefs>
+    <ds:schemaRef ds:uri="ESRI.ArcGIS.Mapping.OfficeIntegration.PowerPointInfo"/>
+  </ds:schemaRefs>
+</ds:datastoreItem>
+</file>
+
+<file path=customXml/itemProps55.xml><?xml version="1.0" encoding="utf-8"?>
+<ds:datastoreItem xmlns:ds="http://schemas.openxmlformats.org/officeDocument/2006/customXml" ds:itemID="{D6F15B81-7660-4E9F-B613-8AA4F84B6DA3}">
+  <ds:schemaRefs>
+    <ds:schemaRef ds:uri="ESRI.ArcGIS.Mapping.OfficeIntegration.PowerPointInfo"/>
+  </ds:schemaRefs>
+</ds:datastoreItem>
+</file>
+
+<file path=customXml/itemProps56.xml><?xml version="1.0" encoding="utf-8"?>
+<ds:datastoreItem xmlns:ds="http://schemas.openxmlformats.org/officeDocument/2006/customXml" ds:itemID="{76859AF2-E75C-459B-8657-EEEA80BC8153}">
+  <ds:schemaRefs>
+    <ds:schemaRef ds:uri="ESRI.ArcGIS.Mapping.OfficeIntegration.PowerPointInfo"/>
+  </ds:schemaRefs>
+</ds:datastoreItem>
+</file>
+
+<file path=customXml/itemProps57.xml><?xml version="1.0" encoding="utf-8"?>
+<ds:datastoreItem xmlns:ds="http://schemas.openxmlformats.org/officeDocument/2006/customXml" ds:itemID="{9E8787D6-C7B8-48EC-8C13-4069AE6320BD}">
+  <ds:schemaRefs>
+    <ds:schemaRef ds:uri="ESRI.ArcGIS.Mapping.OfficeIntegration.PowerPointInfo"/>
+  </ds:schemaRefs>
+</ds:datastoreItem>
+</file>
+
+<file path=customXml/itemProps58.xml><?xml version="1.0" encoding="utf-8"?>
+<ds:datastoreItem xmlns:ds="http://schemas.openxmlformats.org/officeDocument/2006/customXml" ds:itemID="{22A42D4B-0AAE-44C9-A2EF-48BDE1C5260A}">
+  <ds:schemaRefs>
+    <ds:schemaRef ds:uri="ESRI.ArcGIS.Mapping.OfficeIntegration.PowerPointInfo"/>
+  </ds:schemaRefs>
+</ds:datastoreItem>
+</file>
+
+<file path=customXml/itemProps59.xml><?xml version="1.0" encoding="utf-8"?>
+<ds:datastoreItem xmlns:ds="http://schemas.openxmlformats.org/officeDocument/2006/customXml" ds:itemID="{E47732B9-9C1B-4723-B4AA-A21238C5DF44}">
+  <ds:schemaRefs>
+    <ds:schemaRef ds:uri="ESRI.ArcGIS.Mapping.OfficeIntegration.PowerPointInfo"/>
+  </ds:schemaRefs>
+</ds:datastoreItem>
+</file>
+
+<file path=customXml/itemProps6.xml><?xml version="1.0" encoding="utf-8"?>
+<ds:datastoreItem xmlns:ds="http://schemas.openxmlformats.org/officeDocument/2006/customXml" ds:itemID="{E559A846-F914-4753-A2DC-D33AFE44114C}">
+  <ds:schemaRefs>
+    <ds:schemaRef ds:uri="ESRI.ArcGIS.Mapping.OfficeIntegration.PowerPointInfo"/>
+  </ds:schemaRefs>
+</ds:datastoreItem>
+</file>
+
+<file path=customXml/itemProps60.xml><?xml version="1.0" encoding="utf-8"?>
+<ds:datastoreItem xmlns:ds="http://schemas.openxmlformats.org/officeDocument/2006/customXml" ds:itemID="{AE5A340C-916E-449C-AA30-CD41B151A0D4}">
+  <ds:schemaRefs>
+    <ds:schemaRef ds:uri="ESRI.ArcGIS.Mapping.OfficeIntegration.PowerPointInfo"/>
+  </ds:schemaRefs>
+</ds:datastoreItem>
+</file>
+
+<file path=customXml/itemProps61.xml><?xml version="1.0" encoding="utf-8"?>
+<ds:datastoreItem xmlns:ds="http://schemas.openxmlformats.org/officeDocument/2006/customXml" ds:itemID="{C1BF2448-6CBA-44DB-9E22-BED59BA834DF}">
+  <ds:schemaRefs>
+    <ds:schemaRef ds:uri="ESRI.ArcGIS.Mapping.OfficeIntegration.PowerPointInfo"/>
+  </ds:schemaRefs>
+</ds:datastoreItem>
+</file>
+
+<file path=customXml/itemProps62.xml><?xml version="1.0" encoding="utf-8"?>
+<ds:datastoreItem xmlns:ds="http://schemas.openxmlformats.org/officeDocument/2006/customXml" ds:itemID="{352E5095-9B98-4AF0-9861-BDC020ABBCFC}">
+  <ds:schemaRefs>
+    <ds:schemaRef ds:uri="ESRI.ArcGIS.Mapping.OfficeIntegration.PowerPointInfo"/>
+  </ds:schemaRefs>
+</ds:datastoreItem>
+</file>
+
+<file path=customXml/itemProps63.xml><?xml version="1.0" encoding="utf-8"?>
+<ds:datastoreItem xmlns:ds="http://schemas.openxmlformats.org/officeDocument/2006/customXml" ds:itemID="{C4AF463C-FA8B-436D-9853-3318650FDAB8}">
+  <ds:schemaRefs>
+    <ds:schemaRef ds:uri="ESRI.ArcGIS.Mapping.OfficeIntegration.PowerPointInfo"/>
+  </ds:schemaRefs>
+</ds:datastoreItem>
+</file>
+
+<file path=customXml/itemProps64.xml><?xml version="1.0" encoding="utf-8"?>
+<ds:datastoreItem xmlns:ds="http://schemas.openxmlformats.org/officeDocument/2006/customXml" ds:itemID="{2FE51124-E413-4DA5-9E06-A6EB32D0C127}">
+  <ds:schemaRefs>
+    <ds:schemaRef ds:uri="ESRI.ArcGIS.Mapping.OfficeIntegration.PowerPointInfo"/>
+  </ds:schemaRefs>
+</ds:datastoreItem>
+</file>
+
+<file path=customXml/itemProps65.xml><?xml version="1.0" encoding="utf-8"?>
+<ds:datastoreItem xmlns:ds="http://schemas.openxmlformats.org/officeDocument/2006/customXml" ds:itemID="{71658D62-F010-45F1-9326-EDC465FED48E}">
+  <ds:schemaRefs>
+    <ds:schemaRef ds:uri="ESRI.ArcGIS.Mapping.OfficeIntegration.PowerPointInfo"/>
+  </ds:schemaRefs>
+</ds:datastoreItem>
+</file>
+
+<file path=customXml/itemProps66.xml><?xml version="1.0" encoding="utf-8"?>
+<ds:datastoreItem xmlns:ds="http://schemas.openxmlformats.org/officeDocument/2006/customXml" ds:itemID="{2C9ABD96-756D-41D3-909F-6F7B4C6B6E1F}">
+  <ds:schemaRefs>
+    <ds:schemaRef ds:uri="ESRI.ArcGIS.Mapping.OfficeIntegration.PowerPointInfo"/>
+  </ds:schemaRefs>
+</ds:datastoreItem>
+</file>
+
+<file path=customXml/itemProps67.xml><?xml version="1.0" encoding="utf-8"?>
+<ds:datastoreItem xmlns:ds="http://schemas.openxmlformats.org/officeDocument/2006/customXml" ds:itemID="{DE4ACD9E-0233-451D-890D-5732E05DB574}">
+  <ds:schemaRefs>
+    <ds:schemaRef ds:uri="ESRI.ArcGIS.Mapping.OfficeIntegration.PowerPointInfo"/>
+  </ds:schemaRefs>
+</ds:datastoreItem>
+</file>
+
+<file path=customXml/itemProps68.xml><?xml version="1.0" encoding="utf-8"?>
+<ds:datastoreItem xmlns:ds="http://schemas.openxmlformats.org/officeDocument/2006/customXml" ds:itemID="{8EED6C1C-A455-42E4-8CBE-649F5A755068}">
+  <ds:schemaRefs>
+    <ds:schemaRef ds:uri="ESRI.ArcGIS.Mapping.OfficeIntegration.PowerPointInfo"/>
+  </ds:schemaRefs>
+</ds:datastoreItem>
+</file>
+
+<file path=customXml/itemProps7.xml><?xml version="1.0" encoding="utf-8"?>
 <ds:datastoreItem xmlns:ds="http://schemas.openxmlformats.org/officeDocument/2006/customXml" ds:itemID="{EE9F405B-FE7A-4AB8-9CB8-9A75FBA69A95}">
   <ds:schemaRefs>
     <ds:schemaRef ds:uri="ESRI.ArcGIS.Mapping.OfficeIntegration.PowerPointInfo"/>
@@ -9524,31 +9804,7 @@
 </ds:datastoreItem>
 </file>
 
-<file path=customXml/itemProps48.xml><?xml version="1.0" encoding="utf-8"?>
-<ds:datastoreItem xmlns:ds="http://schemas.openxmlformats.org/officeDocument/2006/customXml" ds:itemID="{A2D97EB6-C9B5-45C6-85A6-D4FE6E1D9856}">
-  <ds:schemaRefs>
-    <ds:schemaRef ds:uri="ESRI.ArcGIS.Mapping.OfficeIntegration.PowerPointInfo"/>
-  </ds:schemaRefs>
-</ds:datastoreItem>
-</file>
-
-<file path=customXml/itemProps49.xml><?xml version="1.0" encoding="utf-8"?>
-<ds:datastoreItem xmlns:ds="http://schemas.openxmlformats.org/officeDocument/2006/customXml" ds:itemID="{2C9ABD96-756D-41D3-909F-6F7B4C6B6E1F}">
-  <ds:schemaRefs>
-    <ds:schemaRef ds:uri="ESRI.ArcGIS.Mapping.OfficeIntegration.PowerPointInfo"/>
-  </ds:schemaRefs>
-</ds:datastoreItem>
-</file>
-
-<file path=customXml/itemProps5.xml><?xml version="1.0" encoding="utf-8"?>
-<ds:datastoreItem xmlns:ds="http://schemas.openxmlformats.org/officeDocument/2006/customXml" ds:itemID="{86B5FFB5-BF2F-45EA-BC75-C41726A8F251}">
-  <ds:schemaRefs>
-    <ds:schemaRef ds:uri="ESRI.ArcGIS.Mapping.OfficeIntegration.PowerPointInfo"/>
-  </ds:schemaRefs>
-</ds:datastoreItem>
-</file>
-
-<file path=customXml/itemProps50.xml><?xml version="1.0" encoding="utf-8"?>
+<file path=customXml/itemProps8.xml><?xml version="1.0" encoding="utf-8"?>
 <ds:datastoreItem xmlns:ds="http://schemas.openxmlformats.org/officeDocument/2006/customXml" ds:itemID="{AB25B40B-929A-4CD0-B9AB-7142442027B6}">
   <ds:schemaRefs>
     <ds:schemaRef ds:uri="ESRI.ArcGIS.Mapping.OfficeIntegration.PowerPointInfo"/>
@@ -9556,178 +9812,10 @@
 </ds:datastoreItem>
 </file>
 
-<file path=customXml/itemProps51.xml><?xml version="1.0" encoding="utf-8"?>
-<ds:datastoreItem xmlns:ds="http://schemas.openxmlformats.org/officeDocument/2006/customXml" ds:itemID="{94844715-80D4-4BDB-8DF0-52D9314E2485}">
-  <ds:schemaRefs>
-    <ds:schemaRef ds:uri="ESRI.ArcGIS.Mapping.OfficeIntegration.PowerPointInfo"/>
-  </ds:schemaRefs>
-</ds:datastoreItem>
-</file>
-
-<file path=customXml/itemProps52.xml><?xml version="1.0" encoding="utf-8"?>
-<ds:datastoreItem xmlns:ds="http://schemas.openxmlformats.org/officeDocument/2006/customXml" ds:itemID="{55235559-86B9-428B-8DAF-8EE6262226D5}">
-  <ds:schemaRefs>
-    <ds:schemaRef ds:uri="ESRI.ArcGIS.Mapping.OfficeIntegration.PowerPointInfo"/>
-  </ds:schemaRefs>
-</ds:datastoreItem>
-</file>
-
-<file path=customXml/itemProps53.xml><?xml version="1.0" encoding="utf-8"?>
-<ds:datastoreItem xmlns:ds="http://schemas.openxmlformats.org/officeDocument/2006/customXml" ds:itemID="{33F5FE6F-FF86-471A-919E-6C74E3669390}">
-  <ds:schemaRefs>
-    <ds:schemaRef ds:uri="ESRI.ArcGIS.Mapping.OfficeIntegration.PowerPointInfo"/>
-  </ds:schemaRefs>
-</ds:datastoreItem>
-</file>
-
-<file path=customXml/itemProps54.xml><?xml version="1.0" encoding="utf-8"?>
-<ds:datastoreItem xmlns:ds="http://schemas.openxmlformats.org/officeDocument/2006/customXml" ds:itemID="{22A42D4B-0AAE-44C9-A2EF-48BDE1C5260A}">
-  <ds:schemaRefs>
-    <ds:schemaRef ds:uri="ESRI.ArcGIS.Mapping.OfficeIntegration.PowerPointInfo"/>
-  </ds:schemaRefs>
-</ds:datastoreItem>
-</file>
-
-<file path=customXml/itemProps55.xml><?xml version="1.0" encoding="utf-8"?>
+<file path=customXml/itemProps9.xml><?xml version="1.0" encoding="utf-8"?>
 <ds:datastoreItem xmlns:ds="http://schemas.openxmlformats.org/officeDocument/2006/customXml" ds:itemID="{6D2D132B-596B-4D69-A43B-566EB6C10C03}">
   <ds:schemaRefs>
     <ds:schemaRef ds:uri="ESRI.ArcGIS.Mapping.OfficeIntegration.PowerPointInfo"/>
   </ds:schemaRefs>
 </ds:datastoreItem>
-</file>
-
-<file path=customXml/itemProps56.xml><?xml version="1.0" encoding="utf-8"?>
-<ds:datastoreItem xmlns:ds="http://schemas.openxmlformats.org/officeDocument/2006/customXml" ds:itemID="{EB8D7141-3508-4B4E-8051-37E3E4C09D17}">
-  <ds:schemaRefs>
-    <ds:schemaRef ds:uri="ESRI.ArcGIS.Mapping.OfficeIntegration.PowerPointInfo"/>
-  </ds:schemaRefs>
-</ds:datastoreItem>
-</file>
-
-<file path=customXml/itemProps57.xml><?xml version="1.0" encoding="utf-8"?>
-<ds:datastoreItem xmlns:ds="http://schemas.openxmlformats.org/officeDocument/2006/customXml" ds:itemID="{DE4ACD9E-0233-451D-890D-5732E05DB574}">
-  <ds:schemaRefs>
-    <ds:schemaRef ds:uri="ESRI.ArcGIS.Mapping.OfficeIntegration.PowerPointInfo"/>
-  </ds:schemaRefs>
-</ds:datastoreItem>
-</file>
-
-<file path=customXml/itemProps58.xml><?xml version="1.0" encoding="utf-8"?>
-<ds:datastoreItem xmlns:ds="http://schemas.openxmlformats.org/officeDocument/2006/customXml" ds:itemID="{7147CA22-2BC4-4917-83D2-7CA4C34A80D4}">
-  <ds:schemaRefs>
-    <ds:schemaRef ds:uri="ESRI.ArcGIS.Mapping.OfficeIntegration.PowerPointInfo"/>
-  </ds:schemaRefs>
-</ds:datastoreItem>
-</file>
-
-<file path=customXml/itemProps59.xml><?xml version="1.0" encoding="utf-8"?>
-<ds:datastoreItem xmlns:ds="http://schemas.openxmlformats.org/officeDocument/2006/customXml" ds:itemID="{3E253610-1BBE-4C16-A1DA-4D6F07A3A74E}">
-  <ds:schemaRefs>
-    <ds:schemaRef ds:uri="ESRI.ArcGIS.Mapping.OfficeIntegration.PowerPointInfo"/>
-  </ds:schemaRefs>
-</ds:datastoreItem>
-</file>
-
-<file path=customXml/itemProps6.xml><?xml version="1.0" encoding="utf-8"?>
-<ds:datastoreItem xmlns:ds="http://schemas.openxmlformats.org/officeDocument/2006/customXml" ds:itemID="{C1BF2448-6CBA-44DB-9E22-BED59BA834DF}">
-  <ds:schemaRefs>
-    <ds:schemaRef ds:uri="ESRI.ArcGIS.Mapping.OfficeIntegration.PowerPointInfo"/>
-  </ds:schemaRefs>
-</ds:datastoreItem>
-</file>
-
-<file path=customXml/itemProps60.xml><?xml version="1.0" encoding="utf-8"?>
-<ds:datastoreItem xmlns:ds="http://schemas.openxmlformats.org/officeDocument/2006/customXml" ds:itemID="{F29452FE-972E-43F8-B54C-969F4C69C00B}">
-  <ds:schemaRefs>
-    <ds:schemaRef ds:uri="ESRI.ArcGIS.Mapping.OfficeIntegration.PowerPointInfo"/>
-  </ds:schemaRefs>
-</ds:datastoreItem>
-</file>
-
-<file path=customXml/itemProps61.xml><?xml version="1.0" encoding="utf-8"?>
-<ds:datastoreItem xmlns:ds="http://schemas.openxmlformats.org/officeDocument/2006/customXml" ds:itemID="{7684026F-E81F-4167-824A-3AA1BAEAE133}">
-  <ds:schemaRefs>
-    <ds:schemaRef ds:uri="ESRI.ArcGIS.Mapping.OfficeIntegration.PowerPointInfo"/>
-  </ds:schemaRefs>
-</ds:datastoreItem>
-</file>
-
-<file path=customXml/itemProps62.xml><?xml version="1.0" encoding="utf-8"?>
-<ds:datastoreItem xmlns:ds="http://schemas.openxmlformats.org/officeDocument/2006/customXml" ds:itemID="{E47732B9-9C1B-4723-B4AA-A21238C5DF44}">
-  <ds:schemaRefs>
-    <ds:schemaRef ds:uri="ESRI.ArcGIS.Mapping.OfficeIntegration.PowerPointInfo"/>
-  </ds:schemaRefs>
-</ds:datastoreItem>
-</file>
-
-<file path=customXml/itemProps63.xml><?xml version="1.0" encoding="utf-8"?>
-<ds:datastoreItem xmlns:ds="http://schemas.openxmlformats.org/officeDocument/2006/customXml" ds:itemID="{18DF8D07-6137-4D85-8010-4650942E033A}">
-  <ds:schemaRefs>
-    <ds:schemaRef ds:uri="ESRI.ArcGIS.Mapping.OfficeIntegration.PowerPointInfo"/>
-  </ds:schemaRefs>
-</ds:datastoreItem>
-</file>
-
-<file path=customXml/itemProps64.xml><?xml version="1.0" encoding="utf-8"?>
-<ds:datastoreItem xmlns:ds="http://schemas.openxmlformats.org/officeDocument/2006/customXml" ds:itemID="{DB399249-DB96-4601-9BA5-97791613CF3A}">
-  <ds:schemaRefs>
-    <ds:schemaRef ds:uri="ESRI.ArcGIS.Mapping.OfficeIntegration.PowerPointInfo"/>
-  </ds:schemaRefs>
-</ds:datastoreItem>
-</file>
-
-<file path=customXml/itemProps65.xml><?xml version="1.0" encoding="utf-8"?>
-<ds:datastoreItem xmlns:ds="http://schemas.openxmlformats.org/officeDocument/2006/customXml" ds:itemID="{3A5DA3C3-46A0-47F8-855A-99C7684A98A2}">
-  <ds:schemaRefs>
-    <ds:schemaRef ds:uri="ESRI.ArcGIS.Mapping.OfficeIntegration.PowerPointInfo"/>
-  </ds:schemaRefs>
-</ds:datastoreItem>
-</file>
-
-<file path=customXml/itemProps66.xml><?xml version="1.0" encoding="utf-8"?>
-<ds:datastoreItem xmlns:ds="http://schemas.openxmlformats.org/officeDocument/2006/customXml" ds:itemID="{FB58F897-2A4D-4309-8E20-83FD28E6FE27}">
-  <ds:schemaRefs>
-    <ds:schemaRef ds:uri="ESRI.ArcGIS.Mapping.OfficeIntegration.PowerPointInfo"/>
-  </ds:schemaRefs>
-</ds:datastoreItem>
-</file>
-
-<file path=customXml/itemProps67.xml><?xml version="1.0" encoding="utf-8"?>
-<ds:datastoreItem xmlns:ds="http://schemas.openxmlformats.org/officeDocument/2006/customXml" ds:itemID="{D6F15B81-7660-4E9F-B613-8AA4F84B6DA3}">
-  <ds:schemaRefs>
-    <ds:schemaRef ds:uri="ESRI.ArcGIS.Mapping.OfficeIntegration.PowerPointInfo"/>
-  </ds:schemaRefs>
-</ds:datastoreItem>
-</file>
-
-<file path=customXml/itemProps68.xml><?xml version="1.0" encoding="utf-8"?>
-<ds:datastoreItem xmlns:ds="http://schemas.openxmlformats.org/officeDocument/2006/customXml" ds:itemID="{C9037CA3-5499-457D-8238-F29CBEBDF143}">
-  <ds:schemaRefs>
-    <ds:schemaRef ds:uri="ESRI.ArcGIS.Mapping.OfficeIntegration.PowerPointInfo"/>
-  </ds:schemaRefs>
-</ds:datastoreItem>
-</file>
-
-<file path=customXml/itemProps7.xml><?xml version="1.0" encoding="utf-8"?>
-<ds:datastoreItem xmlns:ds="http://schemas.openxmlformats.org/officeDocument/2006/customXml" ds:itemID="{D4E2A01F-BEC1-4558-9AD1-A87ED70D910B}">
-  <ds:schemaRefs>
-    <ds:schemaRef ds:uri="ESRI.ArcGIS.Mapping.OfficeIntegration.PowerPointInfo"/>
-  </ds:schemaRefs>
-</ds:datastoreItem>
-</file>
-
-<file path=customXml/itemProps8.xml><?xml version="1.0" encoding="utf-8"?>
-<ds:datastoreItem xmlns:ds="http://schemas.openxmlformats.org/officeDocument/2006/customXml" ds:itemID="{905F88FE-324F-4FBE-89BB-9CEE04D6CACF}">
-  <ds:schemaRefs>
-    <ds:schemaRef ds:uri="ESRI.ArcGIS.Mapping.OfficeIntegration.PowerPointInfo"/>
-  </ds:schemaRefs>
-</ds:datastoreItem>
-</file>
-
-<file path=customXml/itemProps9.xml><?xml version="1.0" encoding="utf-8"?>
-<ds:datastoreItem xmlns:ds="http://schemas.openxmlformats.org/officeDocument/2006/customXml" ds:itemID="{4ADFB689-BC87-4869-ADD0-8C3555150450}">
-  <ds:schemaRefs>
-    <ds:schemaRef ds:uri="ESRI.ArcGIS.Mapping.OfficeIntegration.PowerPointInfo"/>
-  </ds:schemaRefs>
-</ds:datastoreItem>
 </file>
</xml_diff>

<commit_message>
added custom date range globalization example
</commit_message>
<xml_diff>
--- a/LINQPad.pptx
+++ b/LINQPad.pptx
@@ -7033,8 +7033,12 @@
           <a:lstStyle/>
           <a:p>
             <a:r>
+              <a:rPr lang="en-US" sz="5400" dirty="0" smtClean="0"/>
+              <a:t>Debugging </a:t>
+            </a:r>
+            <a:r>
               <a:rPr lang="en-US" sz="5400" dirty="0"/>
-              <a:t>Debugging with </a:t>
+              <a:t>with </a:t>
             </a:r>
             <a:r>
               <a:rPr lang="en-US" sz="5400" dirty="0" err="1" smtClean="0"/>
@@ -7170,15 +7174,23 @@
           <a:p>
             <a:r>
               <a:rPr lang="en-US" sz="3200" dirty="0" smtClean="0"/>
-              <a:t>A .NET code Snippet </a:t>
+              <a:t>A .NET Snippet </a:t>
             </a:r>
             <a:r>
               <a:rPr lang="en-US" sz="3200" dirty="0"/>
-              <a:t>C</a:t>
+              <a:t>c</a:t>
             </a:r>
             <a:r>
               <a:rPr lang="en-US" sz="3200" dirty="0" smtClean="0"/>
-              <a:t>entric Code editor</a:t>
+              <a:t>entric </a:t>
+            </a:r>
+            <a:r>
+              <a:rPr lang="en-US" sz="3200" dirty="0"/>
+              <a:t>c</a:t>
+            </a:r>
+            <a:r>
+              <a:rPr lang="en-US" sz="3200" dirty="0" smtClean="0"/>
+              <a:t>ode editor</a:t>
             </a:r>
           </a:p>
           <a:p>
@@ -7195,10 +7207,9 @@
               <a:t>Has a built-in NUGET Package </a:t>
             </a:r>
             <a:r>
-              <a:rPr lang="en-US" sz="2800" dirty="0" err="1" smtClean="0"/>
-              <a:t>manageere</a:t>
-            </a:r>
-            <a:endParaRPr lang="en-US" sz="2800" dirty="0" smtClean="0"/>
+              <a:rPr lang="en-US" sz="2800" dirty="0" smtClean="0"/>
+              <a:t>manager</a:t>
+            </a:r>
           </a:p>
           <a:p>
             <a:r>
@@ -7604,7 +7615,7 @@
           <a:p>
             <a:r>
               <a:rPr lang="en-US" dirty="0" smtClean="0"/>
-              <a:t>Slides and samples</a:t>
+              <a:t>Resources</a:t>
             </a:r>
             <a:endParaRPr lang="en-US" dirty="0"/>
           </a:p>
@@ -7626,9 +7637,73 @@
           <a:lstStyle/>
           <a:p>
             <a:r>
-              <a:rPr lang="en-US" sz="3600" dirty="0"/>
-              <a:t>http://tinyurl.com/LINQPad</a:t>
-            </a:r>
+              <a:rPr lang="en-US" sz="3600" dirty="0" smtClean="0"/>
+              <a:t>This Presentation: </a:t>
+            </a:r>
+            <a:r>
+              <a:rPr lang="en-US" sz="3600" dirty="0" smtClean="0">
+                <a:hlinkClick r:id="rId2"/>
+              </a:rPr>
+              <a:t>http</a:t>
+            </a:r>
+            <a:r>
+              <a:rPr lang="en-US" sz="3600" dirty="0">
+                <a:hlinkClick r:id="rId2"/>
+              </a:rPr>
+              <a:t>://</a:t>
+            </a:r>
+            <a:r>
+              <a:rPr lang="en-US" sz="3600" dirty="0" smtClean="0">
+                <a:hlinkClick r:id="rId2"/>
+              </a:rPr>
+              <a:t>tinyurl.com/LINQPad</a:t>
+            </a:r>
+            <a:endParaRPr lang="en-US" sz="3600" dirty="0" smtClean="0"/>
+          </a:p>
+          <a:p>
+            <a:r>
+              <a:rPr lang="en-US" sz="3600" dirty="0" smtClean="0"/>
+              <a:t>Intro to </a:t>
+            </a:r>
+            <a:r>
+              <a:rPr lang="en-US" sz="3600" dirty="0" err="1" smtClean="0"/>
+              <a:t>LINQPad</a:t>
+            </a:r>
+            <a:r>
+              <a:rPr lang="en-US" sz="3600" dirty="0" smtClean="0"/>
+              <a:t> </a:t>
+            </a:r>
+            <a:r>
+              <a:rPr lang="en-US" sz="3600" smtClean="0"/>
+              <a:t>Video by </a:t>
+            </a:r>
+            <a:r>
+              <a:rPr lang="en-US" sz="3600" dirty="0" smtClean="0"/>
+              <a:t>its creator </a:t>
+            </a:r>
+            <a:r>
+              <a:rPr lang="en-US" sz="3600" dirty="0" smtClean="0">
+                <a:hlinkClick r:id="rId3"/>
+              </a:rPr>
+              <a:t>http</a:t>
+            </a:r>
+            <a:r>
+              <a:rPr lang="en-US" sz="3600" dirty="0">
+                <a:hlinkClick r:id="rId3"/>
+              </a:rPr>
+              <a:t>://</a:t>
+            </a:r>
+            <a:r>
+              <a:rPr lang="en-US" sz="3600" dirty="0" smtClean="0">
+                <a:hlinkClick r:id="rId3"/>
+              </a:rPr>
+              <a:t>www.oreilly.com/pub/e/909</a:t>
+            </a:r>
+            <a:r>
+              <a:rPr lang="en-US" sz="3600" dirty="0" smtClean="0"/>
+              <a:t> </a:t>
+            </a:r>
+            <a:endParaRPr lang="en-US" sz="3600" dirty="0"/>
           </a:p>
           <a:p>
             <a:pPr marL="0" indent="0">
@@ -7670,6 +7745,13 @@
   <p:transition spd="med">
     <p:fade/>
   </p:transition>
+  <p:timing>
+    <p:tnLst>
+      <p:par>
+        <p:cTn id="1" dur="indefinite" restart="never" nodeType="tmRoot"/>
+      </p:par>
+    </p:tnLst>
+  </p:timing>
 </p:sld>
 </file>
 
@@ -7703,6 +7785,13 @@
   <p:transition spd="med">
     <p:fade/>
   </p:transition>
+  <p:timing>
+    <p:tnLst>
+      <p:par>
+        <p:cTn id="1" dur="indefinite" restart="never" nodeType="tmRoot"/>
+      </p:par>
+    </p:tnLst>
+  </p:timing>
 </p:sld>
 </file>
 
@@ -8724,6 +8813,358 @@
 </file>
 
 <file path=customXml/item19.xml><?xml version="1.0" encoding="utf-8"?>
+<EsriMapsInfo xmlns="ESRI.ArcGIS.Mapping.OfficeIntegration.PowerPointInfo">
+  <Version>Version1</Version>
+  <RequiresSignIn>False</RequiresSignIn>
+</EsriMapsInfo>
+</file>
+
+<file path=customXml/item2.xml><?xml version="1.0" encoding="utf-8"?>
+<EsriMapsInfo xmlns="ESRI.ArcGIS.Mapping.OfficeIntegration.PowerPointInfo">
+  <Version>Version1</Version>
+  <RequiresSignIn>False</RequiresSignIn>
+</EsriMapsInfo>
+</file>
+
+<file path=customXml/item20.xml><?xml version="1.0" encoding="utf-8"?>
+<EsriMapsInfo xmlns="ESRI.ArcGIS.Mapping.OfficeIntegration.PowerPointInfo">
+  <Version>Version1</Version>
+  <RequiresSignIn>False</RequiresSignIn>
+</EsriMapsInfo>
+</file>
+
+<file path=customXml/item21.xml><?xml version="1.0" encoding="utf-8"?>
+<EsriMapsInfo xmlns="ESRI.ArcGIS.Mapping.OfficeIntegration.PowerPointInfo">
+  <Version>Version1</Version>
+  <RequiresSignIn>False</RequiresSignIn>
+</EsriMapsInfo>
+</file>
+
+<file path=customXml/item22.xml><?xml version="1.0" encoding="utf-8"?>
+<EsriMapsInfo xmlns="ESRI.ArcGIS.Mapping.OfficeIntegration.PowerPointInfo">
+  <Version>Version1</Version>
+  <RequiresSignIn>False</RequiresSignIn>
+</EsriMapsInfo>
+</file>
+
+<file path=customXml/item23.xml><?xml version="1.0" encoding="utf-8"?>
+<EsriMapsInfo xmlns="ESRI.ArcGIS.Mapping.OfficeIntegration.PowerPointInfo">
+  <Version>Version1</Version>
+  <RequiresSignIn>False</RequiresSignIn>
+</EsriMapsInfo>
+</file>
+
+<file path=customXml/item24.xml><?xml version="1.0" encoding="utf-8"?>
+<EsriMapsInfo xmlns="ESRI.ArcGIS.Mapping.OfficeIntegration.PowerPointInfo">
+  <Version>Version1</Version>
+  <RequiresSignIn>False</RequiresSignIn>
+</EsriMapsInfo>
+</file>
+
+<file path=customXml/item25.xml><?xml version="1.0" encoding="utf-8"?>
+<EsriMapsInfo xmlns="ESRI.ArcGIS.Mapping.OfficeIntegration.PowerPointInfo">
+  <Version>Version1</Version>
+  <RequiresSignIn>False</RequiresSignIn>
+</EsriMapsInfo>
+</file>
+
+<file path=customXml/item26.xml><?xml version="1.0" encoding="utf-8"?>
+<EsriMapsInfo xmlns="ESRI.ArcGIS.Mapping.OfficeIntegration.PowerPointInfo">
+  <Version>Version1</Version>
+  <RequiresSignIn>False</RequiresSignIn>
+</EsriMapsInfo>
+</file>
+
+<file path=customXml/item27.xml><?xml version="1.0" encoding="utf-8"?>
+<EsriMapsInfo xmlns="ESRI.ArcGIS.Mapping.OfficeIntegration.PowerPointInfo">
+  <Version>Version1</Version>
+  <RequiresSignIn>False</RequiresSignIn>
+</EsriMapsInfo>
+</file>
+
+<file path=customXml/item28.xml><?xml version="1.0" encoding="utf-8"?>
+<EsriMapsInfo xmlns="ESRI.ArcGIS.Mapping.OfficeIntegration.PowerPointInfo">
+  <Version>Version1</Version>
+  <RequiresSignIn>False</RequiresSignIn>
+</EsriMapsInfo>
+</file>
+
+<file path=customXml/item29.xml><?xml version="1.0" encoding="utf-8"?>
+<EsriMapsInfo xmlns="ESRI.ArcGIS.Mapping.OfficeIntegration.PowerPointInfo">
+  <Version>Version1</Version>
+  <RequiresSignIn>False</RequiresSignIn>
+</EsriMapsInfo>
+</file>
+
+<file path=customXml/item3.xml><?xml version="1.0" encoding="utf-8"?>
+<EsriMapsInfo xmlns="ESRI.ArcGIS.Mapping.OfficeIntegration.PowerPointInfo">
+  <Version>Version1</Version>
+  <RequiresSignIn>False</RequiresSignIn>
+</EsriMapsInfo>
+</file>
+
+<file path=customXml/item30.xml><?xml version="1.0" encoding="utf-8"?>
+<EsriMapsInfo xmlns="ESRI.ArcGIS.Mapping.OfficeIntegration.PowerPointInfo">
+  <Version>Version1</Version>
+  <RequiresSignIn>False</RequiresSignIn>
+</EsriMapsInfo>
+</file>
+
+<file path=customXml/item31.xml><?xml version="1.0" encoding="utf-8"?>
+<EsriMapsInfo xmlns="ESRI.ArcGIS.Mapping.OfficeIntegration.PowerPointInfo">
+  <Version>Version1</Version>
+  <RequiresSignIn>False</RequiresSignIn>
+</EsriMapsInfo>
+</file>
+
+<file path=customXml/item32.xml><?xml version="1.0" encoding="utf-8"?>
+<EsriMapsInfo xmlns="ESRI.ArcGIS.Mapping.OfficeIntegration.PowerPointInfo">
+  <Version>Version1</Version>
+  <RequiresSignIn>False</RequiresSignIn>
+</EsriMapsInfo>
+</file>
+
+<file path=customXml/item33.xml><?xml version="1.0" encoding="utf-8"?>
+<EsriMapsInfo xmlns="ESRI.ArcGIS.Mapping.OfficeIntegration.PowerPointInfo">
+  <Version>Version1</Version>
+  <RequiresSignIn>False</RequiresSignIn>
+</EsriMapsInfo>
+</file>
+
+<file path=customXml/item34.xml><?xml version="1.0" encoding="utf-8"?>
+<?mso-contentType ?>
+<FormTemplates xmlns="http://schemas.microsoft.com/sharepoint/v3/contenttype/forms">
+  <Display>DocumentLibraryForm</Display>
+  <Edit>DocumentLibraryForm</Edit>
+  <New>DocumentLibraryForm</New>
+</FormTemplates>
+</file>
+
+<file path=customXml/item35.xml><?xml version="1.0" encoding="utf-8"?>
+<EsriMapsInfo xmlns="ESRI.ArcGIS.Mapping.OfficeIntegration.PowerPointInfo">
+  <Version>Version1</Version>
+  <RequiresSignIn>False</RequiresSignIn>
+</EsriMapsInfo>
+</file>
+
+<file path=customXml/item36.xml><?xml version="1.0" encoding="utf-8"?>
+<EsriMapsInfo xmlns="ESRI.ArcGIS.Mapping.OfficeIntegration.PowerPointInfo">
+  <Version>Version1</Version>
+  <RequiresSignIn>False</RequiresSignIn>
+</EsriMapsInfo>
+</file>
+
+<file path=customXml/item37.xml><?xml version="1.0" encoding="utf-8"?>
+<EsriMapsInfo xmlns="ESRI.ArcGIS.Mapping.OfficeIntegration.PowerPointInfo">
+  <Version>Version1</Version>
+  <RequiresSignIn>False</RequiresSignIn>
+</EsriMapsInfo>
+</file>
+
+<file path=customXml/item38.xml><?xml version="1.0" encoding="utf-8"?>
+<EsriMapsInfo xmlns="ESRI.ArcGIS.Mapping.OfficeIntegration.PowerPointInfo">
+  <Version>Version1</Version>
+  <RequiresSignIn>False</RequiresSignIn>
+</EsriMapsInfo>
+</file>
+
+<file path=customXml/item39.xml><?xml version="1.0" encoding="utf-8"?>
+<EsriMapsInfo xmlns="ESRI.ArcGIS.Mapping.OfficeIntegration.PowerPointInfo">
+  <Version>Version1</Version>
+  <RequiresSignIn>False</RequiresSignIn>
+</EsriMapsInfo>
+</file>
+
+<file path=customXml/item4.xml><?xml version="1.0" encoding="utf-8"?>
+<EsriMapsInfo xmlns="ESRI.ArcGIS.Mapping.OfficeIntegration.PowerPointInfo">
+  <Version>Version1</Version>
+  <RequiresSignIn>False</RequiresSignIn>
+</EsriMapsInfo>
+</file>
+
+<file path=customXml/item40.xml><?xml version="1.0" encoding="utf-8"?>
+<EsriMapsInfo xmlns="ESRI.ArcGIS.Mapping.OfficeIntegration.PowerPointInfo">
+  <Version>Version1</Version>
+  <RequiresSignIn>False</RequiresSignIn>
+</EsriMapsInfo>
+</file>
+
+<file path=customXml/item41.xml><?xml version="1.0" encoding="utf-8"?>
+<EsriMapsInfo xmlns="ESRI.ArcGIS.Mapping.OfficeIntegration.PowerPointInfo">
+  <Version>Version1</Version>
+  <RequiresSignIn>False</RequiresSignIn>
+</EsriMapsInfo>
+</file>
+
+<file path=customXml/item42.xml><?xml version="1.0" encoding="utf-8"?>
+<EsriMapsInfo xmlns="ESRI.ArcGIS.Mapping.OfficeIntegration.PowerPointInfo">
+  <Version>Version1</Version>
+  <RequiresSignIn>False</RequiresSignIn>
+</EsriMapsInfo>
+</file>
+
+<file path=customXml/item43.xml><?xml version="1.0" encoding="utf-8"?>
+<EsriMapsInfo xmlns="ESRI.ArcGIS.Mapping.OfficeIntegration.PowerPointInfo">
+  <Version>Version1</Version>
+  <RequiresSignIn>False</RequiresSignIn>
+</EsriMapsInfo>
+</file>
+
+<file path=customXml/item44.xml><?xml version="1.0" encoding="utf-8"?>
+<EsriMapsInfo xmlns="ESRI.ArcGIS.Mapping.OfficeIntegration.PowerPointInfo">
+  <Version>Version1</Version>
+  <RequiresSignIn>False</RequiresSignIn>
+</EsriMapsInfo>
+</file>
+
+<file path=customXml/item45.xml><?xml version="1.0" encoding="utf-8"?>
+<EsriMapsInfo xmlns="ESRI.ArcGIS.Mapping.OfficeIntegration.PowerPointInfo">
+  <Version>Version1</Version>
+  <RequiresSignIn>False</RequiresSignIn>
+</EsriMapsInfo>
+</file>
+
+<file path=customXml/item46.xml><?xml version="1.0" encoding="utf-8"?>
+<EsriMapsInfo xmlns="ESRI.ArcGIS.Mapping.OfficeIntegration.PowerPointInfo">
+  <Version>Version1</Version>
+  <RequiresSignIn>False</RequiresSignIn>
+</EsriMapsInfo>
+</file>
+
+<file path=customXml/item47.xml><?xml version="1.0" encoding="utf-8"?>
+<EsriMapsInfo xmlns="ESRI.ArcGIS.Mapping.OfficeIntegration.PowerPointInfo">
+  <Version>Version1</Version>
+  <RequiresSignIn>False</RequiresSignIn>
+</EsriMapsInfo>
+</file>
+
+<file path=customXml/item48.xml><?xml version="1.0" encoding="utf-8"?>
+<EsriMapsInfo xmlns="ESRI.ArcGIS.Mapping.OfficeIntegration.PowerPointInfo">
+  <Version>Version1</Version>
+  <RequiresSignIn>False</RequiresSignIn>
+</EsriMapsInfo>
+</file>
+
+<file path=customXml/item49.xml><?xml version="1.0" encoding="utf-8"?>
+<EsriMapsInfo xmlns="ESRI.ArcGIS.Mapping.OfficeIntegration.PowerPointInfo">
+  <Version>Version1</Version>
+  <RequiresSignIn>False</RequiresSignIn>
+</EsriMapsInfo>
+</file>
+
+<file path=customXml/item5.xml><?xml version="1.0" encoding="utf-8"?>
+<EsriMapsInfo xmlns="ESRI.ArcGIS.Mapping.OfficeIntegration.PowerPointInfo">
+  <Version>Version1</Version>
+  <RequiresSignIn>False</RequiresSignIn>
+</EsriMapsInfo>
+</file>
+
+<file path=customXml/item50.xml><?xml version="1.0" encoding="utf-8"?>
+<EsriMapsInfo xmlns="ESRI.ArcGIS.Mapping.OfficeIntegration.PowerPointInfo">
+  <Version>Version1</Version>
+  <RequiresSignIn>False</RequiresSignIn>
+</EsriMapsInfo>
+</file>
+
+<file path=customXml/item51.xml><?xml version="1.0" encoding="utf-8"?>
+<EsriMapsInfo xmlns="ESRI.ArcGIS.Mapping.OfficeIntegration.PowerPointInfo">
+  <Version>Version1</Version>
+  <RequiresSignIn>False</RequiresSignIn>
+</EsriMapsInfo>
+</file>
+
+<file path=customXml/item52.xml><?xml version="1.0" encoding="utf-8"?>
+<EsriMapsInfo xmlns="ESRI.ArcGIS.Mapping.OfficeIntegration.PowerPointInfo">
+  <Version>Version1</Version>
+  <RequiresSignIn>False</RequiresSignIn>
+</EsriMapsInfo>
+</file>
+
+<file path=customXml/item53.xml><?xml version="1.0" encoding="utf-8"?>
+<EsriMapsInfo xmlns="ESRI.ArcGIS.Mapping.OfficeIntegration.PowerPointInfo">
+  <Version>Version1</Version>
+  <RequiresSignIn>False</RequiresSignIn>
+</EsriMapsInfo>
+</file>
+
+<file path=customXml/item54.xml><?xml version="1.0" encoding="utf-8"?>
+<EsriMapsInfo xmlns="ESRI.ArcGIS.Mapping.OfficeIntegration.PowerPointInfo">
+  <Version>Version1</Version>
+  <RequiresSignIn>False</RequiresSignIn>
+</EsriMapsInfo>
+</file>
+
+<file path=customXml/item55.xml><?xml version="1.0" encoding="utf-8"?>
+<EsriMapsInfo xmlns="ESRI.ArcGIS.Mapping.OfficeIntegration.PowerPointInfo">
+  <Version>Version1</Version>
+  <RequiresSignIn>False</RequiresSignIn>
+</EsriMapsInfo>
+</file>
+
+<file path=customXml/item56.xml><?xml version="1.0" encoding="utf-8"?>
+<EsriMapsInfo xmlns="ESRI.ArcGIS.Mapping.OfficeIntegration.PowerPointInfo">
+  <Version>Version1</Version>
+  <RequiresSignIn>False</RequiresSignIn>
+</EsriMapsInfo>
+</file>
+
+<file path=customXml/item57.xml><?xml version="1.0" encoding="utf-8"?>
+<EsriMapsInfo xmlns="ESRI.ArcGIS.Mapping.OfficeIntegration.PowerPointInfo">
+  <Version>Version1</Version>
+  <RequiresSignIn>False</RequiresSignIn>
+</EsriMapsInfo>
+</file>
+
+<file path=customXml/item58.xml><?xml version="1.0" encoding="utf-8"?>
+<EsriMapsInfo xmlns="ESRI.ArcGIS.Mapping.OfficeIntegration.PowerPointInfo">
+  <Version>Version1</Version>
+  <RequiresSignIn>False</RequiresSignIn>
+</EsriMapsInfo>
+</file>
+
+<file path=customXml/item59.xml><?xml version="1.0" encoding="utf-8"?>
+<EsriMapsInfo xmlns="ESRI.ArcGIS.Mapping.OfficeIntegration.PowerPointInfo">
+  <Version>Version1</Version>
+  <RequiresSignIn>False</RequiresSignIn>
+</EsriMapsInfo>
+</file>
+
+<file path=customXml/item6.xml><?xml version="1.0" encoding="utf-8"?>
+<EsriMapsInfo xmlns="ESRI.ArcGIS.Mapping.OfficeIntegration.PowerPointInfo">
+  <Version>Version1</Version>
+  <RequiresSignIn>False</RequiresSignIn>
+</EsriMapsInfo>
+</file>
+
+<file path=customXml/item60.xml><?xml version="1.0" encoding="utf-8"?>
+<EsriMapsInfo xmlns="ESRI.ArcGIS.Mapping.OfficeIntegration.PowerPointInfo">
+  <Version>Version1</Version>
+  <RequiresSignIn>False</RequiresSignIn>
+</EsriMapsInfo>
+</file>
+
+<file path=customXml/item61.xml><?xml version="1.0" encoding="utf-8"?>
+<EsriMapsInfo xmlns="ESRI.ArcGIS.Mapping.OfficeIntegration.PowerPointInfo">
+  <Version>Version1</Version>
+  <RequiresSignIn>False</RequiresSignIn>
+</EsriMapsInfo>
+</file>
+
+<file path=customXml/item62.xml><?xml version="1.0" encoding="utf-8"?>
+<EsriMapsInfo xmlns="ESRI.ArcGIS.Mapping.OfficeIntegration.PowerPointInfo">
+  <Version>Version1</Version>
+  <RequiresSignIn>False</RequiresSignIn>
+</EsriMapsInfo>
+</file>
+
+<file path=customXml/item63.xml><?xml version="1.0" encoding="utf-8"?>
+<EsriMapsInfo xmlns="ESRI.ArcGIS.Mapping.OfficeIntegration.PowerPointInfo">
+  <Version>Version1</Version>
+  <RequiresSignIn>False</RequiresSignIn>
+</EsriMapsInfo>
+</file>
+
+<file path=customXml/item64.xml><?xml version="1.0" encoding="utf-8"?>
 <p:properties xmlns:p="http://schemas.microsoft.com/office/2006/metadata/properties" xmlns:xsi="http://www.w3.org/2001/XMLSchema-instance" xmlns:pc="http://schemas.microsoft.com/office/infopath/2007/PartnerControls">
   <documentManagement>
     <PublishingExpirationDate xmlns="http://schemas.microsoft.com/sharepoint/v3" xsi:nil="true"/>
@@ -8732,177 +9173,21 @@
 </p:properties>
 </file>
 
-<file path=customXml/item2.xml><?xml version="1.0" encoding="utf-8"?>
+<file path=customXml/item65.xml><?xml version="1.0" encoding="utf-8"?>
 <EsriMapsInfo xmlns="ESRI.ArcGIS.Mapping.OfficeIntegration.PowerPointInfo">
   <Version>Version1</Version>
   <RequiresSignIn>False</RequiresSignIn>
 </EsriMapsInfo>
 </file>
 
-<file path=customXml/item20.xml><?xml version="1.0" encoding="utf-8"?>
+<file path=customXml/item66.xml><?xml version="1.0" encoding="utf-8"?>
 <EsriMapsInfo xmlns="ESRI.ArcGIS.Mapping.OfficeIntegration.PowerPointInfo">
   <Version>Version1</Version>
   <RequiresSignIn>False</RequiresSignIn>
 </EsriMapsInfo>
 </file>
 
-<file path=customXml/item21.xml><?xml version="1.0" encoding="utf-8"?>
-<?mso-contentType ?>
-<FormTemplates xmlns="http://schemas.microsoft.com/sharepoint/v3/contenttype/forms">
-  <Display>DocumentLibraryForm</Display>
-  <Edit>DocumentLibraryForm</Edit>
-  <New>DocumentLibraryForm</New>
-</FormTemplates>
-</file>
-
-<file path=customXml/item22.xml><?xml version="1.0" encoding="utf-8"?>
-<EsriMapsInfo xmlns="ESRI.ArcGIS.Mapping.OfficeIntegration.PowerPointInfo">
-  <Version>Version1</Version>
-  <RequiresSignIn>False</RequiresSignIn>
-</EsriMapsInfo>
-</file>
-
-<file path=customXml/item23.xml><?xml version="1.0" encoding="utf-8"?>
-<EsriMapsInfo xmlns="ESRI.ArcGIS.Mapping.OfficeIntegration.PowerPointInfo">
-  <Version>Version1</Version>
-  <RequiresSignIn>False</RequiresSignIn>
-</EsriMapsInfo>
-</file>
-
-<file path=customXml/item24.xml><?xml version="1.0" encoding="utf-8"?>
-<EsriMapsInfo xmlns="ESRI.ArcGIS.Mapping.OfficeIntegration.PowerPointInfo">
-  <Version>Version1</Version>
-  <RequiresSignIn>False</RequiresSignIn>
-</EsriMapsInfo>
-</file>
-
-<file path=customXml/item25.xml><?xml version="1.0" encoding="utf-8"?>
-<EsriMapsInfo xmlns="ESRI.ArcGIS.Mapping.OfficeIntegration.PowerPointInfo">
-  <Version>Version1</Version>
-  <RequiresSignIn>False</RequiresSignIn>
-</EsriMapsInfo>
-</file>
-
-<file path=customXml/item26.xml><?xml version="1.0" encoding="utf-8"?>
-<EsriMapsInfo xmlns="ESRI.ArcGIS.Mapping.OfficeIntegration.PowerPointInfo">
-  <Version>Version1</Version>
-  <RequiresSignIn>False</RequiresSignIn>
-</EsriMapsInfo>
-</file>
-
-<file path=customXml/item27.xml><?xml version="1.0" encoding="utf-8"?>
-<EsriMapsInfo xmlns="ESRI.ArcGIS.Mapping.OfficeIntegration.PowerPointInfo">
-  <Version>Version1</Version>
-  <RequiresSignIn>False</RequiresSignIn>
-</EsriMapsInfo>
-</file>
-
-<file path=customXml/item28.xml><?xml version="1.0" encoding="utf-8"?>
-<EsriMapsInfo xmlns="ESRI.ArcGIS.Mapping.OfficeIntegration.PowerPointInfo">
-  <Version>Version1</Version>
-  <RequiresSignIn>False</RequiresSignIn>
-</EsriMapsInfo>
-</file>
-
-<file path=customXml/item29.xml><?xml version="1.0" encoding="utf-8"?>
-<EsriMapsInfo xmlns="ESRI.ArcGIS.Mapping.OfficeIntegration.PowerPointInfo">
-  <Version>Version1</Version>
-  <RequiresSignIn>False</RequiresSignIn>
-</EsriMapsInfo>
-</file>
-
-<file path=customXml/item3.xml><?xml version="1.0" encoding="utf-8"?>
-<EsriMapsInfo xmlns="ESRI.ArcGIS.Mapping.OfficeIntegration.PowerPointInfo">
-  <Version>Version1</Version>
-  <RequiresSignIn>False</RequiresSignIn>
-</EsriMapsInfo>
-</file>
-
-<file path=customXml/item30.xml><?xml version="1.0" encoding="utf-8"?>
-<EsriMapsInfo xmlns="ESRI.ArcGIS.Mapping.OfficeIntegration.PowerPointInfo">
-  <Version>Version1</Version>
-  <RequiresSignIn>False</RequiresSignIn>
-</EsriMapsInfo>
-</file>
-
-<file path=customXml/item31.xml><?xml version="1.0" encoding="utf-8"?>
-<EsriMapsInfo xmlns="ESRI.ArcGIS.Mapping.OfficeIntegration.PowerPointInfo">
-  <Version>Version1</Version>
-  <RequiresSignIn>False</RequiresSignIn>
-</EsriMapsInfo>
-</file>
-
-<file path=customXml/item32.xml><?xml version="1.0" encoding="utf-8"?>
-<EsriMapsInfo xmlns="ESRI.ArcGIS.Mapping.OfficeIntegration.PowerPointInfo">
-  <Version>Version1</Version>
-  <RequiresSignIn>False</RequiresSignIn>
-</EsriMapsInfo>
-</file>
-
-<file path=customXml/item33.xml><?xml version="1.0" encoding="utf-8"?>
-<EsriMapsInfo xmlns="ESRI.ArcGIS.Mapping.OfficeIntegration.PowerPointInfo">
-  <Version>Version1</Version>
-  <RequiresSignIn>False</RequiresSignIn>
-</EsriMapsInfo>
-</file>
-
-<file path=customXml/item34.xml><?xml version="1.0" encoding="utf-8"?>
-<EsriMapsInfo xmlns="ESRI.ArcGIS.Mapping.OfficeIntegration.PowerPointInfo">
-  <Version>Version1</Version>
-  <RequiresSignIn>False</RequiresSignIn>
-</EsriMapsInfo>
-</file>
-
-<file path=customXml/item35.xml><?xml version="1.0" encoding="utf-8"?>
-<EsriMapsInfo xmlns="ESRI.ArcGIS.Mapping.OfficeIntegration.PowerPointInfo">
-  <Version>Version1</Version>
-  <RequiresSignIn>False</RequiresSignIn>
-</EsriMapsInfo>
-</file>
-
-<file path=customXml/item36.xml><?xml version="1.0" encoding="utf-8"?>
-<EsriMapsInfo xmlns="ESRI.ArcGIS.Mapping.OfficeIntegration.PowerPointInfo">
-  <Version>Version1</Version>
-  <RequiresSignIn>False</RequiresSignIn>
-</EsriMapsInfo>
-</file>
-
-<file path=customXml/item37.xml><?xml version="1.0" encoding="utf-8"?>
-<EsriMapsInfo xmlns="ESRI.ArcGIS.Mapping.OfficeIntegration.PowerPointInfo">
-  <Version>Version1</Version>
-  <RequiresSignIn>False</RequiresSignIn>
-</EsriMapsInfo>
-</file>
-
-<file path=customXml/item38.xml><?xml version="1.0" encoding="utf-8"?>
-<EsriMapsInfo xmlns="ESRI.ArcGIS.Mapping.OfficeIntegration.PowerPointInfo">
-  <Version>Version1</Version>
-  <RequiresSignIn>False</RequiresSignIn>
-</EsriMapsInfo>
-</file>
-
-<file path=customXml/item39.xml><?xml version="1.0" encoding="utf-8"?>
-<EsriMapsInfo xmlns="ESRI.ArcGIS.Mapping.OfficeIntegration.PowerPointInfo">
-  <Version>Version1</Version>
-  <RequiresSignIn>False</RequiresSignIn>
-</EsriMapsInfo>
-</file>
-
-<file path=customXml/item4.xml><?xml version="1.0" encoding="utf-8"?>
-<EsriMapsInfo xmlns="ESRI.ArcGIS.Mapping.OfficeIntegration.PowerPointInfo">
-  <Version>Version1</Version>
-  <RequiresSignIn>False</RequiresSignIn>
-</EsriMapsInfo>
-</file>
-
-<file path=customXml/item40.xml><?xml version="1.0" encoding="utf-8"?>
-<EsriMapsInfo xmlns="ESRI.ArcGIS.Mapping.OfficeIntegration.PowerPointInfo">
-  <Version>Version1</Version>
-  <RequiresSignIn>False</RequiresSignIn>
-</EsriMapsInfo>
-</file>
-
-<file path=customXml/item41.xml><?xml version="1.0" encoding="utf-8"?>
+<file path=customXml/item67.xml><?xml version="1.0" encoding="utf-8"?>
 <ct:contentTypeSchema xmlns:ct="http://schemas.microsoft.com/office/2006/metadata/contentType" xmlns:ma="http://schemas.microsoft.com/office/2006/metadata/properties/metaAttributes" ct:_="" ma:_="" ma:contentTypeName="Document" ma:contentTypeID="0x0101007CCB09B909685840A5AA5DC537182835" ma:contentTypeVersion="1" ma:contentTypeDescription="Create a new document." ma:contentTypeScope="" ma:versionID="647b6714bcbd012a02104274568241a2">
   <xsd:schema xmlns:xsd="http://www.w3.org/2001/XMLSchema" xmlns:xs="http://www.w3.org/2001/XMLSchema" xmlns:p="http://schemas.microsoft.com/office/2006/metadata/properties" xmlns:ns1="http://schemas.microsoft.com/sharepoint/v3" targetNamespace="http://schemas.microsoft.com/office/2006/metadata/properties" ma:root="true" ma:fieldsID="4dcce58c87e9fcebab8021569449a8d0" ns1:_="">
     <xsd:import namespace="http://schemas.microsoft.com/sharepoint/v3"/>
@@ -9034,202 +9319,6 @@
 </ct:contentTypeSchema>
 </file>
 
-<file path=customXml/item42.xml><?xml version="1.0" encoding="utf-8"?>
-<EsriMapsInfo xmlns="ESRI.ArcGIS.Mapping.OfficeIntegration.PowerPointInfo">
-  <Version>Version1</Version>
-  <RequiresSignIn>False</RequiresSignIn>
-</EsriMapsInfo>
-</file>
-
-<file path=customXml/item43.xml><?xml version="1.0" encoding="utf-8"?>
-<EsriMapsInfo xmlns="ESRI.ArcGIS.Mapping.OfficeIntegration.PowerPointInfo">
-  <Version>Version1</Version>
-  <RequiresSignIn>False</RequiresSignIn>
-</EsriMapsInfo>
-</file>
-
-<file path=customXml/item44.xml><?xml version="1.0" encoding="utf-8"?>
-<EsriMapsInfo xmlns="ESRI.ArcGIS.Mapping.OfficeIntegration.PowerPointInfo">
-  <Version>Version1</Version>
-  <RequiresSignIn>False</RequiresSignIn>
-</EsriMapsInfo>
-</file>
-
-<file path=customXml/item45.xml><?xml version="1.0" encoding="utf-8"?>
-<EsriMapsInfo xmlns="ESRI.ArcGIS.Mapping.OfficeIntegration.PowerPointInfo">
-  <Version>Version1</Version>
-  <RequiresSignIn>False</RequiresSignIn>
-</EsriMapsInfo>
-</file>
-
-<file path=customXml/item46.xml><?xml version="1.0" encoding="utf-8"?>
-<EsriMapsInfo xmlns="ESRI.ArcGIS.Mapping.OfficeIntegration.PowerPointInfo">
-  <Version>Version1</Version>
-  <RequiresSignIn>False</RequiresSignIn>
-</EsriMapsInfo>
-</file>
-
-<file path=customXml/item47.xml><?xml version="1.0" encoding="utf-8"?>
-<EsriMapsInfo xmlns="ESRI.ArcGIS.Mapping.OfficeIntegration.PowerPointInfo">
-  <Version>Version1</Version>
-  <RequiresSignIn>False</RequiresSignIn>
-</EsriMapsInfo>
-</file>
-
-<file path=customXml/item48.xml><?xml version="1.0" encoding="utf-8"?>
-<EsriMapsInfo xmlns="ESRI.ArcGIS.Mapping.OfficeIntegration.PowerPointInfo">
-  <Version>Version1</Version>
-  <RequiresSignIn>False</RequiresSignIn>
-</EsriMapsInfo>
-</file>
-
-<file path=customXml/item49.xml><?xml version="1.0" encoding="utf-8"?>
-<EsriMapsInfo xmlns="ESRI.ArcGIS.Mapping.OfficeIntegration.PowerPointInfo">
-  <Version>Version1</Version>
-  <RequiresSignIn>False</RequiresSignIn>
-</EsriMapsInfo>
-</file>
-
-<file path=customXml/item5.xml><?xml version="1.0" encoding="utf-8"?>
-<EsriMapsInfo xmlns="ESRI.ArcGIS.Mapping.OfficeIntegration.PowerPointInfo">
-  <Version>Version1</Version>
-  <RequiresSignIn>False</RequiresSignIn>
-</EsriMapsInfo>
-</file>
-
-<file path=customXml/item50.xml><?xml version="1.0" encoding="utf-8"?>
-<EsriMapsInfo xmlns="ESRI.ArcGIS.Mapping.OfficeIntegration.PowerPointInfo">
-  <Version>Version1</Version>
-  <RequiresSignIn>False</RequiresSignIn>
-</EsriMapsInfo>
-</file>
-
-<file path=customXml/item51.xml><?xml version="1.0" encoding="utf-8"?>
-<EsriMapsInfo xmlns="ESRI.ArcGIS.Mapping.OfficeIntegration.PowerPointInfo">
-  <Version>Version1</Version>
-  <RequiresSignIn>False</RequiresSignIn>
-</EsriMapsInfo>
-</file>
-
-<file path=customXml/item52.xml><?xml version="1.0" encoding="utf-8"?>
-<EsriMapsInfo xmlns="ESRI.ArcGIS.Mapping.OfficeIntegration.PowerPointInfo">
-  <Version>Version1</Version>
-  <RequiresSignIn>False</RequiresSignIn>
-</EsriMapsInfo>
-</file>
-
-<file path=customXml/item53.xml><?xml version="1.0" encoding="utf-8"?>
-<EsriMapsInfo xmlns="ESRI.ArcGIS.Mapping.OfficeIntegration.PowerPointInfo">
-  <Version>Version1</Version>
-  <RequiresSignIn>False</RequiresSignIn>
-</EsriMapsInfo>
-</file>
-
-<file path=customXml/item54.xml><?xml version="1.0" encoding="utf-8"?>
-<EsriMapsInfo xmlns="ESRI.ArcGIS.Mapping.OfficeIntegration.PowerPointInfo">
-  <Version>Version1</Version>
-  <RequiresSignIn>False</RequiresSignIn>
-</EsriMapsInfo>
-</file>
-
-<file path=customXml/item55.xml><?xml version="1.0" encoding="utf-8"?>
-<EsriMapsInfo xmlns="ESRI.ArcGIS.Mapping.OfficeIntegration.PowerPointInfo">
-  <Version>Version1</Version>
-  <RequiresSignIn>False</RequiresSignIn>
-</EsriMapsInfo>
-</file>
-
-<file path=customXml/item56.xml><?xml version="1.0" encoding="utf-8"?>
-<EsriMapsInfo xmlns="ESRI.ArcGIS.Mapping.OfficeIntegration.PowerPointInfo">
-  <Version>Version1</Version>
-  <RequiresSignIn>False</RequiresSignIn>
-</EsriMapsInfo>
-</file>
-
-<file path=customXml/item57.xml><?xml version="1.0" encoding="utf-8"?>
-<EsriMapsInfo xmlns="ESRI.ArcGIS.Mapping.OfficeIntegration.PowerPointInfo">
-  <Version>Version1</Version>
-  <RequiresSignIn>False</RequiresSignIn>
-</EsriMapsInfo>
-</file>
-
-<file path=customXml/item58.xml><?xml version="1.0" encoding="utf-8"?>
-<EsriMapsInfo xmlns="ESRI.ArcGIS.Mapping.OfficeIntegration.PowerPointInfo">
-  <Version>Version1</Version>
-  <RequiresSignIn>False</RequiresSignIn>
-</EsriMapsInfo>
-</file>
-
-<file path=customXml/item59.xml><?xml version="1.0" encoding="utf-8"?>
-<EsriMapsInfo xmlns="ESRI.ArcGIS.Mapping.OfficeIntegration.PowerPointInfo">
-  <Version>Version1</Version>
-  <RequiresSignIn>False</RequiresSignIn>
-</EsriMapsInfo>
-</file>
-
-<file path=customXml/item6.xml><?xml version="1.0" encoding="utf-8"?>
-<EsriMapsInfo xmlns="ESRI.ArcGIS.Mapping.OfficeIntegration.PowerPointInfo">
-  <Version>Version1</Version>
-  <RequiresSignIn>False</RequiresSignIn>
-</EsriMapsInfo>
-</file>
-
-<file path=customXml/item60.xml><?xml version="1.0" encoding="utf-8"?>
-<EsriMapsInfo xmlns="ESRI.ArcGIS.Mapping.OfficeIntegration.PowerPointInfo">
-  <Version>Version1</Version>
-  <RequiresSignIn>False</RequiresSignIn>
-</EsriMapsInfo>
-</file>
-
-<file path=customXml/item61.xml><?xml version="1.0" encoding="utf-8"?>
-<EsriMapsInfo xmlns="ESRI.ArcGIS.Mapping.OfficeIntegration.PowerPointInfo">
-  <Version>Version1</Version>
-  <RequiresSignIn>False</RequiresSignIn>
-</EsriMapsInfo>
-</file>
-
-<file path=customXml/item62.xml><?xml version="1.0" encoding="utf-8"?>
-<EsriMapsInfo xmlns="ESRI.ArcGIS.Mapping.OfficeIntegration.PowerPointInfo">
-  <Version>Version1</Version>
-  <RequiresSignIn>False</RequiresSignIn>
-</EsriMapsInfo>
-</file>
-
-<file path=customXml/item63.xml><?xml version="1.0" encoding="utf-8"?>
-<EsriMapsInfo xmlns="ESRI.ArcGIS.Mapping.OfficeIntegration.PowerPointInfo">
-  <Version>Version1</Version>
-  <RequiresSignIn>False</RequiresSignIn>
-</EsriMapsInfo>
-</file>
-
-<file path=customXml/item64.xml><?xml version="1.0" encoding="utf-8"?>
-<EsriMapsInfo xmlns="ESRI.ArcGIS.Mapping.OfficeIntegration.PowerPointInfo">
-  <Version>Version1</Version>
-  <RequiresSignIn>False</RequiresSignIn>
-</EsriMapsInfo>
-</file>
-
-<file path=customXml/item65.xml><?xml version="1.0" encoding="utf-8"?>
-<EsriMapsInfo xmlns="ESRI.ArcGIS.Mapping.OfficeIntegration.PowerPointInfo">
-  <Version>Version1</Version>
-  <RequiresSignIn>False</RequiresSignIn>
-</EsriMapsInfo>
-</file>
-
-<file path=customXml/item66.xml><?xml version="1.0" encoding="utf-8"?>
-<EsriMapsInfo xmlns="ESRI.ArcGIS.Mapping.OfficeIntegration.PowerPointInfo">
-  <Version>Version1</Version>
-  <RequiresSignIn>False</RequiresSignIn>
-</EsriMapsInfo>
-</file>
-
-<file path=customXml/item67.xml><?xml version="1.0" encoding="utf-8"?>
-<EsriMapsInfo xmlns="ESRI.ArcGIS.Mapping.OfficeIntegration.PowerPointInfo">
-  <Version>Version1</Version>
-  <RequiresSignIn>False</RequiresSignIn>
-</EsriMapsInfo>
-</file>
-
 <file path=customXml/item68.xml><?xml version="1.0" encoding="utf-8"?>
 <EsriMapsInfo xmlns="ESRI.ArcGIS.Mapping.OfficeIntegration.PowerPointInfo">
   <Version>Version1</Version>
@@ -9259,6 +9348,206 @@
 </file>
 
 <file path=customXml/itemProps1.xml><?xml version="1.0" encoding="utf-8"?>
+<ds:datastoreItem xmlns:ds="http://schemas.openxmlformats.org/officeDocument/2006/customXml" ds:itemID="{F29452FE-972E-43F8-B54C-969F4C69C00B}">
+  <ds:schemaRefs>
+    <ds:schemaRef ds:uri="ESRI.ArcGIS.Mapping.OfficeIntegration.PowerPointInfo"/>
+  </ds:schemaRefs>
+</ds:datastoreItem>
+</file>
+
+<file path=customXml/itemProps10.xml><?xml version="1.0" encoding="utf-8"?>
+<ds:datastoreItem xmlns:ds="http://schemas.openxmlformats.org/officeDocument/2006/customXml" ds:itemID="{7147CA22-2BC4-4917-83D2-7CA4C34A80D4}">
+  <ds:schemaRefs>
+    <ds:schemaRef ds:uri="ESRI.ArcGIS.Mapping.OfficeIntegration.PowerPointInfo"/>
+  </ds:schemaRefs>
+</ds:datastoreItem>
+</file>
+
+<file path=customXml/itemProps11.xml><?xml version="1.0" encoding="utf-8"?>
+<ds:datastoreItem xmlns:ds="http://schemas.openxmlformats.org/officeDocument/2006/customXml" ds:itemID="{10846DB9-88C0-41D7-ACE4-BEC3A7488A03}">
+  <ds:schemaRefs>
+    <ds:schemaRef ds:uri="ESRI.ArcGIS.Mapping.OfficeIntegration.PowerPointInfo"/>
+  </ds:schemaRefs>
+</ds:datastoreItem>
+</file>
+
+<file path=customXml/itemProps12.xml><?xml version="1.0" encoding="utf-8"?>
+<ds:datastoreItem xmlns:ds="http://schemas.openxmlformats.org/officeDocument/2006/customXml" ds:itemID="{5B58CDD1-2BF6-415B-A256-DBBCC6A48D56}">
+  <ds:schemaRefs>
+    <ds:schemaRef ds:uri="ESRI.ArcGIS.Mapping.OfficeIntegration.PowerPointInfo"/>
+  </ds:schemaRefs>
+</ds:datastoreItem>
+</file>
+
+<file path=customXml/itemProps13.xml><?xml version="1.0" encoding="utf-8"?>
+<ds:datastoreItem xmlns:ds="http://schemas.openxmlformats.org/officeDocument/2006/customXml" ds:itemID="{7684026F-E81F-4167-824A-3AA1BAEAE133}">
+  <ds:schemaRefs>
+    <ds:schemaRef ds:uri="ESRI.ArcGIS.Mapping.OfficeIntegration.PowerPointInfo"/>
+  </ds:schemaRefs>
+</ds:datastoreItem>
+</file>
+
+<file path=customXml/itemProps14.xml><?xml version="1.0" encoding="utf-8"?>
+<ds:datastoreItem xmlns:ds="http://schemas.openxmlformats.org/officeDocument/2006/customXml" ds:itemID="{C9037CA3-5499-457D-8238-F29CBEBDF143}">
+  <ds:schemaRefs>
+    <ds:schemaRef ds:uri="ESRI.ArcGIS.Mapping.OfficeIntegration.PowerPointInfo"/>
+  </ds:schemaRefs>
+</ds:datastoreItem>
+</file>
+
+<file path=customXml/itemProps15.xml><?xml version="1.0" encoding="utf-8"?>
+<ds:datastoreItem xmlns:ds="http://schemas.openxmlformats.org/officeDocument/2006/customXml" ds:itemID="{55235559-86B9-428B-8DAF-8EE6262226D5}">
+  <ds:schemaRefs>
+    <ds:schemaRef ds:uri="ESRI.ArcGIS.Mapping.OfficeIntegration.PowerPointInfo"/>
+  </ds:schemaRefs>
+</ds:datastoreItem>
+</file>
+
+<file path=customXml/itemProps16.xml><?xml version="1.0" encoding="utf-8"?>
+<ds:datastoreItem xmlns:ds="http://schemas.openxmlformats.org/officeDocument/2006/customXml" ds:itemID="{8EED6C1C-A455-42E4-8CBE-649F5A755068}">
+  <ds:schemaRefs>
+    <ds:schemaRef ds:uri="ESRI.ArcGIS.Mapping.OfficeIntegration.PowerPointInfo"/>
+  </ds:schemaRefs>
+</ds:datastoreItem>
+</file>
+
+<file path=customXml/itemProps17.xml><?xml version="1.0" encoding="utf-8"?>
+<ds:datastoreItem xmlns:ds="http://schemas.openxmlformats.org/officeDocument/2006/customXml" ds:itemID="{2C9ABD96-756D-41D3-909F-6F7B4C6B6E1F}">
+  <ds:schemaRefs>
+    <ds:schemaRef ds:uri="ESRI.ArcGIS.Mapping.OfficeIntegration.PowerPointInfo"/>
+  </ds:schemaRefs>
+</ds:datastoreItem>
+</file>
+
+<file path=customXml/itemProps18.xml><?xml version="1.0" encoding="utf-8"?>
+<ds:datastoreItem xmlns:ds="http://schemas.openxmlformats.org/officeDocument/2006/customXml" ds:itemID="{AE5A340C-916E-449C-AA30-CD41B151A0D4}">
+  <ds:schemaRefs>
+    <ds:schemaRef ds:uri="ESRI.ArcGIS.Mapping.OfficeIntegration.PowerPointInfo"/>
+  </ds:schemaRefs>
+</ds:datastoreItem>
+</file>
+
+<file path=customXml/itemProps19.xml><?xml version="1.0" encoding="utf-8"?>
+<ds:datastoreItem xmlns:ds="http://schemas.openxmlformats.org/officeDocument/2006/customXml" ds:itemID="{33F5FE6F-FF86-471A-919E-6C74E3669390}">
+  <ds:schemaRefs>
+    <ds:schemaRef ds:uri="ESRI.ArcGIS.Mapping.OfficeIntegration.PowerPointInfo"/>
+  </ds:schemaRefs>
+</ds:datastoreItem>
+</file>
+
+<file path=customXml/itemProps2.xml><?xml version="1.0" encoding="utf-8"?>
+<ds:datastoreItem xmlns:ds="http://schemas.openxmlformats.org/officeDocument/2006/customXml" ds:itemID="{C1BF2448-6CBA-44DB-9E22-BED59BA834DF}">
+  <ds:schemaRefs>
+    <ds:schemaRef ds:uri="ESRI.ArcGIS.Mapping.OfficeIntegration.PowerPointInfo"/>
+  </ds:schemaRefs>
+</ds:datastoreItem>
+</file>
+
+<file path=customXml/itemProps20.xml><?xml version="1.0" encoding="utf-8"?>
+<ds:datastoreItem xmlns:ds="http://schemas.openxmlformats.org/officeDocument/2006/customXml" ds:itemID="{4ADFB689-BC87-4869-ADD0-8C3555150450}">
+  <ds:schemaRefs>
+    <ds:schemaRef ds:uri="ESRI.ArcGIS.Mapping.OfficeIntegration.PowerPointInfo"/>
+  </ds:schemaRefs>
+</ds:datastoreItem>
+</file>
+
+<file path=customXml/itemProps21.xml><?xml version="1.0" encoding="utf-8"?>
+<ds:datastoreItem xmlns:ds="http://schemas.openxmlformats.org/officeDocument/2006/customXml" ds:itemID="{AB25B40B-929A-4CD0-B9AB-7142442027B6}">
+  <ds:schemaRefs>
+    <ds:schemaRef ds:uri="ESRI.ArcGIS.Mapping.OfficeIntegration.PowerPointInfo"/>
+  </ds:schemaRefs>
+</ds:datastoreItem>
+</file>
+
+<file path=customXml/itemProps22.xml><?xml version="1.0" encoding="utf-8"?>
+<ds:datastoreItem xmlns:ds="http://schemas.openxmlformats.org/officeDocument/2006/customXml" ds:itemID="{94844715-80D4-4BDB-8DF0-52D9314E2485}">
+  <ds:schemaRefs>
+    <ds:schemaRef ds:uri="ESRI.ArcGIS.Mapping.OfficeIntegration.PowerPointInfo"/>
+  </ds:schemaRefs>
+</ds:datastoreItem>
+</file>
+
+<file path=customXml/itemProps23.xml><?xml version="1.0" encoding="utf-8"?>
+<ds:datastoreItem xmlns:ds="http://schemas.openxmlformats.org/officeDocument/2006/customXml" ds:itemID="{3E253610-1BBE-4C16-A1DA-4D6F07A3A74E}">
+  <ds:schemaRefs>
+    <ds:schemaRef ds:uri="ESRI.ArcGIS.Mapping.OfficeIntegration.PowerPointInfo"/>
+  </ds:schemaRefs>
+</ds:datastoreItem>
+</file>
+
+<file path=customXml/itemProps24.xml><?xml version="1.0" encoding="utf-8"?>
+<ds:datastoreItem xmlns:ds="http://schemas.openxmlformats.org/officeDocument/2006/customXml" ds:itemID="{F6EFD530-1E3E-47B8-A55C-19EC63E3C655}">
+  <ds:schemaRefs>
+    <ds:schemaRef ds:uri="ESRI.ArcGIS.Mapping.OfficeIntegration.PowerPointInfo"/>
+  </ds:schemaRefs>
+</ds:datastoreItem>
+</file>
+
+<file path=customXml/itemProps25.xml><?xml version="1.0" encoding="utf-8"?>
+<ds:datastoreItem xmlns:ds="http://schemas.openxmlformats.org/officeDocument/2006/customXml" ds:itemID="{612F64FD-E61D-43DE-A84B-8FC0DA8FC26C}">
+  <ds:schemaRefs>
+    <ds:schemaRef ds:uri="ESRI.ArcGIS.Mapping.OfficeIntegration.PowerPointInfo"/>
+  </ds:schemaRefs>
+</ds:datastoreItem>
+</file>
+
+<file path=customXml/itemProps26.xml><?xml version="1.0" encoding="utf-8"?>
+<ds:datastoreItem xmlns:ds="http://schemas.openxmlformats.org/officeDocument/2006/customXml" ds:itemID="{E559A846-F914-4753-A2DC-D33AFE44114C}">
+  <ds:schemaRefs>
+    <ds:schemaRef ds:uri="ESRI.ArcGIS.Mapping.OfficeIntegration.PowerPointInfo"/>
+  </ds:schemaRefs>
+</ds:datastoreItem>
+</file>
+
+<file path=customXml/itemProps27.xml><?xml version="1.0" encoding="utf-8"?>
+<ds:datastoreItem xmlns:ds="http://schemas.openxmlformats.org/officeDocument/2006/customXml" ds:itemID="{C4AF463C-FA8B-436D-9853-3318650FDAB8}">
+  <ds:schemaRefs>
+    <ds:schemaRef ds:uri="ESRI.ArcGIS.Mapping.OfficeIntegration.PowerPointInfo"/>
+  </ds:schemaRefs>
+</ds:datastoreItem>
+</file>
+
+<file path=customXml/itemProps28.xml><?xml version="1.0" encoding="utf-8"?>
+<ds:datastoreItem xmlns:ds="http://schemas.openxmlformats.org/officeDocument/2006/customXml" ds:itemID="{9E56F111-9E55-4604-91C2-8352AE933430}">
+  <ds:schemaRefs>
+    <ds:schemaRef ds:uri="ESRI.ArcGIS.Mapping.OfficeIntegration.PowerPointInfo"/>
+  </ds:schemaRefs>
+</ds:datastoreItem>
+</file>
+
+<file path=customXml/itemProps29.xml><?xml version="1.0" encoding="utf-8"?>
+<ds:datastoreItem xmlns:ds="http://schemas.openxmlformats.org/officeDocument/2006/customXml" ds:itemID="{039A5E78-EC42-40DE-A05E-1C7FCA140310}">
+  <ds:schemaRefs>
+    <ds:schemaRef ds:uri="ESRI.ArcGIS.Mapping.OfficeIntegration.PowerPointInfo"/>
+  </ds:schemaRefs>
+</ds:datastoreItem>
+</file>
+
+<file path=customXml/itemProps3.xml><?xml version="1.0" encoding="utf-8"?>
+<ds:datastoreItem xmlns:ds="http://schemas.openxmlformats.org/officeDocument/2006/customXml" ds:itemID="{C3102E66-5C5A-4AAF-9C94-24819091B61E}">
+  <ds:schemaRefs>
+    <ds:schemaRef ds:uri="ESRI.ArcGIS.Mapping.OfficeIntegration.PowerPointInfo"/>
+  </ds:schemaRefs>
+</ds:datastoreItem>
+</file>
+
+<file path=customXml/itemProps30.xml><?xml version="1.0" encoding="utf-8"?>
+<ds:datastoreItem xmlns:ds="http://schemas.openxmlformats.org/officeDocument/2006/customXml" ds:itemID="{2FE51124-E413-4DA5-9E06-A6EB32D0C127}">
+  <ds:schemaRefs>
+    <ds:schemaRef ds:uri="ESRI.ArcGIS.Mapping.OfficeIntegration.PowerPointInfo"/>
+  </ds:schemaRefs>
+</ds:datastoreItem>
+</file>
+
+<file path=customXml/itemProps31.xml><?xml version="1.0" encoding="utf-8"?>
+<ds:datastoreItem xmlns:ds="http://schemas.openxmlformats.org/officeDocument/2006/customXml" ds:itemID="{EF0D8C03-B10D-4D20-AC38-CA6799A7A314}">
+  <ds:schemaRefs>
+    <ds:schemaRef ds:uri="ESRI.ArcGIS.Mapping.OfficeIntegration.PowerPointInfo"/>
+  </ds:schemaRefs>
+</ds:datastoreItem>
+</file>
+
+<file path=customXml/itemProps32.xml><?xml version="1.0" encoding="utf-8"?>
 <ds:datastoreItem xmlns:ds="http://schemas.openxmlformats.org/officeDocument/2006/customXml" ds:itemID="{A77C5B54-CA1C-4010-8D5D-ED406825EBB7}">
   <ds:schemaRefs>
     <ds:schemaRef ds:uri="ESRI.ArcGIS.Mapping.OfficeIntegration.PowerPointInfo"/>
@@ -9266,7 +9555,47 @@
 </ds:datastoreItem>
 </file>
 
-<file path=customXml/itemProps10.xml><?xml version="1.0" encoding="utf-8"?>
+<file path=customXml/itemProps33.xml><?xml version="1.0" encoding="utf-8"?>
+<ds:datastoreItem xmlns:ds="http://schemas.openxmlformats.org/officeDocument/2006/customXml" ds:itemID="{4617AF64-94DB-48BB-8BE2-3BCF6B12593F}">
+  <ds:schemaRefs>
+    <ds:schemaRef ds:uri="ESRI.ArcGIS.Mapping.OfficeIntegration.PowerPointInfo"/>
+  </ds:schemaRefs>
+</ds:datastoreItem>
+</file>
+
+<file path=customXml/itemProps34.xml><?xml version="1.0" encoding="utf-8"?>
+<ds:datastoreItem xmlns:ds="http://schemas.openxmlformats.org/officeDocument/2006/customXml" ds:itemID="{E1A338E5-2E37-4973-87E6-4C02B0B7F460}">
+  <ds:schemaRefs>
+    <ds:schemaRef ds:uri="http://schemas.microsoft.com/sharepoint/v3/contenttype/forms"/>
+  </ds:schemaRefs>
+</ds:datastoreItem>
+</file>
+
+<file path=customXml/itemProps35.xml><?xml version="1.0" encoding="utf-8"?>
+<ds:datastoreItem xmlns:ds="http://schemas.openxmlformats.org/officeDocument/2006/customXml" ds:itemID="{D6F15B81-7660-4E9F-B613-8AA4F84B6DA3}">
+  <ds:schemaRefs>
+    <ds:schemaRef ds:uri="ESRI.ArcGIS.Mapping.OfficeIntegration.PowerPointInfo"/>
+  </ds:schemaRefs>
+</ds:datastoreItem>
+</file>
+
+<file path=customXml/itemProps36.xml><?xml version="1.0" encoding="utf-8"?>
+<ds:datastoreItem xmlns:ds="http://schemas.openxmlformats.org/officeDocument/2006/customXml" ds:itemID="{998905D7-FE59-48DE-A74A-5B0009B7827F}">
+  <ds:schemaRefs>
+    <ds:schemaRef ds:uri="ESRI.ArcGIS.Mapping.OfficeIntegration.PowerPointInfo"/>
+  </ds:schemaRefs>
+</ds:datastoreItem>
+</file>
+
+<file path=customXml/itemProps37.xml><?xml version="1.0" encoding="utf-8"?>
+<ds:datastoreItem xmlns:ds="http://schemas.openxmlformats.org/officeDocument/2006/customXml" ds:itemID="{9DC677B7-6D9E-42B7-AD1F-75D1804EAF7D}">
+  <ds:schemaRefs>
+    <ds:schemaRef ds:uri="ESRI.ArcGIS.Mapping.OfficeIntegration.PowerPointInfo"/>
+  </ds:schemaRefs>
+</ds:datastoreItem>
+</file>
+
+<file path=customXml/itemProps38.xml><?xml version="1.0" encoding="utf-8"?>
 <ds:datastoreItem xmlns:ds="http://schemas.openxmlformats.org/officeDocument/2006/customXml" ds:itemID="{18DF8D07-6137-4D85-8010-4650942E033A}">
   <ds:schemaRefs>
     <ds:schemaRef ds:uri="ESRI.ArcGIS.Mapping.OfficeIntegration.PowerPointInfo"/>
@@ -9274,15 +9603,39 @@
 </ds:datastoreItem>
 </file>
 
-<file path=customXml/itemProps11.xml><?xml version="1.0" encoding="utf-8"?>
-<ds:datastoreItem xmlns:ds="http://schemas.openxmlformats.org/officeDocument/2006/customXml" ds:itemID="{C9037CA3-5499-457D-8238-F29CBEBDF143}">
+<file path=customXml/itemProps39.xml><?xml version="1.0" encoding="utf-8"?>
+<ds:datastoreItem xmlns:ds="http://schemas.openxmlformats.org/officeDocument/2006/customXml" ds:itemID="{DB399249-DB96-4601-9BA5-97791613CF3A}">
   <ds:schemaRefs>
     <ds:schemaRef ds:uri="ESRI.ArcGIS.Mapping.OfficeIntegration.PowerPointInfo"/>
   </ds:schemaRefs>
 </ds:datastoreItem>
 </file>
 
-<file path=customXml/itemProps12.xml><?xml version="1.0" encoding="utf-8"?>
+<file path=customXml/itemProps4.xml><?xml version="1.0" encoding="utf-8"?>
+<ds:datastoreItem xmlns:ds="http://schemas.openxmlformats.org/officeDocument/2006/customXml" ds:itemID="{905F88FE-324F-4FBE-89BB-9CEE04D6CACF}">
+  <ds:schemaRefs>
+    <ds:schemaRef ds:uri="ESRI.ArcGIS.Mapping.OfficeIntegration.PowerPointInfo"/>
+  </ds:schemaRefs>
+</ds:datastoreItem>
+</file>
+
+<file path=customXml/itemProps40.xml><?xml version="1.0" encoding="utf-8"?>
+<ds:datastoreItem xmlns:ds="http://schemas.openxmlformats.org/officeDocument/2006/customXml" ds:itemID="{6D2D132B-596B-4D69-A43B-566EB6C10C03}">
+  <ds:schemaRefs>
+    <ds:schemaRef ds:uri="ESRI.ArcGIS.Mapping.OfficeIntegration.PowerPointInfo"/>
+  </ds:schemaRefs>
+</ds:datastoreItem>
+</file>
+
+<file path=customXml/itemProps41.xml><?xml version="1.0" encoding="utf-8"?>
+<ds:datastoreItem xmlns:ds="http://schemas.openxmlformats.org/officeDocument/2006/customXml" ds:itemID="{76859AF2-E75C-459B-8657-EEEA80BC8153}">
+  <ds:schemaRefs>
+    <ds:schemaRef ds:uri="ESRI.ArcGIS.Mapping.OfficeIntegration.PowerPointInfo"/>
+  </ds:schemaRefs>
+</ds:datastoreItem>
+</file>
+
+<file path=customXml/itemProps42.xml><?xml version="1.0" encoding="utf-8"?>
 <ds:datastoreItem xmlns:ds="http://schemas.openxmlformats.org/officeDocument/2006/customXml" ds:itemID="{D4E2A01F-BEC1-4558-9AD1-A87ED70D910B}">
   <ds:schemaRefs>
     <ds:schemaRef ds:uri="ESRI.ArcGIS.Mapping.OfficeIntegration.PowerPointInfo"/>
@@ -9290,23 +9643,143 @@
 </ds:datastoreItem>
 </file>
 
-<file path=customXml/itemProps13.xml><?xml version="1.0" encoding="utf-8"?>
-<ds:datastoreItem xmlns:ds="http://schemas.openxmlformats.org/officeDocument/2006/customXml" ds:itemID="{10846DB9-88C0-41D7-ACE4-BEC3A7488A03}">
+<file path=customXml/itemProps43.xml><?xml version="1.0" encoding="utf-8"?>
+<ds:datastoreItem xmlns:ds="http://schemas.openxmlformats.org/officeDocument/2006/customXml" ds:itemID="{16EF6D11-DC4F-410C-A4BF-DF081B432591}">
   <ds:schemaRefs>
     <ds:schemaRef ds:uri="ESRI.ArcGIS.Mapping.OfficeIntegration.PowerPointInfo"/>
   </ds:schemaRefs>
 </ds:datastoreItem>
 </file>
 
-<file path=customXml/itemProps14.xml><?xml version="1.0" encoding="utf-8"?>
-<ds:datastoreItem xmlns:ds="http://schemas.openxmlformats.org/officeDocument/2006/customXml" ds:itemID="{D32008F3-64AC-45EB-A05B-F6120AE62290}">
+<file path=customXml/itemProps44.xml><?xml version="1.0" encoding="utf-8"?>
+<ds:datastoreItem xmlns:ds="http://schemas.openxmlformats.org/officeDocument/2006/customXml" ds:itemID="{2672FF5B-1ADC-45B0-9698-61421F5761E7}">
   <ds:schemaRefs>
     <ds:schemaRef ds:uri="ESRI.ArcGIS.Mapping.OfficeIntegration.PowerPointInfo"/>
   </ds:schemaRefs>
 </ds:datastoreItem>
 </file>
 
-<file path=customXml/itemProps15.xml><?xml version="1.0" encoding="utf-8"?>
+<file path=customXml/itemProps45.xml><?xml version="1.0" encoding="utf-8"?>
+<ds:datastoreItem xmlns:ds="http://schemas.openxmlformats.org/officeDocument/2006/customXml" ds:itemID="{096117C4-1661-4D3B-B9F6-BC19E0F3E90B}">
+  <ds:schemaRefs>
+    <ds:schemaRef ds:uri="ESRI.ArcGIS.Mapping.OfficeIntegration.PowerPointInfo"/>
+  </ds:schemaRefs>
+</ds:datastoreItem>
+</file>
+
+<file path=customXml/itemProps46.xml><?xml version="1.0" encoding="utf-8"?>
+<ds:datastoreItem xmlns:ds="http://schemas.openxmlformats.org/officeDocument/2006/customXml" ds:itemID="{3A5DA3C3-46A0-47F8-855A-99C7684A98A2}">
+  <ds:schemaRefs>
+    <ds:schemaRef ds:uri="ESRI.ArcGIS.Mapping.OfficeIntegration.PowerPointInfo"/>
+  </ds:schemaRefs>
+</ds:datastoreItem>
+</file>
+
+<file path=customXml/itemProps47.xml><?xml version="1.0" encoding="utf-8"?>
+<ds:datastoreItem xmlns:ds="http://schemas.openxmlformats.org/officeDocument/2006/customXml" ds:itemID="{B7E6AAC2-10E8-4F0C-BCC5-34BD332F8972}">
+  <ds:schemaRefs>
+    <ds:schemaRef ds:uri="ESRI.ArcGIS.Mapping.OfficeIntegration.PowerPointInfo"/>
+  </ds:schemaRefs>
+</ds:datastoreItem>
+</file>
+
+<file path=customXml/itemProps48.xml><?xml version="1.0" encoding="utf-8"?>
+<ds:datastoreItem xmlns:ds="http://schemas.openxmlformats.org/officeDocument/2006/customXml" ds:itemID="{EE9F405B-FE7A-4AB8-9CB8-9A75FBA69A95}">
+  <ds:schemaRefs>
+    <ds:schemaRef ds:uri="ESRI.ArcGIS.Mapping.OfficeIntegration.PowerPointInfo"/>
+  </ds:schemaRefs>
+</ds:datastoreItem>
+</file>
+
+<file path=customXml/itemProps49.xml><?xml version="1.0" encoding="utf-8"?>
+<ds:datastoreItem xmlns:ds="http://schemas.openxmlformats.org/officeDocument/2006/customXml" ds:itemID="{FB58F897-2A4D-4309-8E20-83FD28E6FE27}">
+  <ds:schemaRefs>
+    <ds:schemaRef ds:uri="ESRI.ArcGIS.Mapping.OfficeIntegration.PowerPointInfo"/>
+  </ds:schemaRefs>
+</ds:datastoreItem>
+</file>
+
+<file path=customXml/itemProps5.xml><?xml version="1.0" encoding="utf-8"?>
+<ds:datastoreItem xmlns:ds="http://schemas.openxmlformats.org/officeDocument/2006/customXml" ds:itemID="{B0302D17-5923-4CC0-9EB4-0E57930F5A8E}">
+  <ds:schemaRefs>
+    <ds:schemaRef ds:uri="ESRI.ArcGIS.Mapping.OfficeIntegration.PowerPointInfo"/>
+  </ds:schemaRefs>
+</ds:datastoreItem>
+</file>
+
+<file path=customXml/itemProps50.xml><?xml version="1.0" encoding="utf-8"?>
+<ds:datastoreItem xmlns:ds="http://schemas.openxmlformats.org/officeDocument/2006/customXml" ds:itemID="{E5F80E3B-5636-41B2-898D-5D17189605B7}">
+  <ds:schemaRefs>
+    <ds:schemaRef ds:uri="ESRI.ArcGIS.Mapping.OfficeIntegration.PowerPointInfo"/>
+  </ds:schemaRefs>
+</ds:datastoreItem>
+</file>
+
+<file path=customXml/itemProps51.xml><?xml version="1.0" encoding="utf-8"?>
+<ds:datastoreItem xmlns:ds="http://schemas.openxmlformats.org/officeDocument/2006/customXml" ds:itemID="{71658D62-F010-45F1-9326-EDC465FED48E}">
+  <ds:schemaRefs>
+    <ds:schemaRef ds:uri="ESRI.ArcGIS.Mapping.OfficeIntegration.PowerPointInfo"/>
+  </ds:schemaRefs>
+</ds:datastoreItem>
+</file>
+
+<file path=customXml/itemProps52.xml><?xml version="1.0" encoding="utf-8"?>
+<ds:datastoreItem xmlns:ds="http://schemas.openxmlformats.org/officeDocument/2006/customXml" ds:itemID="{328DCA66-548E-4424-83E1-09FFD45EE4B0}">
+  <ds:schemaRefs>
+    <ds:schemaRef ds:uri="ESRI.ArcGIS.Mapping.OfficeIntegration.PowerPointInfo"/>
+  </ds:schemaRefs>
+</ds:datastoreItem>
+</file>
+
+<file path=customXml/itemProps53.xml><?xml version="1.0" encoding="utf-8"?>
+<ds:datastoreItem xmlns:ds="http://schemas.openxmlformats.org/officeDocument/2006/customXml" ds:itemID="{4ADFB73A-380D-41FC-8C37-7155886326FA}">
+  <ds:schemaRefs>
+    <ds:schemaRef ds:uri="ESRI.ArcGIS.Mapping.OfficeIntegration.PowerPointInfo"/>
+  </ds:schemaRefs>
+</ds:datastoreItem>
+</file>
+
+<file path=customXml/itemProps54.xml><?xml version="1.0" encoding="utf-8"?>
+<ds:datastoreItem xmlns:ds="http://schemas.openxmlformats.org/officeDocument/2006/customXml" ds:itemID="{352E5095-9B98-4AF0-9861-BDC020ABBCFC}">
+  <ds:schemaRefs>
+    <ds:schemaRef ds:uri="ESRI.ArcGIS.Mapping.OfficeIntegration.PowerPointInfo"/>
+  </ds:schemaRefs>
+</ds:datastoreItem>
+</file>
+
+<file path=customXml/itemProps55.xml><?xml version="1.0" encoding="utf-8"?>
+<ds:datastoreItem xmlns:ds="http://schemas.openxmlformats.org/officeDocument/2006/customXml" ds:itemID="{9E8787D6-C7B8-48EC-8C13-4069AE6320BD}">
+  <ds:schemaRefs>
+    <ds:schemaRef ds:uri="ESRI.ArcGIS.Mapping.OfficeIntegration.PowerPointInfo"/>
+  </ds:schemaRefs>
+</ds:datastoreItem>
+</file>
+
+<file path=customXml/itemProps56.xml><?xml version="1.0" encoding="utf-8"?>
+<ds:datastoreItem xmlns:ds="http://schemas.openxmlformats.org/officeDocument/2006/customXml" ds:itemID="{AC4EB402-C456-4A26-8A92-B48606FF9264}">
+  <ds:schemaRefs>
+    <ds:schemaRef ds:uri="ESRI.ArcGIS.Mapping.OfficeIntegration.PowerPointInfo"/>
+  </ds:schemaRefs>
+</ds:datastoreItem>
+</file>
+
+<file path=customXml/itemProps57.xml><?xml version="1.0" encoding="utf-8"?>
+<ds:datastoreItem xmlns:ds="http://schemas.openxmlformats.org/officeDocument/2006/customXml" ds:itemID="{EB8D7141-3508-4B4E-8051-37E3E4C09D17}">
+  <ds:schemaRefs>
+    <ds:schemaRef ds:uri="ESRI.ArcGIS.Mapping.OfficeIntegration.PowerPointInfo"/>
+  </ds:schemaRefs>
+</ds:datastoreItem>
+</file>
+
+<file path=customXml/itemProps58.xml><?xml version="1.0" encoding="utf-8"?>
+<ds:datastoreItem xmlns:ds="http://schemas.openxmlformats.org/officeDocument/2006/customXml" ds:itemID="{E47732B9-9C1B-4723-B4AA-A21238C5DF44}">
+  <ds:schemaRefs>
+    <ds:schemaRef ds:uri="ESRI.ArcGIS.Mapping.OfficeIntegration.PowerPointInfo"/>
+  </ds:schemaRefs>
+</ds:datastoreItem>
+</file>
+
+<file path=customXml/itemProps59.xml><?xml version="1.0" encoding="utf-8"?>
 <ds:datastoreItem xmlns:ds="http://schemas.openxmlformats.org/officeDocument/2006/customXml" ds:itemID="{E940B40D-12DB-4BFA-BBB6-2269FD71FF92}">
   <ds:schemaRefs>
     <ds:schemaRef ds:uri="ESRI.ArcGIS.Mapping.OfficeIntegration.PowerPointInfo"/>
@@ -9314,23 +9787,15 @@
 </ds:datastoreItem>
 </file>
 
-<file path=customXml/itemProps16.xml><?xml version="1.0" encoding="utf-8"?>
-<ds:datastoreItem xmlns:ds="http://schemas.openxmlformats.org/officeDocument/2006/customXml" ds:itemID="{998905D7-FE59-48DE-A74A-5B0009B7827F}">
+<file path=customXml/itemProps6.xml><?xml version="1.0" encoding="utf-8"?>
+<ds:datastoreItem xmlns:ds="http://schemas.openxmlformats.org/officeDocument/2006/customXml" ds:itemID="{FDE85643-3216-4103-A1BD-63F5E1D42D73}">
   <ds:schemaRefs>
     <ds:schemaRef ds:uri="ESRI.ArcGIS.Mapping.OfficeIntegration.PowerPointInfo"/>
   </ds:schemaRefs>
 </ds:datastoreItem>
 </file>
 
-<file path=customXml/itemProps17.xml><?xml version="1.0" encoding="utf-8"?>
-<ds:datastoreItem xmlns:ds="http://schemas.openxmlformats.org/officeDocument/2006/customXml" ds:itemID="{DA46DABE-45F1-4E65-A939-497CB70F357D}">
-  <ds:schemaRefs>
-    <ds:schemaRef ds:uri="ESRI.ArcGIS.Mapping.OfficeIntegration.PowerPointInfo"/>
-  </ds:schemaRefs>
-</ds:datastoreItem>
-</file>
-
-<file path=customXml/itemProps18.xml><?xml version="1.0" encoding="utf-8"?>
+<file path=customXml/itemProps60.xml><?xml version="1.0" encoding="utf-8"?>
 <ds:datastoreItem xmlns:ds="http://schemas.openxmlformats.org/officeDocument/2006/customXml" ds:itemID="{5A1E471A-DB16-4174-9D85-6F159A344CDB}">
   <ds:schemaRefs>
     <ds:schemaRef ds:uri="ESRI.ArcGIS.Mapping.OfficeIntegration.PowerPointInfo"/>
@@ -9338,7 +9803,31 @@
 </ds:datastoreItem>
 </file>
 
-<file path=customXml/itemProps19.xml><?xml version="1.0" encoding="utf-8"?>
+<file path=customXml/itemProps61.xml><?xml version="1.0" encoding="utf-8"?>
+<ds:datastoreItem xmlns:ds="http://schemas.openxmlformats.org/officeDocument/2006/customXml" ds:itemID="{A2D97EB6-C9B5-45C6-85A6-D4FE6E1D9856}">
+  <ds:schemaRefs>
+    <ds:schemaRef ds:uri="ESRI.ArcGIS.Mapping.OfficeIntegration.PowerPointInfo"/>
+  </ds:schemaRefs>
+</ds:datastoreItem>
+</file>
+
+<file path=customXml/itemProps62.xml><?xml version="1.0" encoding="utf-8"?>
+<ds:datastoreItem xmlns:ds="http://schemas.openxmlformats.org/officeDocument/2006/customXml" ds:itemID="{653D88A7-0F5E-41C5-A5C5-47DF37C594C5}">
+  <ds:schemaRefs>
+    <ds:schemaRef ds:uri="ESRI.ArcGIS.Mapping.OfficeIntegration.PowerPointInfo"/>
+  </ds:schemaRefs>
+</ds:datastoreItem>
+</file>
+
+<file path=customXml/itemProps63.xml><?xml version="1.0" encoding="utf-8"?>
+<ds:datastoreItem xmlns:ds="http://schemas.openxmlformats.org/officeDocument/2006/customXml" ds:itemID="{22A42D4B-0AAE-44C9-A2EF-48BDE1C5260A}">
+  <ds:schemaRefs>
+    <ds:schemaRef ds:uri="ESRI.ArcGIS.Mapping.OfficeIntegration.PowerPointInfo"/>
+  </ds:schemaRefs>
+</ds:datastoreItem>
+</file>
+
+<file path=customXml/itemProps64.xml><?xml version="1.0" encoding="utf-8"?>
 <ds:datastoreItem xmlns:ds="http://schemas.openxmlformats.org/officeDocument/2006/customXml" ds:itemID="{81E133DB-697E-4C10-B192-8899027B1EC6}">
   <ds:schemaRefs>
     <ds:schemaRef ds:uri="http://schemas.openxmlformats.org/package/2006/metadata/core-properties"/>
@@ -9354,199 +9843,23 @@
 </ds:datastoreItem>
 </file>
 
-<file path=customXml/itemProps2.xml><?xml version="1.0" encoding="utf-8"?>
-<ds:datastoreItem xmlns:ds="http://schemas.openxmlformats.org/officeDocument/2006/customXml" ds:itemID="{53220D22-8257-492D-8F60-ECE474D7C478}">
+<file path=customXml/itemProps65.xml><?xml version="1.0" encoding="utf-8"?>
+<ds:datastoreItem xmlns:ds="http://schemas.openxmlformats.org/officeDocument/2006/customXml" ds:itemID="{D32008F3-64AC-45EB-A05B-F6120AE62290}">
   <ds:schemaRefs>
     <ds:schemaRef ds:uri="ESRI.ArcGIS.Mapping.OfficeIntegration.PowerPointInfo"/>
   </ds:schemaRefs>
 </ds:datastoreItem>
 </file>
 
-<file path=customXml/itemProps20.xml><?xml version="1.0" encoding="utf-8"?>
-<ds:datastoreItem xmlns:ds="http://schemas.openxmlformats.org/officeDocument/2006/customXml" ds:itemID="{16EF6D11-DC4F-410C-A4BF-DF081B432591}">
+<file path=customXml/itemProps66.xml><?xml version="1.0" encoding="utf-8"?>
+<ds:datastoreItem xmlns:ds="http://schemas.openxmlformats.org/officeDocument/2006/customXml" ds:itemID="{DA46DABE-45F1-4E65-A939-497CB70F357D}">
   <ds:schemaRefs>
     <ds:schemaRef ds:uri="ESRI.ArcGIS.Mapping.OfficeIntegration.PowerPointInfo"/>
   </ds:schemaRefs>
 </ds:datastoreItem>
 </file>
 
-<file path=customXml/itemProps21.xml><?xml version="1.0" encoding="utf-8"?>
-<ds:datastoreItem xmlns:ds="http://schemas.openxmlformats.org/officeDocument/2006/customXml" ds:itemID="{E1A338E5-2E37-4973-87E6-4C02B0B7F460}">
-  <ds:schemaRefs>
-    <ds:schemaRef ds:uri="http://schemas.microsoft.com/sharepoint/v3/contenttype/forms"/>
-  </ds:schemaRefs>
-</ds:datastoreItem>
-</file>
-
-<file path=customXml/itemProps22.xml><?xml version="1.0" encoding="utf-8"?>
-<ds:datastoreItem xmlns:ds="http://schemas.openxmlformats.org/officeDocument/2006/customXml" ds:itemID="{33F5FE6F-FF86-471A-919E-6C74E3669390}">
-  <ds:schemaRefs>
-    <ds:schemaRef ds:uri="ESRI.ArcGIS.Mapping.OfficeIntegration.PowerPointInfo"/>
-  </ds:schemaRefs>
-</ds:datastoreItem>
-</file>
-
-<file path=customXml/itemProps23.xml><?xml version="1.0" encoding="utf-8"?>
-<ds:datastoreItem xmlns:ds="http://schemas.openxmlformats.org/officeDocument/2006/customXml" ds:itemID="{7147CA22-2BC4-4917-83D2-7CA4C34A80D4}">
-  <ds:schemaRefs>
-    <ds:schemaRef ds:uri="ESRI.ArcGIS.Mapping.OfficeIntegration.PowerPointInfo"/>
-  </ds:schemaRefs>
-</ds:datastoreItem>
-</file>
-
-<file path=customXml/itemProps24.xml><?xml version="1.0" encoding="utf-8"?>
-<ds:datastoreItem xmlns:ds="http://schemas.openxmlformats.org/officeDocument/2006/customXml" ds:itemID="{FB58F897-2A4D-4309-8E20-83FD28E6FE27}">
-  <ds:schemaRefs>
-    <ds:schemaRef ds:uri="ESRI.ArcGIS.Mapping.OfficeIntegration.PowerPointInfo"/>
-  </ds:schemaRefs>
-</ds:datastoreItem>
-</file>
-
-<file path=customXml/itemProps25.xml><?xml version="1.0" encoding="utf-8"?>
-<ds:datastoreItem xmlns:ds="http://schemas.openxmlformats.org/officeDocument/2006/customXml" ds:itemID="{86B5FFB5-BF2F-45EA-BC75-C41726A8F251}">
-  <ds:schemaRefs>
-    <ds:schemaRef ds:uri="ESRI.ArcGIS.Mapping.OfficeIntegration.PowerPointInfo"/>
-  </ds:schemaRefs>
-</ds:datastoreItem>
-</file>
-
-<file path=customXml/itemProps26.xml><?xml version="1.0" encoding="utf-8"?>
-<ds:datastoreItem xmlns:ds="http://schemas.openxmlformats.org/officeDocument/2006/customXml" ds:itemID="{7684026F-E81F-4167-824A-3AA1BAEAE133}">
-  <ds:schemaRefs>
-    <ds:schemaRef ds:uri="ESRI.ArcGIS.Mapping.OfficeIntegration.PowerPointInfo"/>
-  </ds:schemaRefs>
-</ds:datastoreItem>
-</file>
-
-<file path=customXml/itemProps27.xml><?xml version="1.0" encoding="utf-8"?>
-<ds:datastoreItem xmlns:ds="http://schemas.openxmlformats.org/officeDocument/2006/customXml" ds:itemID="{328DCA66-548E-4424-83E1-09FFD45EE4B0}">
-  <ds:schemaRefs>
-    <ds:schemaRef ds:uri="ESRI.ArcGIS.Mapping.OfficeIntegration.PowerPointInfo"/>
-  </ds:schemaRefs>
-</ds:datastoreItem>
-</file>
-
-<file path=customXml/itemProps28.xml><?xml version="1.0" encoding="utf-8"?>
-<ds:datastoreItem xmlns:ds="http://schemas.openxmlformats.org/officeDocument/2006/customXml" ds:itemID="{2672FF5B-1ADC-45B0-9698-61421F5761E7}">
-  <ds:schemaRefs>
-    <ds:schemaRef ds:uri="ESRI.ArcGIS.Mapping.OfficeIntegration.PowerPointInfo"/>
-  </ds:schemaRefs>
-</ds:datastoreItem>
-</file>
-
-<file path=customXml/itemProps29.xml><?xml version="1.0" encoding="utf-8"?>
-<ds:datastoreItem xmlns:ds="http://schemas.openxmlformats.org/officeDocument/2006/customXml" ds:itemID="{653D88A7-0F5E-41C5-A5C5-47DF37C594C5}">
-  <ds:schemaRefs>
-    <ds:schemaRef ds:uri="ESRI.ArcGIS.Mapping.OfficeIntegration.PowerPointInfo"/>
-  </ds:schemaRefs>
-</ds:datastoreItem>
-</file>
-
-<file path=customXml/itemProps3.xml><?xml version="1.0" encoding="utf-8"?>
-<ds:datastoreItem xmlns:ds="http://schemas.openxmlformats.org/officeDocument/2006/customXml" ds:itemID="{7A70D44C-B768-49FE-A70F-C6199D3EE9A7}">
-  <ds:schemaRefs>
-    <ds:schemaRef ds:uri="ESRI.ArcGIS.Mapping.OfficeIntegration.PowerPointInfo"/>
-  </ds:schemaRefs>
-</ds:datastoreItem>
-</file>
-
-<file path=customXml/itemProps30.xml><?xml version="1.0" encoding="utf-8"?>
-<ds:datastoreItem xmlns:ds="http://schemas.openxmlformats.org/officeDocument/2006/customXml" ds:itemID="{C3102E66-5C5A-4AAF-9C94-24819091B61E}">
-  <ds:schemaRefs>
-    <ds:schemaRef ds:uri="ESRI.ArcGIS.Mapping.OfficeIntegration.PowerPointInfo"/>
-  </ds:schemaRefs>
-</ds:datastoreItem>
-</file>
-
-<file path=customXml/itemProps31.xml><?xml version="1.0" encoding="utf-8"?>
-<ds:datastoreItem xmlns:ds="http://schemas.openxmlformats.org/officeDocument/2006/customXml" ds:itemID="{55235559-86B9-428B-8DAF-8EE6262226D5}">
-  <ds:schemaRefs>
-    <ds:schemaRef ds:uri="ESRI.ArcGIS.Mapping.OfficeIntegration.PowerPointInfo"/>
-  </ds:schemaRefs>
-</ds:datastoreItem>
-</file>
-
-<file path=customXml/itemProps32.xml><?xml version="1.0" encoding="utf-8"?>
-<ds:datastoreItem xmlns:ds="http://schemas.openxmlformats.org/officeDocument/2006/customXml" ds:itemID="{F29452FE-972E-43F8-B54C-969F4C69C00B}">
-  <ds:schemaRefs>
-    <ds:schemaRef ds:uri="ESRI.ArcGIS.Mapping.OfficeIntegration.PowerPointInfo"/>
-  </ds:schemaRefs>
-</ds:datastoreItem>
-</file>
-
-<file path=customXml/itemProps33.xml><?xml version="1.0" encoding="utf-8"?>
-<ds:datastoreItem xmlns:ds="http://schemas.openxmlformats.org/officeDocument/2006/customXml" ds:itemID="{3A5DA3C3-46A0-47F8-855A-99C7684A98A2}">
-  <ds:schemaRefs>
-    <ds:schemaRef ds:uri="ESRI.ArcGIS.Mapping.OfficeIntegration.PowerPointInfo"/>
-  </ds:schemaRefs>
-</ds:datastoreItem>
-</file>
-
-<file path=customXml/itemProps34.xml><?xml version="1.0" encoding="utf-8"?>
-<ds:datastoreItem xmlns:ds="http://schemas.openxmlformats.org/officeDocument/2006/customXml" ds:itemID="{612F64FD-E61D-43DE-A84B-8FC0DA8FC26C}">
-  <ds:schemaRefs>
-    <ds:schemaRef ds:uri="ESRI.ArcGIS.Mapping.OfficeIntegration.PowerPointInfo"/>
-  </ds:schemaRefs>
-</ds:datastoreItem>
-</file>
-
-<file path=customXml/itemProps35.xml><?xml version="1.0" encoding="utf-8"?>
-<ds:datastoreItem xmlns:ds="http://schemas.openxmlformats.org/officeDocument/2006/customXml" ds:itemID="{4ADFB689-BC87-4869-ADD0-8C3555150450}">
-  <ds:schemaRefs>
-    <ds:schemaRef ds:uri="ESRI.ArcGIS.Mapping.OfficeIntegration.PowerPointInfo"/>
-  </ds:schemaRefs>
-</ds:datastoreItem>
-</file>
-
-<file path=customXml/itemProps36.xml><?xml version="1.0" encoding="utf-8"?>
-<ds:datastoreItem xmlns:ds="http://schemas.openxmlformats.org/officeDocument/2006/customXml" ds:itemID="{4617AF64-94DB-48BB-8BE2-3BCF6B12593F}">
-  <ds:schemaRefs>
-    <ds:schemaRef ds:uri="ESRI.ArcGIS.Mapping.OfficeIntegration.PowerPointInfo"/>
-  </ds:schemaRefs>
-</ds:datastoreItem>
-</file>
-
-<file path=customXml/itemProps37.xml><?xml version="1.0" encoding="utf-8"?>
-<ds:datastoreItem xmlns:ds="http://schemas.openxmlformats.org/officeDocument/2006/customXml" ds:itemID="{9E56F111-9E55-4604-91C2-8352AE933430}">
-  <ds:schemaRefs>
-    <ds:schemaRef ds:uri="ESRI.ArcGIS.Mapping.OfficeIntegration.PowerPointInfo"/>
-  </ds:schemaRefs>
-</ds:datastoreItem>
-</file>
-
-<file path=customXml/itemProps38.xml><?xml version="1.0" encoding="utf-8"?>
-<ds:datastoreItem xmlns:ds="http://schemas.openxmlformats.org/officeDocument/2006/customXml" ds:itemID="{EF0D8C03-B10D-4D20-AC38-CA6799A7A314}">
-  <ds:schemaRefs>
-    <ds:schemaRef ds:uri="ESRI.ArcGIS.Mapping.OfficeIntegration.PowerPointInfo"/>
-  </ds:schemaRefs>
-</ds:datastoreItem>
-</file>
-
-<file path=customXml/itemProps39.xml><?xml version="1.0" encoding="utf-8"?>
-<ds:datastoreItem xmlns:ds="http://schemas.openxmlformats.org/officeDocument/2006/customXml" ds:itemID="{B7E6AAC2-10E8-4F0C-BCC5-34BD332F8972}">
-  <ds:schemaRefs>
-    <ds:schemaRef ds:uri="ESRI.ArcGIS.Mapping.OfficeIntegration.PowerPointInfo"/>
-  </ds:schemaRefs>
-</ds:datastoreItem>
-</file>
-
-<file path=customXml/itemProps4.xml><?xml version="1.0" encoding="utf-8"?>
-<ds:datastoreItem xmlns:ds="http://schemas.openxmlformats.org/officeDocument/2006/customXml" ds:itemID="{B0302D17-5923-4CC0-9EB4-0E57930F5A8E}">
-  <ds:schemaRefs>
-    <ds:schemaRef ds:uri="ESRI.ArcGIS.Mapping.OfficeIntegration.PowerPointInfo"/>
-  </ds:schemaRefs>
-</ds:datastoreItem>
-</file>
-
-<file path=customXml/itemProps40.xml><?xml version="1.0" encoding="utf-8"?>
-<ds:datastoreItem xmlns:ds="http://schemas.openxmlformats.org/officeDocument/2006/customXml" ds:itemID="{AC4EB402-C456-4A26-8A92-B48606FF9264}">
-  <ds:schemaRefs>
-    <ds:schemaRef ds:uri="ESRI.ArcGIS.Mapping.OfficeIntegration.PowerPointInfo"/>
-  </ds:schemaRefs>
-</ds:datastoreItem>
-</file>
-
-<file path=customXml/itemProps41.xml><?xml version="1.0" encoding="utf-8"?>
+<file path=customXml/itemProps67.xml><?xml version="1.0" encoding="utf-8"?>
 <ds:datastoreItem xmlns:ds="http://schemas.openxmlformats.org/officeDocument/2006/customXml" ds:itemID="{8B8D6152-B933-4294-8151-3CF2A1B01FF1}">
   <ds:schemaRefs>
     <ds:schemaRef ds:uri="http://schemas.microsoft.com/office/2006/metadata/contentType"/>
@@ -9564,258 +9877,34 @@
 </ds:datastoreItem>
 </file>
 
-<file path=customXml/itemProps42.xml><?xml version="1.0" encoding="utf-8"?>
-<ds:datastoreItem xmlns:ds="http://schemas.openxmlformats.org/officeDocument/2006/customXml" ds:itemID="{A2D97EB6-C9B5-45C6-85A6-D4FE6E1D9856}">
+<file path=customXml/itemProps68.xml><?xml version="1.0" encoding="utf-8"?>
+<ds:datastoreItem xmlns:ds="http://schemas.openxmlformats.org/officeDocument/2006/customXml" ds:itemID="{53220D22-8257-492D-8F60-ECE474D7C478}">
   <ds:schemaRefs>
     <ds:schemaRef ds:uri="ESRI.ArcGIS.Mapping.OfficeIntegration.PowerPointInfo"/>
   </ds:schemaRefs>
 </ds:datastoreItem>
 </file>
 
-<file path=customXml/itemProps43.xml><?xml version="1.0" encoding="utf-8"?>
-<ds:datastoreItem xmlns:ds="http://schemas.openxmlformats.org/officeDocument/2006/customXml" ds:itemID="{EB8D7141-3508-4B4E-8051-37E3E4C09D17}">
+<file path=customXml/itemProps7.xml><?xml version="1.0" encoding="utf-8"?>
+<ds:datastoreItem xmlns:ds="http://schemas.openxmlformats.org/officeDocument/2006/customXml" ds:itemID="{7A70D44C-B768-49FE-A70F-C6199D3EE9A7}">
   <ds:schemaRefs>
     <ds:schemaRef ds:uri="ESRI.ArcGIS.Mapping.OfficeIntegration.PowerPointInfo"/>
   </ds:schemaRefs>
 </ds:datastoreItem>
 </file>
 
-<file path=customXml/itemProps44.xml><?xml version="1.0" encoding="utf-8"?>
-<ds:datastoreItem xmlns:ds="http://schemas.openxmlformats.org/officeDocument/2006/customXml" ds:itemID="{DB399249-DB96-4601-9BA5-97791613CF3A}">
+<file path=customXml/itemProps8.xml><?xml version="1.0" encoding="utf-8"?>
+<ds:datastoreItem xmlns:ds="http://schemas.openxmlformats.org/officeDocument/2006/customXml" ds:itemID="{86B5FFB5-BF2F-45EA-BC75-C41726A8F251}">
   <ds:schemaRefs>
     <ds:schemaRef ds:uri="ESRI.ArcGIS.Mapping.OfficeIntegration.PowerPointInfo"/>
   </ds:schemaRefs>
 </ds:datastoreItem>
 </file>
 
-<file path=customXml/itemProps45.xml><?xml version="1.0" encoding="utf-8"?>
-<ds:datastoreItem xmlns:ds="http://schemas.openxmlformats.org/officeDocument/2006/customXml" ds:itemID="{905F88FE-324F-4FBE-89BB-9CEE04D6CACF}">
-  <ds:schemaRefs>
-    <ds:schemaRef ds:uri="ESRI.ArcGIS.Mapping.OfficeIntegration.PowerPointInfo"/>
-  </ds:schemaRefs>
-</ds:datastoreItem>
-</file>
-
-<file path=customXml/itemProps46.xml><?xml version="1.0" encoding="utf-8"?>
-<ds:datastoreItem xmlns:ds="http://schemas.openxmlformats.org/officeDocument/2006/customXml" ds:itemID="{94844715-80D4-4BDB-8DF0-52D9314E2485}">
-  <ds:schemaRefs>
-    <ds:schemaRef ds:uri="ESRI.ArcGIS.Mapping.OfficeIntegration.PowerPointInfo"/>
-  </ds:schemaRefs>
-</ds:datastoreItem>
-</file>
-
-<file path=customXml/itemProps47.xml><?xml version="1.0" encoding="utf-8"?>
-<ds:datastoreItem xmlns:ds="http://schemas.openxmlformats.org/officeDocument/2006/customXml" ds:itemID="{5B58CDD1-2BF6-415B-A256-DBBCC6A48D56}">
-  <ds:schemaRefs>
-    <ds:schemaRef ds:uri="ESRI.ArcGIS.Mapping.OfficeIntegration.PowerPointInfo"/>
-  </ds:schemaRefs>
-</ds:datastoreItem>
-</file>
-
-<file path=customXml/itemProps48.xml><?xml version="1.0" encoding="utf-8"?>
-<ds:datastoreItem xmlns:ds="http://schemas.openxmlformats.org/officeDocument/2006/customXml" ds:itemID="{FDE85643-3216-4103-A1BD-63F5E1D42D73}">
-  <ds:schemaRefs>
-    <ds:schemaRef ds:uri="ESRI.ArcGIS.Mapping.OfficeIntegration.PowerPointInfo"/>
-  </ds:schemaRefs>
-</ds:datastoreItem>
-</file>
-
-<file path=customXml/itemProps49.xml><?xml version="1.0" encoding="utf-8"?>
-<ds:datastoreItem xmlns:ds="http://schemas.openxmlformats.org/officeDocument/2006/customXml" ds:itemID="{F6EFD530-1E3E-47B8-A55C-19EC63E3C655}">
-  <ds:schemaRefs>
-    <ds:schemaRef ds:uri="ESRI.ArcGIS.Mapping.OfficeIntegration.PowerPointInfo"/>
-  </ds:schemaRefs>
-</ds:datastoreItem>
-</file>
-
-<file path=customXml/itemProps5.xml><?xml version="1.0" encoding="utf-8"?>
-<ds:datastoreItem xmlns:ds="http://schemas.openxmlformats.org/officeDocument/2006/customXml" ds:itemID="{E5F80E3B-5636-41B2-898D-5D17189605B7}">
-  <ds:schemaRefs>
-    <ds:schemaRef ds:uri="ESRI.ArcGIS.Mapping.OfficeIntegration.PowerPointInfo"/>
-  </ds:schemaRefs>
-</ds:datastoreItem>
-</file>
-
-<file path=customXml/itemProps50.xml><?xml version="1.0" encoding="utf-8"?>
-<ds:datastoreItem xmlns:ds="http://schemas.openxmlformats.org/officeDocument/2006/customXml" ds:itemID="{096117C4-1661-4D3B-B9F6-BC19E0F3E90B}">
-  <ds:schemaRefs>
-    <ds:schemaRef ds:uri="ESRI.ArcGIS.Mapping.OfficeIntegration.PowerPointInfo"/>
-  </ds:schemaRefs>
-</ds:datastoreItem>
-</file>
-
-<file path=customXml/itemProps51.xml><?xml version="1.0" encoding="utf-8"?>
-<ds:datastoreItem xmlns:ds="http://schemas.openxmlformats.org/officeDocument/2006/customXml" ds:itemID="{4ADFB73A-380D-41FC-8C37-7155886326FA}">
-  <ds:schemaRefs>
-    <ds:schemaRef ds:uri="ESRI.ArcGIS.Mapping.OfficeIntegration.PowerPointInfo"/>
-  </ds:schemaRefs>
-</ds:datastoreItem>
-</file>
-
-<file path=customXml/itemProps52.xml><?xml version="1.0" encoding="utf-8"?>
-<ds:datastoreItem xmlns:ds="http://schemas.openxmlformats.org/officeDocument/2006/customXml" ds:itemID="{039A5E78-EC42-40DE-A05E-1C7FCA140310}">
-  <ds:schemaRefs>
-    <ds:schemaRef ds:uri="ESRI.ArcGIS.Mapping.OfficeIntegration.PowerPointInfo"/>
-  </ds:schemaRefs>
-</ds:datastoreItem>
-</file>
-
-<file path=customXml/itemProps53.xml><?xml version="1.0" encoding="utf-8"?>
-<ds:datastoreItem xmlns:ds="http://schemas.openxmlformats.org/officeDocument/2006/customXml" ds:itemID="{9DC677B7-6D9E-42B7-AD1F-75D1804EAF7D}">
-  <ds:schemaRefs>
-    <ds:schemaRef ds:uri="ESRI.ArcGIS.Mapping.OfficeIntegration.PowerPointInfo"/>
-  </ds:schemaRefs>
-</ds:datastoreItem>
-</file>
-
-<file path=customXml/itemProps54.xml><?xml version="1.0" encoding="utf-8"?>
-<ds:datastoreItem xmlns:ds="http://schemas.openxmlformats.org/officeDocument/2006/customXml" ds:itemID="{3E253610-1BBE-4C16-A1DA-4D6F07A3A74E}">
-  <ds:schemaRefs>
-    <ds:schemaRef ds:uri="ESRI.ArcGIS.Mapping.OfficeIntegration.PowerPointInfo"/>
-  </ds:schemaRefs>
-</ds:datastoreItem>
-</file>
-
-<file path=customXml/itemProps55.xml><?xml version="1.0" encoding="utf-8"?>
-<ds:datastoreItem xmlns:ds="http://schemas.openxmlformats.org/officeDocument/2006/customXml" ds:itemID="{D6F15B81-7660-4E9F-B613-8AA4F84B6DA3}">
-  <ds:schemaRefs>
-    <ds:schemaRef ds:uri="ESRI.ArcGIS.Mapping.OfficeIntegration.PowerPointInfo"/>
-  </ds:schemaRefs>
-</ds:datastoreItem>
-</file>
-
-<file path=customXml/itemProps56.xml><?xml version="1.0" encoding="utf-8"?>
-<ds:datastoreItem xmlns:ds="http://schemas.openxmlformats.org/officeDocument/2006/customXml" ds:itemID="{76859AF2-E75C-459B-8657-EEEA80BC8153}">
-  <ds:schemaRefs>
-    <ds:schemaRef ds:uri="ESRI.ArcGIS.Mapping.OfficeIntegration.PowerPointInfo"/>
-  </ds:schemaRefs>
-</ds:datastoreItem>
-</file>
-
-<file path=customXml/itemProps57.xml><?xml version="1.0" encoding="utf-8"?>
-<ds:datastoreItem xmlns:ds="http://schemas.openxmlformats.org/officeDocument/2006/customXml" ds:itemID="{9E8787D6-C7B8-48EC-8C13-4069AE6320BD}">
-  <ds:schemaRefs>
-    <ds:schemaRef ds:uri="ESRI.ArcGIS.Mapping.OfficeIntegration.PowerPointInfo"/>
-  </ds:schemaRefs>
-</ds:datastoreItem>
-</file>
-
-<file path=customXml/itemProps58.xml><?xml version="1.0" encoding="utf-8"?>
-<ds:datastoreItem xmlns:ds="http://schemas.openxmlformats.org/officeDocument/2006/customXml" ds:itemID="{22A42D4B-0AAE-44C9-A2EF-48BDE1C5260A}">
-  <ds:schemaRefs>
-    <ds:schemaRef ds:uri="ESRI.ArcGIS.Mapping.OfficeIntegration.PowerPointInfo"/>
-  </ds:schemaRefs>
-</ds:datastoreItem>
-</file>
-
-<file path=customXml/itemProps59.xml><?xml version="1.0" encoding="utf-8"?>
-<ds:datastoreItem xmlns:ds="http://schemas.openxmlformats.org/officeDocument/2006/customXml" ds:itemID="{E47732B9-9C1B-4723-B4AA-A21238C5DF44}">
-  <ds:schemaRefs>
-    <ds:schemaRef ds:uri="ESRI.ArcGIS.Mapping.OfficeIntegration.PowerPointInfo"/>
-  </ds:schemaRefs>
-</ds:datastoreItem>
-</file>
-
-<file path=customXml/itemProps6.xml><?xml version="1.0" encoding="utf-8"?>
-<ds:datastoreItem xmlns:ds="http://schemas.openxmlformats.org/officeDocument/2006/customXml" ds:itemID="{E559A846-F914-4753-A2DC-D33AFE44114C}">
-  <ds:schemaRefs>
-    <ds:schemaRef ds:uri="ESRI.ArcGIS.Mapping.OfficeIntegration.PowerPointInfo"/>
-  </ds:schemaRefs>
-</ds:datastoreItem>
-</file>
-
-<file path=customXml/itemProps60.xml><?xml version="1.0" encoding="utf-8"?>
-<ds:datastoreItem xmlns:ds="http://schemas.openxmlformats.org/officeDocument/2006/customXml" ds:itemID="{AE5A340C-916E-449C-AA30-CD41B151A0D4}">
-  <ds:schemaRefs>
-    <ds:schemaRef ds:uri="ESRI.ArcGIS.Mapping.OfficeIntegration.PowerPointInfo"/>
-  </ds:schemaRefs>
-</ds:datastoreItem>
-</file>
-
-<file path=customXml/itemProps61.xml><?xml version="1.0" encoding="utf-8"?>
-<ds:datastoreItem xmlns:ds="http://schemas.openxmlformats.org/officeDocument/2006/customXml" ds:itemID="{C1BF2448-6CBA-44DB-9E22-BED59BA834DF}">
-  <ds:schemaRefs>
-    <ds:schemaRef ds:uri="ESRI.ArcGIS.Mapping.OfficeIntegration.PowerPointInfo"/>
-  </ds:schemaRefs>
-</ds:datastoreItem>
-</file>
-
-<file path=customXml/itemProps62.xml><?xml version="1.0" encoding="utf-8"?>
-<ds:datastoreItem xmlns:ds="http://schemas.openxmlformats.org/officeDocument/2006/customXml" ds:itemID="{352E5095-9B98-4AF0-9861-BDC020ABBCFC}">
-  <ds:schemaRefs>
-    <ds:schemaRef ds:uri="ESRI.ArcGIS.Mapping.OfficeIntegration.PowerPointInfo"/>
-  </ds:schemaRefs>
-</ds:datastoreItem>
-</file>
-
-<file path=customXml/itemProps63.xml><?xml version="1.0" encoding="utf-8"?>
-<ds:datastoreItem xmlns:ds="http://schemas.openxmlformats.org/officeDocument/2006/customXml" ds:itemID="{C4AF463C-FA8B-436D-9853-3318650FDAB8}">
-  <ds:schemaRefs>
-    <ds:schemaRef ds:uri="ESRI.ArcGIS.Mapping.OfficeIntegration.PowerPointInfo"/>
-  </ds:schemaRefs>
-</ds:datastoreItem>
-</file>
-
-<file path=customXml/itemProps64.xml><?xml version="1.0" encoding="utf-8"?>
-<ds:datastoreItem xmlns:ds="http://schemas.openxmlformats.org/officeDocument/2006/customXml" ds:itemID="{2FE51124-E413-4DA5-9E06-A6EB32D0C127}">
-  <ds:schemaRefs>
-    <ds:schemaRef ds:uri="ESRI.ArcGIS.Mapping.OfficeIntegration.PowerPointInfo"/>
-  </ds:schemaRefs>
-</ds:datastoreItem>
-</file>
-
-<file path=customXml/itemProps65.xml><?xml version="1.0" encoding="utf-8"?>
-<ds:datastoreItem xmlns:ds="http://schemas.openxmlformats.org/officeDocument/2006/customXml" ds:itemID="{71658D62-F010-45F1-9326-EDC465FED48E}">
-  <ds:schemaRefs>
-    <ds:schemaRef ds:uri="ESRI.ArcGIS.Mapping.OfficeIntegration.PowerPointInfo"/>
-  </ds:schemaRefs>
-</ds:datastoreItem>
-</file>
-
-<file path=customXml/itemProps66.xml><?xml version="1.0" encoding="utf-8"?>
-<ds:datastoreItem xmlns:ds="http://schemas.openxmlformats.org/officeDocument/2006/customXml" ds:itemID="{2C9ABD96-756D-41D3-909F-6F7B4C6B6E1F}">
-  <ds:schemaRefs>
-    <ds:schemaRef ds:uri="ESRI.ArcGIS.Mapping.OfficeIntegration.PowerPointInfo"/>
-  </ds:schemaRefs>
-</ds:datastoreItem>
-</file>
-
-<file path=customXml/itemProps67.xml><?xml version="1.0" encoding="utf-8"?>
+<file path=customXml/itemProps9.xml><?xml version="1.0" encoding="utf-8"?>
 <ds:datastoreItem xmlns:ds="http://schemas.openxmlformats.org/officeDocument/2006/customXml" ds:itemID="{DE4ACD9E-0233-451D-890D-5732E05DB574}">
   <ds:schemaRefs>
     <ds:schemaRef ds:uri="ESRI.ArcGIS.Mapping.OfficeIntegration.PowerPointInfo"/>
   </ds:schemaRefs>
 </ds:datastoreItem>
-</file>
-
-<file path=customXml/itemProps68.xml><?xml version="1.0" encoding="utf-8"?>
-<ds:datastoreItem xmlns:ds="http://schemas.openxmlformats.org/officeDocument/2006/customXml" ds:itemID="{8EED6C1C-A455-42E4-8CBE-649F5A755068}">
-  <ds:schemaRefs>
-    <ds:schemaRef ds:uri="ESRI.ArcGIS.Mapping.OfficeIntegration.PowerPointInfo"/>
-  </ds:schemaRefs>
-</ds:datastoreItem>
-</file>
-
-<file path=customXml/itemProps7.xml><?xml version="1.0" encoding="utf-8"?>
-<ds:datastoreItem xmlns:ds="http://schemas.openxmlformats.org/officeDocument/2006/customXml" ds:itemID="{EE9F405B-FE7A-4AB8-9CB8-9A75FBA69A95}">
-  <ds:schemaRefs>
-    <ds:schemaRef ds:uri="ESRI.ArcGIS.Mapping.OfficeIntegration.PowerPointInfo"/>
-  </ds:schemaRefs>
-</ds:datastoreItem>
-</file>
-
-<file path=customXml/itemProps8.xml><?xml version="1.0" encoding="utf-8"?>
-<ds:datastoreItem xmlns:ds="http://schemas.openxmlformats.org/officeDocument/2006/customXml" ds:itemID="{AB25B40B-929A-4CD0-B9AB-7142442027B6}">
-  <ds:schemaRefs>
-    <ds:schemaRef ds:uri="ESRI.ArcGIS.Mapping.OfficeIntegration.PowerPointInfo"/>
-  </ds:schemaRefs>
-</ds:datastoreItem>
-</file>
-
-<file path=customXml/itemProps9.xml><?xml version="1.0" encoding="utf-8"?>
-<ds:datastoreItem xmlns:ds="http://schemas.openxmlformats.org/officeDocument/2006/customXml" ds:itemID="{6D2D132B-596B-4D69-A43B-566EB6C10C03}">
-  <ds:schemaRefs>
-    <ds:schemaRef ds:uri="ESRI.ArcGIS.Mapping.OfficeIntegration.PowerPointInfo"/>
-  </ds:schemaRefs>
-</ds:datastoreItem>
 </file>
</xml_diff>